<commit_message>
Archive modified pptx, marmiton.sh and total.sed files
</commit_message>
<xml_diff>
--- a/projects/marmiton/Marmiton_project.pptx
+++ b/projects/marmiton/Marmiton_project.pptx
@@ -12,6 +12,9 @@
     <p:sldId id="257" r:id="rId7"/>
     <p:sldId id="258" r:id="rId8"/>
     <p:sldId id="259" r:id="rId9"/>
+    <p:sldId id="260" r:id="rId10"/>
+    <p:sldId id="261" r:id="rId11"/>
+    <p:sldId id="262" r:id="rId12"/>
   </p:sldIdLst>
   <p:sldSz cy="5143500" cx="9144000"/>
   <p:notesSz cy="9144000" cx="6858000"/>
@@ -703,6 +706,291 @@
       <p:sp>
         <p:nvSpPr>
           <p:cNvPr id="59" name="Shape 59"/>
+          <p:cNvSpPr txBox="1"/>
+          <p:nvPr>
+            <p:ph idx="1" type="body"/>
+          </p:nvPr>
+        </p:nvSpPr>
+        <p:spPr>
+          <a:xfrm>
+            <a:off y="4343400" x="685800"/>
+            <a:ext cy="4114800" cx="5486399"/>
+          </a:xfrm>
+          <a:prstGeom prst="rect">
+            <a:avLst/>
+          </a:prstGeom>
+        </p:spPr>
+        <p:txBody>
+          <a:bodyPr bIns="91425" rIns="91425" lIns="91425" tIns="91425" anchor="t" anchorCtr="0">
+            <a:noAutofit/>
+          </a:bodyPr>
+          <a:lstStyle/>
+          <a:p>
+            <a:pPr>
+              <a:spcBef>
+                <a:spcPts val="0"/>
+              </a:spcBef>
+              <a:buNone/>
+            </a:pPr>
+            <a:r>
+              <a:t/>
+            </a:r>
+            <a:endParaRPr/>
+          </a:p>
+        </p:txBody>
+      </p:sp>
+    </p:spTree>
+  </p:cSld>
+  <p:clrMapOvr>
+    <a:masterClrMapping/>
+  </p:clrMapOvr>
+</p:notes>
+</file>
+
+<file path=ppt/notesSlides/notesSlide5.xml><?xml version="1.0" encoding="utf-8"?>
+<p:notes xmlns:a="http://schemas.openxmlformats.org/drawingml/2006/main" xmlns:r="http://schemas.openxmlformats.org/officeDocument/2006/relationships" xmlns:mc="http://schemas.openxmlformats.org/markup-compatibility/2006" xmlns:mv="urn:schemas-microsoft-com:mac:vml" xmlns:p="http://schemas.openxmlformats.org/presentationml/2006/main" xmlns:c="http://schemas.openxmlformats.org/drawingml/2006/chart" xmlns:dgm="http://schemas.openxmlformats.org/drawingml/2006/diagram" xmlns:o="urn:schemas-microsoft-com:office:office" xmlns:v="urn:schemas-microsoft-com:vml" xmlns:pvml="urn:schemas-microsoft-com:office:powerpoint" xmlns:com="http://schemas.openxmlformats.org/drawingml/2006/compatibility" xmlns:p14="http://schemas.microsoft.com/office/powerpoint/2010/main" showMasterSp="0" showMasterPhAnim="0">
+  <p:cSld>
+    <p:spTree>
+      <p:nvGrpSpPr>
+        <p:cNvPr id="64" name="Shape 64"/>
+        <p:cNvGrpSpPr/>
+        <p:nvPr/>
+      </p:nvGrpSpPr>
+      <p:grpSpPr>
+        <a:xfrm>
+          <a:off y="0" x="0"/>
+          <a:ext cy="0" cx="0"/>
+          <a:chOff y="0" x="0"/>
+          <a:chExt cy="0" cx="0"/>
+        </a:xfrm>
+      </p:grpSpPr>
+      <p:sp>
+        <p:nvSpPr>
+          <p:cNvPr id="65" name="Shape 65"/>
+          <p:cNvSpPr/>
+          <p:nvPr>
+            <p:ph idx="2" type="sldImg"/>
+          </p:nvPr>
+        </p:nvSpPr>
+        <p:spPr>
+          <a:xfrm>
+            <a:off y="685800" x="381187"/>
+            <a:ext cy="3429000" cx="6096299"/>
+          </a:xfrm>
+          <a:custGeom>
+            <a:pathLst>
+              <a:path w="120000" extrusionOk="0" h="120000">
+                <a:moveTo>
+                  <a:pt y="0" x="0"/>
+                </a:moveTo>
+                <a:lnTo>
+                  <a:pt y="0" x="120000"/>
+                </a:lnTo>
+                <a:lnTo>
+                  <a:pt y="120000" x="120000"/>
+                </a:lnTo>
+                <a:lnTo>
+                  <a:pt y="120000" x="0"/>
+                </a:lnTo>
+                <a:close/>
+              </a:path>
+            </a:pathLst>
+          </a:custGeom>
+        </p:spPr>
+      </p:sp>
+      <p:sp>
+        <p:nvSpPr>
+          <p:cNvPr id="66" name="Shape 66"/>
+          <p:cNvSpPr txBox="1"/>
+          <p:nvPr>
+            <p:ph idx="1" type="body"/>
+          </p:nvPr>
+        </p:nvSpPr>
+        <p:spPr>
+          <a:xfrm>
+            <a:off y="4343400" x="685800"/>
+            <a:ext cy="4114800" cx="5486399"/>
+          </a:xfrm>
+          <a:prstGeom prst="rect">
+            <a:avLst/>
+          </a:prstGeom>
+        </p:spPr>
+        <p:txBody>
+          <a:bodyPr bIns="91425" rIns="91425" lIns="91425" tIns="91425" anchor="t" anchorCtr="0">
+            <a:noAutofit/>
+          </a:bodyPr>
+          <a:lstStyle/>
+          <a:p>
+            <a:pPr>
+              <a:spcBef>
+                <a:spcPts val="0"/>
+              </a:spcBef>
+              <a:buNone/>
+            </a:pPr>
+            <a:r>
+              <a:t/>
+            </a:r>
+            <a:endParaRPr/>
+          </a:p>
+        </p:txBody>
+      </p:sp>
+    </p:spTree>
+  </p:cSld>
+  <p:clrMapOvr>
+    <a:masterClrMapping/>
+  </p:clrMapOvr>
+</p:notes>
+</file>
+
+<file path=ppt/notesSlides/notesSlide6.xml><?xml version="1.0" encoding="utf-8"?>
+<p:notes xmlns:a="http://schemas.openxmlformats.org/drawingml/2006/main" xmlns:r="http://schemas.openxmlformats.org/officeDocument/2006/relationships" xmlns:mc="http://schemas.openxmlformats.org/markup-compatibility/2006" xmlns:mv="urn:schemas-microsoft-com:mac:vml" xmlns:p="http://schemas.openxmlformats.org/presentationml/2006/main" xmlns:c="http://schemas.openxmlformats.org/drawingml/2006/chart" xmlns:dgm="http://schemas.openxmlformats.org/drawingml/2006/diagram" xmlns:o="urn:schemas-microsoft-com:office:office" xmlns:v="urn:schemas-microsoft-com:vml" xmlns:pvml="urn:schemas-microsoft-com:office:powerpoint" xmlns:com="http://schemas.openxmlformats.org/drawingml/2006/compatibility" xmlns:p14="http://schemas.microsoft.com/office/powerpoint/2010/main" showMasterSp="0" showMasterPhAnim="0">
+  <p:cSld>
+    <p:spTree>
+      <p:nvGrpSpPr>
+        <p:cNvPr id="70" name="Shape 70"/>
+        <p:cNvGrpSpPr/>
+        <p:nvPr/>
+      </p:nvGrpSpPr>
+      <p:grpSpPr>
+        <a:xfrm>
+          <a:off y="0" x="0"/>
+          <a:ext cy="0" cx="0"/>
+          <a:chOff y="0" x="0"/>
+          <a:chExt cy="0" cx="0"/>
+        </a:xfrm>
+      </p:grpSpPr>
+      <p:sp>
+        <p:nvSpPr>
+          <p:cNvPr id="71" name="Shape 71"/>
+          <p:cNvSpPr/>
+          <p:nvPr>
+            <p:ph idx="2" type="sldImg"/>
+          </p:nvPr>
+        </p:nvSpPr>
+        <p:spPr>
+          <a:xfrm>
+            <a:off y="685800" x="381187"/>
+            <a:ext cy="3429000" cx="6096299"/>
+          </a:xfrm>
+          <a:custGeom>
+            <a:pathLst>
+              <a:path w="120000" extrusionOk="0" h="120000">
+                <a:moveTo>
+                  <a:pt y="0" x="0"/>
+                </a:moveTo>
+                <a:lnTo>
+                  <a:pt y="0" x="120000"/>
+                </a:lnTo>
+                <a:lnTo>
+                  <a:pt y="120000" x="120000"/>
+                </a:lnTo>
+                <a:lnTo>
+                  <a:pt y="120000" x="0"/>
+                </a:lnTo>
+                <a:close/>
+              </a:path>
+            </a:pathLst>
+          </a:custGeom>
+        </p:spPr>
+      </p:sp>
+      <p:sp>
+        <p:nvSpPr>
+          <p:cNvPr id="72" name="Shape 72"/>
+          <p:cNvSpPr txBox="1"/>
+          <p:nvPr>
+            <p:ph idx="1" type="body"/>
+          </p:nvPr>
+        </p:nvSpPr>
+        <p:spPr>
+          <a:xfrm>
+            <a:off y="4343400" x="685800"/>
+            <a:ext cy="4114800" cx="5486399"/>
+          </a:xfrm>
+          <a:prstGeom prst="rect">
+            <a:avLst/>
+          </a:prstGeom>
+        </p:spPr>
+        <p:txBody>
+          <a:bodyPr bIns="91425" rIns="91425" lIns="91425" tIns="91425" anchor="t" anchorCtr="0">
+            <a:noAutofit/>
+          </a:bodyPr>
+          <a:lstStyle/>
+          <a:p>
+            <a:pPr>
+              <a:spcBef>
+                <a:spcPts val="0"/>
+              </a:spcBef>
+              <a:buNone/>
+            </a:pPr>
+            <a:r>
+              <a:t/>
+            </a:r>
+            <a:endParaRPr/>
+          </a:p>
+        </p:txBody>
+      </p:sp>
+    </p:spTree>
+  </p:cSld>
+  <p:clrMapOvr>
+    <a:masterClrMapping/>
+  </p:clrMapOvr>
+</p:notes>
+</file>
+
+<file path=ppt/notesSlides/notesSlide7.xml><?xml version="1.0" encoding="utf-8"?>
+<p:notes xmlns:a="http://schemas.openxmlformats.org/drawingml/2006/main" xmlns:r="http://schemas.openxmlformats.org/officeDocument/2006/relationships" xmlns:mc="http://schemas.openxmlformats.org/markup-compatibility/2006" xmlns:mv="urn:schemas-microsoft-com:mac:vml" xmlns:p="http://schemas.openxmlformats.org/presentationml/2006/main" xmlns:c="http://schemas.openxmlformats.org/drawingml/2006/chart" xmlns:dgm="http://schemas.openxmlformats.org/drawingml/2006/diagram" xmlns:o="urn:schemas-microsoft-com:office:office" xmlns:v="urn:schemas-microsoft-com:vml" xmlns:pvml="urn:schemas-microsoft-com:office:powerpoint" xmlns:com="http://schemas.openxmlformats.org/drawingml/2006/compatibility" xmlns:p14="http://schemas.microsoft.com/office/powerpoint/2010/main" showMasterSp="0" showMasterPhAnim="0">
+  <p:cSld>
+    <p:spTree>
+      <p:nvGrpSpPr>
+        <p:cNvPr id="77" name="Shape 77"/>
+        <p:cNvGrpSpPr/>
+        <p:nvPr/>
+      </p:nvGrpSpPr>
+      <p:grpSpPr>
+        <a:xfrm>
+          <a:off y="0" x="0"/>
+          <a:ext cy="0" cx="0"/>
+          <a:chOff y="0" x="0"/>
+          <a:chExt cy="0" cx="0"/>
+        </a:xfrm>
+      </p:grpSpPr>
+      <p:sp>
+        <p:nvSpPr>
+          <p:cNvPr id="78" name="Shape 78"/>
+          <p:cNvSpPr/>
+          <p:nvPr>
+            <p:ph idx="2" type="sldImg"/>
+          </p:nvPr>
+        </p:nvSpPr>
+        <p:spPr>
+          <a:xfrm>
+            <a:off y="685800" x="381187"/>
+            <a:ext cy="3429000" cx="6096299"/>
+          </a:xfrm>
+          <a:custGeom>
+            <a:pathLst>
+              <a:path w="120000" extrusionOk="0" h="120000">
+                <a:moveTo>
+                  <a:pt y="0" x="0"/>
+                </a:moveTo>
+                <a:lnTo>
+                  <a:pt y="0" x="120000"/>
+                </a:lnTo>
+                <a:lnTo>
+                  <a:pt y="120000" x="120000"/>
+                </a:lnTo>
+                <a:lnTo>
+                  <a:pt y="120000" x="0"/>
+                </a:lnTo>
+                <a:close/>
+              </a:path>
+            </a:pathLst>
+          </a:custGeom>
+        </p:spPr>
+      </p:sp>
+      <p:sp>
+        <p:nvSpPr>
+          <p:cNvPr id="79" name="Shape 79"/>
           <p:cNvSpPr txBox="1"/>
           <p:nvPr>
             <p:ph idx="1" type="body"/>
@@ -2872,23 +3160,7 @@
                   <a:schemeClr val="dk1"/>
                 </a:solidFill>
               </a:rPr>
-              <a:t> (or </a:t>
-            </a:r>
-            <a:r>
-              <a:rPr u="sng" sz="2400" lang="en">
-                <a:solidFill>
-                  <a:srgbClr val="0000FF"/>
-                </a:solidFill>
-              </a:rPr>
-              <a:t>750g.com</a:t>
-            </a:r>
-            <a:r>
-              <a:rPr sz="2400" lang="en">
-                <a:solidFill>
-                  <a:schemeClr val="dk1"/>
-                </a:solidFill>
-              </a:rPr>
-              <a:t>) and organise them by time of cooking</a:t>
+              <a:t> and organise them by time of cooking</a:t>
             </a:r>
           </a:p>
         </p:txBody>
@@ -3686,7 +3958,7 @@
         </p:nvSpPr>
         <p:spPr>
           <a:xfrm>
-            <a:off y="1045600" x="222300"/>
+            <a:off y="1287225" x="222300"/>
             <a:ext cy="3725699" cx="7327800"/>
           </a:xfrm>
           <a:prstGeom prst="rect">
@@ -3735,7 +4007,7 @@
             </a:pPr>
             <a:r>
               <a:rPr b="1" sz="1200" lang="en"/>
-              <a:t>curl http://www.marmiton.org/recettes/recherche.aspx?aqt=cheesecake –o projet_marmiton </a:t>
+              <a:t>for i in {0..50..10}</a:t>
             </a:r>
           </a:p>
           <a:p>
@@ -3754,8 +4026,8 @@
               <a:buNone/>
             </a:pPr>
             <a:r>
-              <a:rPr sz="1200" lang="en"/>
-              <a:t>→ Retrieve the HTML content of the page result for cheesecake</a:t>
+              <a:rPr b="1" sz="1200" lang="en"/>
+              <a:t>do</a:t>
             </a:r>
           </a:p>
           <a:p>
@@ -3775,11 +4047,7 @@
             </a:pPr>
             <a:r>
               <a:rPr b="1" sz="1200" lang="en"/>
-              <a:t>curl -o page -s http://www.marmiton.org/recettes/recherche.aspx?aqt=$1</a:t>
-            </a:r>
-            <a:r>
-              <a:rPr sz="1200" lang="en"/>
-              <a:t> </a:t>
+              <a:t>curl -s http://www.marmiton.org/recettes/recherche.aspx?aqt=$1\&amp;start=$i &gt;&gt; /tmp/raw</a:t>
             </a:r>
           </a:p>
           <a:p>
@@ -3798,8 +4066,8 @@
               <a:buNone/>
             </a:pPr>
             <a:r>
-              <a:rPr sz="1200" lang="en"/>
-              <a:t>→ Retrieve the HTML content of the page result</a:t>
+              <a:rPr b="1" sz="1200" lang="en"/>
+              <a:t>done</a:t>
             </a:r>
           </a:p>
           <a:p>
@@ -3818,12 +4086,8 @@
               <a:buNone/>
             </a:pPr>
             <a:r>
-              <a:rPr b="1" sz="1200" lang="en"/>
-              <a:t>$ ./marmiton.sh cheesecake</a:t>
-            </a:r>
-            <a:r>
               <a:rPr sz="1200" lang="en"/>
-              <a:t> → Does a curl request on the page result for cheesecake</a:t>
+              <a:t>→ Loop retrieving the HTML content of the first six pages result and stores it in a temp file</a:t>
             </a:r>
           </a:p>
           <a:p>
@@ -3843,11 +4107,7 @@
             </a:pPr>
             <a:r>
               <a:rPr b="1" sz="1200" lang="en"/>
-              <a:t>sed -n -f titles.sed page </a:t>
-            </a:r>
-            <a:r>
-              <a:rPr sz="1200" lang="en"/>
-              <a:t>→ Extract the titles from the HTML retrieved</a:t>
+              <a:t>/.*&lt;div class="m_search_titre_recette"&gt;&lt;a href=.*&gt;\(.*\)&lt;\/a&gt;&lt;\/div&gt;/ { s//\1/p;} </a:t>
             </a:r>
           </a:p>
           <a:p>
@@ -3866,8 +4126,8 @@
               <a:buNone/>
             </a:pPr>
             <a:r>
-              <a:rPr b="1" sz="1200" lang="en"/>
-              <a:t>/.*&lt;div class="m_search_titre_recette"&gt;&lt;a href=.*&gt;\(.*\)&lt;\/a&gt;&lt;\/div&gt;/ { s//\1/p;} </a:t>
+              <a:rPr sz="1200" lang="en"/>
+              <a:t>→ Research in the HTML content the elements corresponding to this regex.Same thing for preparation time, cooking time, type of recipe and votes. Differs from the regex for the number of persons</a:t>
             </a:r>
           </a:p>
           <a:p>
@@ -3886,8 +4146,12 @@
               <a:buNone/>
             </a:pPr>
             <a:r>
+              <a:rPr b="1" sz="1200" lang="en"/>
+              <a:t>...{ s//\1\r\n\2/;H;} g  s/\r\n/;/gp </a:t>
+            </a:r>
+            <a:r>
               <a:rPr sz="1200" lang="en"/>
-              <a:t>→ Research in the HTML content the elements corresponding to this regex</a:t>
+              <a:t>(example)</a:t>
             </a:r>
           </a:p>
           <a:p>
@@ -3906,8 +4170,8 @@
               <a:buNone/>
             </a:pPr>
             <a:r>
-              <a:rPr b="1" sz="1200" lang="en"/>
-              <a:t>/.*&lt;div class="m_search_tps_prepa"&gt;.*&lt;\/strong&gt;\(.*\)&lt;\/div&gt;/ { s//\1/p;} </a:t>
+              <a:rPr sz="1200" lang="en"/>
+              <a:t>→ Use of the hold buffer and pattern buffer via h, H and g</a:t>
             </a:r>
           </a:p>
           <a:p>
@@ -3927,7 +4191,7 @@
             </a:pPr>
             <a:r>
               <a:rPr b="1" sz="1200" lang="en"/>
-              <a:t>/.*&lt;div class="m_search_tps_cuisson"&gt;.*&lt;\/strong&gt;\(.*\)&lt;\/div&gt;/ { s//\1/p;} </a:t>
+              <a:t>sed -n -f total.sed /tmp/raw</a:t>
             </a:r>
           </a:p>
           <a:p>
@@ -3946,8 +4210,8 @@
               <a:buNone/>
             </a:pPr>
             <a:r>
-              <a:rPr b="1" sz="1200" lang="en"/>
-              <a:t>/.*&lt;div class="m_search_type_plat"&gt;\(.*\)&lt;\/div&gt;/ { s//\1/p;} </a:t>
+              <a:rPr sz="1200" lang="en"/>
+              <a:t>→ Extract the wanted data from the HTML retrieved using the total.sed file. total.sed contains every regex</a:t>
             </a:r>
           </a:p>
           <a:p>
@@ -3966,8 +4230,12 @@
               <a:buNone/>
             </a:pPr>
             <a:r>
+              <a:rPr b="1" sz="1200" lang="en"/>
+              <a:t>$ ./marmiton.sh cheesecake</a:t>
+            </a:r>
+            <a:r>
               <a:rPr sz="1200" lang="en"/>
-              <a:t>→ Same thing for preparation time, cooking time, and type of recipe</a:t>
+              <a:t> 2→ Does a curl request on the page result for cheesecake</a:t>
             </a:r>
           </a:p>
           <a:p>
@@ -3981,13 +4249,14 @@
               <a:buClr>
                 <a:schemeClr val="dk1"/>
               </a:buClr>
-              <a:buFont typeface="Arial"/>
-              <a:buNone/>
-            </a:pPr>
-            <a:r>
-              <a:t/>
-            </a:r>
-            <a:endParaRPr sz="1200"/>
+              <a:buSzPct val="91666"/>
+              <a:buFont typeface="Arial"/>
+              <a:buNone/>
+            </a:pPr>
+            <a:r>
+              <a:rPr b="1" sz="1200" lang="en"/>
+              <a:t>sort --field-separator=';' -rn --key=$2 |column -t -s ";" </a:t>
+            </a:r>
           </a:p>
           <a:p>
             <a:pPr rtl="0" lvl="0">
@@ -4000,13 +4269,13 @@
               <a:buClr>
                 <a:schemeClr val="dk1"/>
               </a:buClr>
-              <a:buSzPct val="61111"/>
-              <a:buFont typeface="Arial"/>
-              <a:buNone/>
-            </a:pPr>
-            <a:r>
-              <a:rPr u="sng" b="1" sz="1800" lang="en"/>
-              <a:t>TO DO:</a:t>
+              <a:buSzPct val="91666"/>
+              <a:buFont typeface="Arial"/>
+              <a:buNone/>
+            </a:pPr>
+            <a:r>
+              <a:rPr sz="1200" lang="en"/>
+              <a:t>→ Sort decreasingly the data by votes, separating each element belonging to a certain column by a ‘;’</a:t>
             </a:r>
           </a:p>
           <a:p>
@@ -4020,14 +4289,13 @@
               <a:buClr>
                 <a:schemeClr val="dk1"/>
               </a:buClr>
-              <a:buSzPct val="91666"/>
-              <a:buFont typeface="Arial"/>
-              <a:buNone/>
-            </a:pPr>
-            <a:r>
-              <a:rPr sz="1200" lang="en"/>
-              <a:t>Loop retrieving all the pages corresponding to the results of a recipe search</a:t>
-            </a:r>
+              <a:buFont typeface="Arial"/>
+              <a:buNone/>
+            </a:pPr>
+            <a:r>
+              <a:t/>
+            </a:r>
+            <a:endParaRPr b="1" sz="1200"/>
           </a:p>
           <a:p>
             <a:pPr rtl="0" lvl="0">
@@ -4040,14 +4308,13 @@
               <a:buClr>
                 <a:schemeClr val="dk1"/>
               </a:buClr>
-              <a:buSzPct val="91666"/>
-              <a:buFont typeface="Arial"/>
-              <a:buNone/>
-            </a:pPr>
-            <a:r>
-              <a:rPr sz="1200" lang="en"/>
-              <a:t>Regex for all the informations to retrieve next : number of people</a:t>
-            </a:r>
+              <a:buFont typeface="Arial"/>
+              <a:buNone/>
+            </a:pPr>
+            <a:r>
+              <a:t/>
+            </a:r>
+            <a:endParaRPr sz="1200"/>
           </a:p>
           <a:p>
             <a:pPr rtl="0" lvl="0">
@@ -4060,14 +4327,70 @@
               <a:buClr>
                 <a:schemeClr val="dk1"/>
               </a:buClr>
-              <a:buSzPct val="91666"/>
-              <a:buFont typeface="Arial"/>
-              <a:buNone/>
-            </a:pPr>
-            <a:r>
-              <a:rPr sz="1200" lang="en"/>
-              <a:t>Ask the user : a recipe, the number of guests ...</a:t>
-            </a:r>
+              <a:buFont typeface="Arial"/>
+              <a:buNone/>
+            </a:pPr>
+            <a:r>
+              <a:t/>
+            </a:r>
+            <a:endParaRPr sz="1200"/>
+          </a:p>
+          <a:p>
+            <a:pPr rtl="0" lvl="0">
+              <a:lnSpc>
+                <a:spcPct val="115000"/>
+              </a:lnSpc>
+              <a:spcBef>
+                <a:spcPts val="0"/>
+              </a:spcBef>
+              <a:buClr>
+                <a:schemeClr val="dk1"/>
+              </a:buClr>
+              <a:buFont typeface="Arial"/>
+              <a:buNone/>
+            </a:pPr>
+            <a:r>
+              <a:t/>
+            </a:r>
+            <a:endParaRPr sz="1200"/>
+          </a:p>
+          <a:p>
+            <a:pPr rtl="0" lvl="0">
+              <a:lnSpc>
+                <a:spcPct val="115000"/>
+              </a:lnSpc>
+              <a:spcBef>
+                <a:spcPts val="0"/>
+              </a:spcBef>
+              <a:buClr>
+                <a:schemeClr val="dk1"/>
+              </a:buClr>
+              <a:buFont typeface="Arial"/>
+              <a:buNone/>
+            </a:pPr>
+            <a:r>
+              <a:t/>
+            </a:r>
+            <a:endParaRPr sz="1200"/>
+          </a:p>
+          <a:p>
+            <a:pPr rtl="0" lvl="0">
+              <a:lnSpc>
+                <a:spcPct val="115000"/>
+              </a:lnSpc>
+              <a:spcBef>
+                <a:spcPts val="0"/>
+              </a:spcBef>
+              <a:buClr>
+                <a:schemeClr val="dk1"/>
+              </a:buClr>
+              <a:buFont typeface="Arial"/>
+              <a:buNone/>
+            </a:pPr>
+            <a:r>
+              <a:t/>
+            </a:r>
+            <a:endParaRPr sz="1200"/>
           </a:p>
           <a:p>
             <a:pPr rtl="0" lvl="0">
@@ -4216,6 +4539,805 @@
           <a:xfrm>
             <a:off y="3465450" x="7597237"/>
             <a:ext cy="1053725" cx="1259325"/>
+          </a:xfrm>
+          <a:prstGeom prst="rect">
+            <a:avLst/>
+          </a:prstGeom>
+        </p:spPr>
+      </p:pic>
+    </p:spTree>
+  </p:cSld>
+  <p:clrMapOvr>
+    <a:masterClrMapping/>
+  </p:clrMapOvr>
+  <p:transition spd="slow">
+    <p:cut/>
+  </p:transition>
+</p:sld>
+</file>
+
+<file path=ppt/slides/slide5.xml><?xml version="1.0" encoding="utf-8"?>
+<p:sld xmlns:a="http://schemas.openxmlformats.org/drawingml/2006/main" xmlns:r="http://schemas.openxmlformats.org/officeDocument/2006/relationships" xmlns:mc="http://schemas.openxmlformats.org/markup-compatibility/2006" xmlns:mv="urn:schemas-microsoft-com:mac:vml" xmlns:p="http://schemas.openxmlformats.org/presentationml/2006/main" xmlns:c="http://schemas.openxmlformats.org/drawingml/2006/chart" xmlns:dgm="http://schemas.openxmlformats.org/drawingml/2006/diagram" xmlns:o="urn:schemas-microsoft-com:office:office" xmlns:v="urn:schemas-microsoft-com:vml" xmlns:pvml="urn:schemas-microsoft-com:office:powerpoint" xmlns:com="http://schemas.openxmlformats.org/drawingml/2006/compatibility" xmlns:p14="http://schemas.microsoft.com/office/powerpoint/2010/main">
+  <p:cSld>
+    <p:spTree>
+      <p:nvGrpSpPr>
+        <p:cNvPr id="60" name="Shape 60"/>
+        <p:cNvGrpSpPr/>
+        <p:nvPr/>
+      </p:nvGrpSpPr>
+      <p:grpSpPr>
+        <a:xfrm>
+          <a:off y="0" x="0"/>
+          <a:ext cy="0" cx="0"/>
+          <a:chOff y="0" x="0"/>
+          <a:chExt cy="0" cx="0"/>
+        </a:xfrm>
+      </p:grpSpPr>
+      <p:sp>
+        <p:nvSpPr>
+          <p:cNvPr id="61" name="Shape 61"/>
+          <p:cNvSpPr txBox="1"/>
+          <p:nvPr>
+            <p:ph type="title"/>
+          </p:nvPr>
+        </p:nvSpPr>
+        <p:spPr>
+          <a:xfrm>
+            <a:off y="205978" x="457200"/>
+            <a:ext cy="857400" cx="8229600"/>
+          </a:xfrm>
+          <a:prstGeom prst="rect">
+            <a:avLst/>
+          </a:prstGeom>
+        </p:spPr>
+        <p:txBody>
+          <a:bodyPr bIns="91425" rIns="91425" lIns="91425" tIns="91425" anchor="b" anchorCtr="0">
+            <a:noAutofit/>
+          </a:bodyPr>
+          <a:lstStyle/>
+          <a:p>
+            <a:pPr>
+              <a:spcBef>
+                <a:spcPts val="0"/>
+              </a:spcBef>
+              <a:buNone/>
+            </a:pPr>
+            <a:r>
+              <a:rPr lang="en"/>
+              <a:t>The Script and the regex</a:t>
+            </a:r>
+          </a:p>
+        </p:txBody>
+      </p:sp>
+      <p:sp>
+        <p:nvSpPr>
+          <p:cNvPr id="62" name="Shape 62"/>
+          <p:cNvSpPr txBox="1"/>
+          <p:nvPr>
+            <p:ph idx="1" type="body"/>
+          </p:nvPr>
+        </p:nvSpPr>
+        <p:spPr>
+          <a:xfrm>
+            <a:off y="1117025" x="4514000"/>
+            <a:ext cy="3880200" cx="4132799"/>
+          </a:xfrm>
+          <a:prstGeom prst="rect">
+            <a:avLst/>
+          </a:prstGeom>
+          <a:ln w="9525" cap="flat">
+            <a:solidFill>
+              <a:srgbClr val="000000"/>
+            </a:solidFill>
+            <a:prstDash val="dashDot"/>
+            <a:round/>
+            <a:headEnd w="med" len="med" type="none"/>
+            <a:tailEnd w="med" len="med" type="none"/>
+          </a:ln>
+        </p:spPr>
+        <p:txBody>
+          <a:bodyPr bIns="91425" rIns="91425" lIns="91425" tIns="91425" anchor="t" anchorCtr="0">
+            <a:noAutofit/>
+          </a:bodyPr>
+          <a:lstStyle/>
+          <a:p>
+            <a:pPr rtl="0" lvl="0">
+              <a:spcBef>
+                <a:spcPts val="0"/>
+              </a:spcBef>
+              <a:buClr>
+                <a:schemeClr val="dk1"/>
+              </a:buClr>
+              <a:buSzPct val="100000"/>
+              <a:buFont typeface="Arial"/>
+              <a:buNone/>
+            </a:pPr>
+            <a:r>
+              <a:rPr sz="1100" lang="en"/>
+              <a:t>/.*&lt;div class="m_search_titre_recette"&gt;&lt;a href=.*&gt;\(.*\)&lt;\/a&gt;&lt;\/div&gt;/ { s//\1/;h;}</a:t>
+            </a:r>
+          </a:p>
+          <a:p>
+            <a:pPr rtl="0" lvl="0">
+              <a:spcBef>
+                <a:spcPts val="0"/>
+              </a:spcBef>
+              <a:buClr>
+                <a:schemeClr val="dk1"/>
+              </a:buClr>
+              <a:buSzPct val="100000"/>
+              <a:buFont typeface="Arial"/>
+              <a:buNone/>
+            </a:pPr>
+            <a:r>
+              <a:rPr sz="1100" lang="en"/>
+              <a:t>/.*&lt;div class="m_search_nb_votes"&gt;(\([0-9]*\) vote[s]\{0,1\})&lt;\/div&gt;/ { s//\1/;H;}</a:t>
+            </a:r>
+          </a:p>
+          <a:p>
+            <a:pPr rtl="0" lvl="0">
+              <a:spcBef>
+                <a:spcPts val="0"/>
+              </a:spcBef>
+              <a:buClr>
+                <a:schemeClr val="dk1"/>
+              </a:buClr>
+              <a:buSzPct val="100000"/>
+              <a:buFont typeface="Arial"/>
+              <a:buNone/>
+            </a:pPr>
+            <a:r>
+              <a:rPr sz="1100" lang="en"/>
+              <a:t>/.*&lt;div class="m_search_type_plat"&gt;\(.*\)&lt;\/div&gt;/ { s//\1/;H;}</a:t>
+            </a:r>
+          </a:p>
+          <a:p>
+            <a:pPr rtl="0" lvl="0">
+              <a:spcBef>
+                <a:spcPts val="0"/>
+              </a:spcBef>
+              <a:buClr>
+                <a:schemeClr val="dk1"/>
+              </a:buClr>
+              <a:buSzPct val="100000"/>
+              <a:buFont typeface="Arial"/>
+              <a:buNone/>
+            </a:pPr>
+            <a:r>
+              <a:rPr sz="1100" lang="en"/>
+              <a:t>/.*&lt;div class="m_search_tps_prepa"&gt;.*&lt;\/strong&gt;\([0-9]*\)mn&lt;\/div&gt;/ { s//\1/;H;}</a:t>
+            </a:r>
+          </a:p>
+          <a:p>
+            <a:pPr rtl="0" lvl="0">
+              <a:spcBef>
+                <a:spcPts val="0"/>
+              </a:spcBef>
+              <a:buClr>
+                <a:schemeClr val="dk1"/>
+              </a:buClr>
+              <a:buSzPct val="100000"/>
+              <a:buFont typeface="Arial"/>
+              <a:buNone/>
+            </a:pPr>
+            <a:r>
+              <a:rPr sz="1100" lang="en"/>
+              <a:t>/.*&lt;div class="m_search_tps_cuisson"&gt;.*&lt;\/strong&gt;\([0-9]*\)mn&lt;\/div&gt;/ { s//\1/;H;}</a:t>
+            </a:r>
+          </a:p>
+          <a:p>
+            <a:pPr rtl="0" lvl="0">
+              <a:spcBef>
+                <a:spcPts val="0"/>
+              </a:spcBef>
+              <a:buClr>
+                <a:schemeClr val="dk1"/>
+              </a:buClr>
+              <a:buSzPct val="100000"/>
+              <a:buFont typeface="Arial"/>
+              <a:buNone/>
+            </a:pPr>
+            <a:r>
+              <a:rPr sz="1100" lang="en"/>
+              <a:t>/.*&lt;div class="m_search_result_part4"&gt;/ {</a:t>
+            </a:r>
+          </a:p>
+          <a:p>
+            <a:pPr rtl="0" lvl="0">
+              <a:spcBef>
+                <a:spcPts val="0"/>
+              </a:spcBef>
+              <a:buClr>
+                <a:schemeClr val="dk1"/>
+              </a:buClr>
+              <a:buSzPct val="100000"/>
+              <a:buFont typeface="Arial"/>
+              <a:buNone/>
+            </a:pPr>
+            <a:r>
+              <a:rPr sz="1100" lang="en"/>
+              <a:t>    N</a:t>
+            </a:r>
+          </a:p>
+          <a:p>
+            <a:pPr rtl="0" lvl="0">
+              <a:spcBef>
+                <a:spcPts val="0"/>
+              </a:spcBef>
+              <a:buClr>
+                <a:schemeClr val="dk1"/>
+              </a:buClr>
+              <a:buSzPct val="100000"/>
+              <a:buFont typeface="Arial"/>
+              <a:buNone/>
+            </a:pPr>
+            <a:r>
+              <a:rPr sz="1100" lang="en"/>
+              <a:t>    /.*(pour \([0-9]*\) \(\w*\)).*/{ s//\1\r\n\2/;H;}</a:t>
+            </a:r>
+          </a:p>
+          <a:p>
+            <a:pPr rtl="0" lvl="0">
+              <a:spcBef>
+                <a:spcPts val="0"/>
+              </a:spcBef>
+              <a:buClr>
+                <a:schemeClr val="dk1"/>
+              </a:buClr>
+              <a:buSzPct val="100000"/>
+              <a:buFont typeface="Arial"/>
+              <a:buNone/>
+            </a:pPr>
+            <a:r>
+              <a:rPr sz="1100" lang="en"/>
+              <a:t>    g</a:t>
+            </a:r>
+          </a:p>
+          <a:p>
+            <a:pPr rtl="0" lvl="0">
+              <a:spcBef>
+                <a:spcPts val="0"/>
+              </a:spcBef>
+              <a:buClr>
+                <a:schemeClr val="dk1"/>
+              </a:buClr>
+              <a:buSzPct val="100000"/>
+              <a:buFont typeface="Arial"/>
+              <a:buNone/>
+            </a:pPr>
+            <a:r>
+              <a:rPr sz="1100" lang="en"/>
+              <a:t>    s/\r\n/;/gp</a:t>
+            </a:r>
+          </a:p>
+          <a:p>
+            <a:pPr>
+              <a:spcBef>
+                <a:spcPts val="0"/>
+              </a:spcBef>
+              <a:buNone/>
+            </a:pPr>
+            <a:r>
+              <a:rPr sz="1100" lang="en"/>
+              <a:t>}</a:t>
+            </a:r>
+          </a:p>
+        </p:txBody>
+      </p:sp>
+      <p:sp>
+        <p:nvSpPr>
+          <p:cNvPr id="63" name="Shape 63"/>
+          <p:cNvSpPr txBox="1"/>
+          <p:nvPr>
+            <p:ph idx="2" type="body"/>
+          </p:nvPr>
+        </p:nvSpPr>
+        <p:spPr>
+          <a:xfrm>
+            <a:off y="1469825" x="457200"/>
+            <a:ext cy="3174600" cx="3994500"/>
+          </a:xfrm>
+          <a:prstGeom prst="rect">
+            <a:avLst/>
+          </a:prstGeom>
+          <a:ln w="9525" cap="flat">
+            <a:solidFill>
+              <a:srgbClr val="000000"/>
+            </a:solidFill>
+            <a:prstDash val="solid"/>
+            <a:round/>
+            <a:headEnd w="med" len="med" type="none"/>
+            <a:tailEnd w="med" len="med" type="none"/>
+          </a:ln>
+        </p:spPr>
+        <p:txBody>
+          <a:bodyPr bIns="91425" rIns="91425" lIns="91425" tIns="91425" anchor="t" anchorCtr="0">
+            <a:noAutofit/>
+          </a:bodyPr>
+          <a:lstStyle/>
+          <a:p>
+            <a:pPr rtl="0" lvl="0">
+              <a:spcBef>
+                <a:spcPts val="0"/>
+              </a:spcBef>
+              <a:buClr>
+                <a:schemeClr val="dk1"/>
+              </a:buClr>
+              <a:buSzPct val="100000"/>
+              <a:buFont typeface="Arial"/>
+              <a:buNone/>
+            </a:pPr>
+            <a:r>
+              <a:rPr sz="1100" lang="en"/>
+              <a:t>#!/bin/bash</a:t>
+            </a:r>
+          </a:p>
+          <a:p>
+            <a:pPr rtl="0" lvl="0">
+              <a:spcBef>
+                <a:spcPts val="0"/>
+              </a:spcBef>
+              <a:buClr>
+                <a:schemeClr val="dk1"/>
+              </a:buClr>
+              <a:buFont typeface="Arial"/>
+              <a:buNone/>
+            </a:pPr>
+            <a:r>
+              <a:t/>
+            </a:r>
+            <a:endParaRPr sz="1100"/>
+          </a:p>
+          <a:p>
+            <a:pPr rtl="0" lvl="0">
+              <a:spcBef>
+                <a:spcPts val="0"/>
+              </a:spcBef>
+              <a:buClr>
+                <a:schemeClr val="dk1"/>
+              </a:buClr>
+              <a:buSzPct val="100000"/>
+              <a:buFont typeface="Arial"/>
+              <a:buNone/>
+            </a:pPr>
+            <a:r>
+              <a:rPr sz="1100" lang="en"/>
+              <a:t>rm /tmp/raw</a:t>
+            </a:r>
+          </a:p>
+          <a:p>
+            <a:pPr rtl="0" lvl="0">
+              <a:spcBef>
+                <a:spcPts val="0"/>
+              </a:spcBef>
+              <a:buClr>
+                <a:schemeClr val="dk1"/>
+              </a:buClr>
+              <a:buSzPct val="100000"/>
+              <a:buFont typeface="Arial"/>
+              <a:buNone/>
+            </a:pPr>
+            <a:r>
+              <a:rPr sz="1100" lang="en"/>
+              <a:t>touch /tmp/raw</a:t>
+            </a:r>
+          </a:p>
+          <a:p>
+            <a:pPr rtl="0" lvl="0">
+              <a:spcBef>
+                <a:spcPts val="0"/>
+              </a:spcBef>
+              <a:buClr>
+                <a:schemeClr val="dk1"/>
+              </a:buClr>
+              <a:buSzPct val="100000"/>
+              <a:buFont typeface="Arial"/>
+              <a:buNone/>
+            </a:pPr>
+            <a:r>
+              <a:rPr sz="1100" lang="en"/>
+              <a:t>for i in {0..50..10}</a:t>
+            </a:r>
+          </a:p>
+          <a:p>
+            <a:pPr rtl="0" lvl="0">
+              <a:spcBef>
+                <a:spcPts val="0"/>
+              </a:spcBef>
+              <a:buClr>
+                <a:schemeClr val="dk1"/>
+              </a:buClr>
+              <a:buSzPct val="100000"/>
+              <a:buFont typeface="Arial"/>
+              <a:buNone/>
+            </a:pPr>
+            <a:r>
+              <a:rPr sz="1100" lang="en"/>
+              <a:t>do</a:t>
+            </a:r>
+          </a:p>
+          <a:p>
+            <a:pPr rtl="0" lvl="0">
+              <a:spcBef>
+                <a:spcPts val="0"/>
+              </a:spcBef>
+              <a:buClr>
+                <a:schemeClr val="dk1"/>
+              </a:buClr>
+              <a:buSzPct val="100000"/>
+              <a:buFont typeface="Arial"/>
+              <a:buNone/>
+            </a:pPr>
+            <a:r>
+              <a:rPr sz="1100" lang="en"/>
+              <a:t>    curl -s http://www.marmiton.org/recettes/recherche.aspx?aqt=$1\&amp;start=$i &gt;&gt; /tmp/raw</a:t>
+            </a:r>
+          </a:p>
+          <a:p>
+            <a:pPr rtl="0" lvl="0">
+              <a:spcBef>
+                <a:spcPts val="0"/>
+              </a:spcBef>
+              <a:buClr>
+                <a:schemeClr val="dk1"/>
+              </a:buClr>
+              <a:buSzPct val="100000"/>
+              <a:buFont typeface="Arial"/>
+              <a:buNone/>
+            </a:pPr>
+            <a:r>
+              <a:rPr sz="1100" lang="en"/>
+              <a:t>done</a:t>
+            </a:r>
+          </a:p>
+          <a:p>
+            <a:pPr rtl="0" lvl="0">
+              <a:spcBef>
+                <a:spcPts val="0"/>
+              </a:spcBef>
+              <a:buClr>
+                <a:schemeClr val="dk1"/>
+              </a:buClr>
+              <a:buSzPct val="100000"/>
+              <a:buFont typeface="Arial"/>
+              <a:buNone/>
+            </a:pPr>
+            <a:r>
+              <a:rPr sz="1100" lang="en"/>
+              <a:t># Extract data from the HTML page</a:t>
+            </a:r>
+          </a:p>
+          <a:p>
+            <a:pPr rtl="0" lvl="0">
+              <a:spcBef>
+                <a:spcPts val="0"/>
+              </a:spcBef>
+              <a:buClr>
+                <a:schemeClr val="dk1"/>
+              </a:buClr>
+              <a:buSzPct val="100000"/>
+              <a:buFont typeface="Arial"/>
+              <a:buNone/>
+            </a:pPr>
+            <a:r>
+              <a:rPr sz="1100" lang="en"/>
+              <a:t>sed -n -f total.sed /tmp/raw | sort --field-separator=';' -rn --key=$2 |column -t -s ";"</a:t>
+            </a:r>
+          </a:p>
+          <a:p>
+            <a:pPr>
+              <a:spcBef>
+                <a:spcPts val="0"/>
+              </a:spcBef>
+              <a:buNone/>
+            </a:pPr>
+            <a:r>
+              <a:t/>
+            </a:r>
+            <a:endParaRPr sz="1100"/>
+          </a:p>
+        </p:txBody>
+      </p:sp>
+    </p:spTree>
+  </p:cSld>
+  <p:clrMapOvr>
+    <a:masterClrMapping/>
+  </p:clrMapOvr>
+  <p:transition spd="slow">
+    <p:cut/>
+  </p:transition>
+</p:sld>
+</file>
+
+<file path=ppt/slides/slide6.xml><?xml version="1.0" encoding="utf-8"?>
+<p:sld xmlns:a="http://schemas.openxmlformats.org/drawingml/2006/main" xmlns:r="http://schemas.openxmlformats.org/officeDocument/2006/relationships" xmlns:mc="http://schemas.openxmlformats.org/markup-compatibility/2006" xmlns:mv="urn:schemas-microsoft-com:mac:vml" xmlns:p="http://schemas.openxmlformats.org/presentationml/2006/main" xmlns:c="http://schemas.openxmlformats.org/drawingml/2006/chart" xmlns:dgm="http://schemas.openxmlformats.org/drawingml/2006/diagram" xmlns:o="urn:schemas-microsoft-com:office:office" xmlns:v="urn:schemas-microsoft-com:vml" xmlns:pvml="urn:schemas-microsoft-com:office:powerpoint" xmlns:com="http://schemas.openxmlformats.org/drawingml/2006/compatibility" xmlns:p14="http://schemas.microsoft.com/office/powerpoint/2010/main">
+  <p:cSld>
+    <p:spTree>
+      <p:nvGrpSpPr>
+        <p:cNvPr id="67" name="Shape 67"/>
+        <p:cNvGrpSpPr/>
+        <p:nvPr/>
+      </p:nvGrpSpPr>
+      <p:grpSpPr>
+        <a:xfrm>
+          <a:off y="0" x="0"/>
+          <a:ext cy="0" cx="0"/>
+          <a:chOff y="0" x="0"/>
+          <a:chExt cy="0" cx="0"/>
+        </a:xfrm>
+      </p:grpSpPr>
+      <p:sp>
+        <p:nvSpPr>
+          <p:cNvPr id="68" name="Shape 68"/>
+          <p:cNvSpPr txBox="1"/>
+          <p:nvPr>
+            <p:ph type="title"/>
+          </p:nvPr>
+        </p:nvSpPr>
+        <p:spPr>
+          <a:xfrm>
+            <a:off y="205978" x="457200"/>
+            <a:ext cy="857400" cx="8229600"/>
+          </a:xfrm>
+          <a:prstGeom prst="rect">
+            <a:avLst/>
+          </a:prstGeom>
+        </p:spPr>
+        <p:txBody>
+          <a:bodyPr bIns="91425" rIns="91425" lIns="91425" tIns="91425" anchor="b" anchorCtr="0">
+            <a:noAutofit/>
+          </a:bodyPr>
+          <a:lstStyle/>
+          <a:p>
+            <a:pPr>
+              <a:spcBef>
+                <a:spcPts val="0"/>
+              </a:spcBef>
+              <a:buNone/>
+            </a:pPr>
+            <a:r>
+              <a:rPr lang="en"/>
+              <a:t>Script using cheesecake </a:t>
+            </a:r>
+          </a:p>
+        </p:txBody>
+      </p:sp>
+      <p:pic>
+        <p:nvPicPr>
+          <p:cNvPr id="69" name="Shape 69"/>
+          <p:cNvPicPr preferRelativeResize="0"/>
+          <p:nvPr/>
+        </p:nvPicPr>
+        <p:blipFill rotWithShape="1">
+          <a:blip r:embed="rId3"/>
+          <a:srcRect t="10108" b="2371" r="1806" l="0"/>
+          <a:stretch/>
+        </p:blipFill>
+        <p:spPr>
+          <a:xfrm>
+            <a:off y="1258150" x="672450"/>
+            <a:ext cy="3429849" cx="7799098"/>
+          </a:xfrm>
+          <a:prstGeom prst="rect">
+            <a:avLst/>
+          </a:prstGeom>
+          <a:noFill/>
+          <a:ln>
+            <a:noFill/>
+          </a:ln>
+        </p:spPr>
+      </p:pic>
+    </p:spTree>
+  </p:cSld>
+  <p:clrMapOvr>
+    <a:masterClrMapping/>
+  </p:clrMapOvr>
+  <p:transition spd="slow">
+    <p:cut/>
+  </p:transition>
+</p:sld>
+</file>
+
+<file path=ppt/slides/slide7.xml><?xml version="1.0" encoding="utf-8"?>
+<p:sld xmlns:a="http://schemas.openxmlformats.org/drawingml/2006/main" xmlns:r="http://schemas.openxmlformats.org/officeDocument/2006/relationships" xmlns:mc="http://schemas.openxmlformats.org/markup-compatibility/2006" xmlns:mv="urn:schemas-microsoft-com:mac:vml" xmlns:p="http://schemas.openxmlformats.org/presentationml/2006/main" xmlns:c="http://schemas.openxmlformats.org/drawingml/2006/chart" xmlns:dgm="http://schemas.openxmlformats.org/drawingml/2006/diagram" xmlns:o="urn:schemas-microsoft-com:office:office" xmlns:v="urn:schemas-microsoft-com:vml" xmlns:pvml="urn:schemas-microsoft-com:office:powerpoint" xmlns:com="http://schemas.openxmlformats.org/drawingml/2006/compatibility" xmlns:p14="http://schemas.microsoft.com/office/powerpoint/2010/main">
+  <p:cSld>
+    <p:spTree>
+      <p:nvGrpSpPr>
+        <p:cNvPr id="73" name="Shape 73"/>
+        <p:cNvGrpSpPr/>
+        <p:nvPr/>
+      </p:nvGrpSpPr>
+      <p:grpSpPr>
+        <a:xfrm>
+          <a:off y="0" x="0"/>
+          <a:ext cy="0" cx="0"/>
+          <a:chOff y="0" x="0"/>
+          <a:chExt cy="0" cx="0"/>
+        </a:xfrm>
+      </p:grpSpPr>
+      <p:sp>
+        <p:nvSpPr>
+          <p:cNvPr id="74" name="Shape 74"/>
+          <p:cNvSpPr txBox="1"/>
+          <p:nvPr>
+            <p:ph type="title"/>
+          </p:nvPr>
+        </p:nvSpPr>
+        <p:spPr>
+          <a:xfrm>
+            <a:off y="205978" x="457200"/>
+            <a:ext cy="857400" cx="8229600"/>
+          </a:xfrm>
+          <a:prstGeom prst="rect">
+            <a:avLst/>
+          </a:prstGeom>
+        </p:spPr>
+        <p:txBody>
+          <a:bodyPr bIns="91425" rIns="91425" lIns="91425" tIns="91425" anchor="b" anchorCtr="0">
+            <a:noAutofit/>
+          </a:bodyPr>
+          <a:lstStyle/>
+          <a:p>
+            <a:pPr rtl="0" lvl="0">
+              <a:spcBef>
+                <a:spcPts val="0"/>
+              </a:spcBef>
+              <a:buNone/>
+            </a:pPr>
+            <a:r>
+              <a:rPr lang="en"/>
+              <a:t>Progress status (phase 3)</a:t>
+            </a:r>
+          </a:p>
+        </p:txBody>
+      </p:sp>
+      <p:sp>
+        <p:nvSpPr>
+          <p:cNvPr id="75" name="Shape 75"/>
+          <p:cNvSpPr txBox="1"/>
+          <p:nvPr>
+            <p:ph idx="1" type="body"/>
+          </p:nvPr>
+        </p:nvSpPr>
+        <p:spPr>
+          <a:xfrm>
+            <a:off y="1200150" x="1986975"/>
+            <a:ext cy="3725699" cx="6852300"/>
+          </a:xfrm>
+          <a:prstGeom prst="rect">
+            <a:avLst/>
+          </a:prstGeom>
+        </p:spPr>
+        <p:txBody>
+          <a:bodyPr bIns="91425" rIns="91425" lIns="91425" tIns="91425" anchor="t" anchorCtr="0">
+            <a:noAutofit/>
+          </a:bodyPr>
+          <a:lstStyle/>
+          <a:p>
+            <a:pPr rtl="0" lvl="0">
+              <a:lnSpc>
+                <a:spcPct val="115000"/>
+              </a:lnSpc>
+              <a:spcBef>
+                <a:spcPts val="0"/>
+              </a:spcBef>
+              <a:buNone/>
+            </a:pPr>
+            <a:r>
+              <a:t/>
+            </a:r>
+            <a:endParaRPr sz="1200"/>
+          </a:p>
+          <a:p>
+            <a:pPr rtl="0" lvl="0" indent="-317500" marL="457200">
+              <a:lnSpc>
+                <a:spcPct val="115000"/>
+              </a:lnSpc>
+              <a:spcBef>
+                <a:spcPts val="0"/>
+              </a:spcBef>
+              <a:buClr>
+                <a:schemeClr val="dk1"/>
+              </a:buClr>
+              <a:buSzPct val="100000"/>
+              <a:buFont typeface="Arial"/>
+              <a:buChar char="●"/>
+            </a:pPr>
+            <a:r>
+              <a:rPr sz="1400" lang="en"/>
+              <a:t>Start the script using only ./marmiton.sh instead of ./marmiton.sh baguette 2 for example </a:t>
+            </a:r>
+            <a:r>
+              <a:rPr sz="1400" lang="en" i="1"/>
+              <a:t>(it’s mandatory to enter 2 arguments alongside ./marmiton.sh before launching the script)</a:t>
+            </a:r>
+          </a:p>
+          <a:p>
+            <a:pPr rtl="0" lvl="0" indent="-317500" marL="457200">
+              <a:lnSpc>
+                <a:spcPct val="115000"/>
+              </a:lnSpc>
+              <a:spcBef>
+                <a:spcPts val="0"/>
+              </a:spcBef>
+              <a:buClr>
+                <a:schemeClr val="dk1"/>
+              </a:buClr>
+              <a:buSzPct val="100000"/>
+              <a:buFont typeface="Arial"/>
+              <a:buChar char="●"/>
+            </a:pPr>
+            <a:r>
+              <a:rPr sz="1400" lang="en"/>
+              <a:t>Ask the user : a recipe or the number of guests … </a:t>
+            </a:r>
+            <a:r>
+              <a:rPr sz="1400" lang="en" i="1"/>
+              <a:t>(using echo and read commands)</a:t>
+            </a:r>
+          </a:p>
+          <a:p>
+            <a:pPr rtl="0" lvl="0" indent="-317500" marL="457200">
+              <a:lnSpc>
+                <a:spcPct val="115000"/>
+              </a:lnSpc>
+              <a:spcBef>
+                <a:spcPts val="0"/>
+              </a:spcBef>
+              <a:buClr>
+                <a:schemeClr val="dk1"/>
+              </a:buClr>
+              <a:buSzPct val="100000"/>
+              <a:buFont typeface="Arial"/>
+              <a:buChar char="●"/>
+            </a:pPr>
+            <a:r>
+              <a:rPr sz="1400" lang="en"/>
+              <a:t>Ask the user how he wants to sort the results </a:t>
+            </a:r>
+            <a:r>
+              <a:rPr sz="1400" lang="en" i="1"/>
+              <a:t>(using case)</a:t>
+            </a:r>
+          </a:p>
+          <a:p>
+            <a:pPr rtl="0" lvl="0" indent="-317500" marL="457200">
+              <a:lnSpc>
+                <a:spcPct val="115000"/>
+              </a:lnSpc>
+              <a:spcBef>
+                <a:spcPts val="0"/>
+              </a:spcBef>
+              <a:buClr>
+                <a:schemeClr val="dk1"/>
+              </a:buClr>
+              <a:buSzPct val="100000"/>
+              <a:buFont typeface="Arial"/>
+              <a:buChar char="●"/>
+            </a:pPr>
+            <a:r>
+              <a:rPr sz="1400" lang="en"/>
+              <a:t>Add up preparation time and cooking time in order to ask how much time the user has to cook</a:t>
+            </a:r>
+          </a:p>
+        </p:txBody>
+      </p:sp>
+      <p:pic>
+        <p:nvPicPr>
+          <p:cNvPr id="76" name="Shape 76"/>
+          <p:cNvPicPr preferRelativeResize="0"/>
+          <p:nvPr/>
+        </p:nvPicPr>
+        <p:blipFill>
+          <a:blip r:embed="rId3"/>
+          <a:stretch>
+            <a:fillRect/>
+          </a:stretch>
+        </p:blipFill>
+        <p:spPr>
+          <a:xfrm>
+            <a:off y="1256425" x="219950"/>
+            <a:ext cy="1430900" cx="1614624"/>
           </a:xfrm>
           <a:prstGeom prst="rect">
             <a:avLst/>

</xml_diff>

<commit_message>
modify marmiton.sh + project explanations + powerpoint
</commit_message>
<xml_diff>
--- a/projects/marmiton/Marmiton_project.pptx
+++ b/projects/marmiton/Marmiton_project.pptx
@@ -752,7 +752,7 @@
   <p:cSld>
     <p:spTree>
       <p:nvGrpSpPr>
-        <p:cNvPr id="64" name="Shape 64"/>
+        <p:cNvPr id="63" name="Shape 63"/>
         <p:cNvGrpSpPr/>
         <p:nvPr/>
       </p:nvGrpSpPr>
@@ -766,7 +766,7 @@
       </p:grpSpPr>
       <p:sp>
         <p:nvSpPr>
-          <p:cNvPr id="65" name="Shape 65"/>
+          <p:cNvPr id="64" name="Shape 64"/>
           <p:cNvSpPr/>
           <p:nvPr>
             <p:ph idx="2" type="sldImg"/>
@@ -800,7 +800,7 @@
       </p:sp>
       <p:sp>
         <p:nvSpPr>
-          <p:cNvPr id="66" name="Shape 66"/>
+          <p:cNvPr id="65" name="Shape 65"/>
           <p:cNvSpPr txBox="1"/>
           <p:nvPr>
             <p:ph idx="1" type="body"/>
@@ -847,7 +847,7 @@
   <p:cSld>
     <p:spTree>
       <p:nvGrpSpPr>
-        <p:cNvPr id="70" name="Shape 70"/>
+        <p:cNvPr id="69" name="Shape 69"/>
         <p:cNvGrpSpPr/>
         <p:nvPr/>
       </p:nvGrpSpPr>
@@ -861,7 +861,7 @@
       </p:grpSpPr>
       <p:sp>
         <p:nvSpPr>
-          <p:cNvPr id="71" name="Shape 71"/>
+          <p:cNvPr id="70" name="Shape 70"/>
           <p:cNvSpPr/>
           <p:nvPr>
             <p:ph idx="2" type="sldImg"/>
@@ -895,7 +895,7 @@
       </p:sp>
       <p:sp>
         <p:nvSpPr>
-          <p:cNvPr id="72" name="Shape 72"/>
+          <p:cNvPr id="71" name="Shape 71"/>
           <p:cNvSpPr txBox="1"/>
           <p:nvPr>
             <p:ph idx="1" type="body"/>
@@ -942,7 +942,7 @@
   <p:cSld>
     <p:spTree>
       <p:nvGrpSpPr>
-        <p:cNvPr id="77" name="Shape 77"/>
+        <p:cNvPr id="76" name="Shape 76"/>
         <p:cNvGrpSpPr/>
         <p:nvPr/>
       </p:nvGrpSpPr>
@@ -956,7 +956,7 @@
       </p:grpSpPr>
       <p:sp>
         <p:nvSpPr>
-          <p:cNvPr id="78" name="Shape 78"/>
+          <p:cNvPr id="77" name="Shape 77"/>
           <p:cNvSpPr/>
           <p:nvPr>
             <p:ph idx="2" type="sldImg"/>
@@ -990,7 +990,7 @@
       </p:sp>
       <p:sp>
         <p:nvSpPr>
-          <p:cNvPr id="79" name="Shape 79"/>
+          <p:cNvPr id="78" name="Shape 78"/>
           <p:cNvSpPr txBox="1"/>
           <p:nvPr>
             <p:ph idx="1" type="body"/>
@@ -3958,7 +3958,7 @@
         </p:nvSpPr>
         <p:spPr>
           <a:xfrm>
-            <a:off y="1287225" x="222300"/>
+            <a:off y="1202000" x="269450"/>
             <a:ext cy="3725699" cx="7327800"/>
           </a:xfrm>
           <a:prstGeom prst="rect">
@@ -4001,12 +4001,12 @@
               <a:buClr>
                 <a:schemeClr val="dk1"/>
               </a:buClr>
-              <a:buSzPct val="91666"/>
+              <a:buSzPct val="78571"/>
               <a:buFont typeface="Arial"/>
               <a:buNone/>
             </a:pPr>
             <a:r>
-              <a:rPr b="1" sz="1200" lang="en"/>
+              <a:rPr b="1" sz="1400" lang="en"/>
               <a:t>for i in {0..50..10}</a:t>
             </a:r>
           </a:p>
@@ -4021,12 +4021,12 @@
               <a:buClr>
                 <a:schemeClr val="dk1"/>
               </a:buClr>
-              <a:buSzPct val="91666"/>
+              <a:buSzPct val="78571"/>
               <a:buFont typeface="Arial"/>
               <a:buNone/>
             </a:pPr>
             <a:r>
-              <a:rPr b="1" sz="1200" lang="en"/>
+              <a:rPr b="1" sz="1400" lang="en"/>
               <a:t>do</a:t>
             </a:r>
           </a:p>
@@ -4041,12 +4041,12 @@
               <a:buClr>
                 <a:schemeClr val="dk1"/>
               </a:buClr>
-              <a:buSzPct val="91666"/>
+              <a:buSzPct val="78571"/>
               <a:buFont typeface="Arial"/>
               <a:buNone/>
             </a:pPr>
             <a:r>
-              <a:rPr b="1" sz="1200" lang="en"/>
+              <a:rPr b="1" sz="1400" lang="en"/>
               <a:t>curl -s http://www.marmiton.org/recettes/recherche.aspx?aqt=$1\&amp;start=$i &gt;&gt; /tmp/raw</a:t>
             </a:r>
           </a:p>
@@ -4061,12 +4061,12 @@
               <a:buClr>
                 <a:schemeClr val="dk1"/>
               </a:buClr>
-              <a:buSzPct val="91666"/>
+              <a:buSzPct val="78571"/>
               <a:buFont typeface="Arial"/>
               <a:buNone/>
             </a:pPr>
             <a:r>
-              <a:rPr b="1" sz="1200" lang="en"/>
+              <a:rPr b="1" sz="1400" lang="en"/>
               <a:t>done</a:t>
             </a:r>
           </a:p>
@@ -4081,12 +4081,12 @@
               <a:buClr>
                 <a:schemeClr val="dk1"/>
               </a:buClr>
-              <a:buSzPct val="91666"/>
+              <a:buSzPct val="78571"/>
               <a:buFont typeface="Arial"/>
               <a:buNone/>
             </a:pPr>
             <a:r>
-              <a:rPr sz="1200" lang="en"/>
+              <a:rPr sz="1400" lang="en"/>
               <a:t>→ Loop retrieving the HTML content of the first six pages result and stores it in a temp file</a:t>
             </a:r>
           </a:p>
@@ -4101,12 +4101,12 @@
               <a:buClr>
                 <a:schemeClr val="dk1"/>
               </a:buClr>
-              <a:buSzPct val="91666"/>
+              <a:buSzPct val="78571"/>
               <a:buFont typeface="Arial"/>
               <a:buNone/>
             </a:pPr>
             <a:r>
-              <a:rPr b="1" sz="1200" lang="en"/>
+              <a:rPr b="1" sz="1400" lang="en"/>
               <a:t>/.*&lt;div class="m_search_titre_recette"&gt;&lt;a href=.*&gt;\(.*\)&lt;\/a&gt;&lt;\/div&gt;/ { s//\1/p;} </a:t>
             </a:r>
           </a:p>
@@ -4121,12 +4121,12 @@
               <a:buClr>
                 <a:schemeClr val="dk1"/>
               </a:buClr>
-              <a:buSzPct val="91666"/>
+              <a:buSzPct val="78571"/>
               <a:buFont typeface="Arial"/>
               <a:buNone/>
             </a:pPr>
             <a:r>
-              <a:rPr sz="1200" lang="en"/>
+              <a:rPr sz="1400" lang="en"/>
               <a:t>→ Research in the HTML content the elements corresponding to this regex.Same thing for preparation time, cooking time, type of recipe and votes. Differs from the regex for the number of persons</a:t>
             </a:r>
           </a:p>
@@ -4141,16 +4141,16 @@
               <a:buClr>
                 <a:schemeClr val="dk1"/>
               </a:buClr>
-              <a:buSzPct val="91666"/>
+              <a:buSzPct val="78571"/>
               <a:buFont typeface="Arial"/>
               <a:buNone/>
             </a:pPr>
             <a:r>
-              <a:rPr b="1" sz="1200" lang="en"/>
+              <a:rPr b="1" sz="1400" lang="en"/>
               <a:t>...{ s//\1\r\n\2/;H;} g  s/\r\n/;/gp </a:t>
             </a:r>
             <a:r>
-              <a:rPr sz="1200" lang="en"/>
+              <a:rPr sz="1400" lang="en"/>
               <a:t>(example)</a:t>
             </a:r>
           </a:p>
@@ -4165,137 +4165,14 @@
               <a:buClr>
                 <a:schemeClr val="dk1"/>
               </a:buClr>
-              <a:buSzPct val="91666"/>
+              <a:buSzPct val="78571"/>
               <a:buFont typeface="Arial"/>
               <a:buNone/>
             </a:pPr>
             <a:r>
-              <a:rPr sz="1200" lang="en"/>
+              <a:rPr sz="1400" lang="en"/>
               <a:t>→ Use of the hold buffer and pattern buffer via h, H and g</a:t>
             </a:r>
-          </a:p>
-          <a:p>
-            <a:pPr rtl="0" lvl="0">
-              <a:lnSpc>
-                <a:spcPct val="115000"/>
-              </a:lnSpc>
-              <a:spcBef>
-                <a:spcPts val="0"/>
-              </a:spcBef>
-              <a:buClr>
-                <a:schemeClr val="dk1"/>
-              </a:buClr>
-              <a:buSzPct val="91666"/>
-              <a:buFont typeface="Arial"/>
-              <a:buNone/>
-            </a:pPr>
-            <a:r>
-              <a:rPr b="1" sz="1200" lang="en"/>
-              <a:t>sed -n -f total.sed /tmp/raw</a:t>
-            </a:r>
-          </a:p>
-          <a:p>
-            <a:pPr rtl="0" lvl="0">
-              <a:lnSpc>
-                <a:spcPct val="115000"/>
-              </a:lnSpc>
-              <a:spcBef>
-                <a:spcPts val="0"/>
-              </a:spcBef>
-              <a:buClr>
-                <a:schemeClr val="dk1"/>
-              </a:buClr>
-              <a:buSzPct val="91666"/>
-              <a:buFont typeface="Arial"/>
-              <a:buNone/>
-            </a:pPr>
-            <a:r>
-              <a:rPr sz="1200" lang="en"/>
-              <a:t>→ Extract the wanted data from the HTML retrieved using the total.sed file. total.sed contains every regex</a:t>
-            </a:r>
-          </a:p>
-          <a:p>
-            <a:pPr rtl="0" lvl="0">
-              <a:lnSpc>
-                <a:spcPct val="115000"/>
-              </a:lnSpc>
-              <a:spcBef>
-                <a:spcPts val="0"/>
-              </a:spcBef>
-              <a:buClr>
-                <a:schemeClr val="dk1"/>
-              </a:buClr>
-              <a:buSzPct val="91666"/>
-              <a:buFont typeface="Arial"/>
-              <a:buNone/>
-            </a:pPr>
-            <a:r>
-              <a:rPr b="1" sz="1200" lang="en"/>
-              <a:t>$ ./marmiton.sh cheesecake</a:t>
-            </a:r>
-            <a:r>
-              <a:rPr sz="1200" lang="en"/>
-              <a:t> 2→ Does a curl request on the page result for cheesecake</a:t>
-            </a:r>
-          </a:p>
-          <a:p>
-            <a:pPr rtl="0" lvl="0">
-              <a:lnSpc>
-                <a:spcPct val="115000"/>
-              </a:lnSpc>
-              <a:spcBef>
-                <a:spcPts val="0"/>
-              </a:spcBef>
-              <a:buClr>
-                <a:schemeClr val="dk1"/>
-              </a:buClr>
-              <a:buSzPct val="91666"/>
-              <a:buFont typeface="Arial"/>
-              <a:buNone/>
-            </a:pPr>
-            <a:r>
-              <a:rPr b="1" sz="1200" lang="en"/>
-              <a:t>sort --field-separator=';' -rn --key=$2 |column -t -s ";" </a:t>
-            </a:r>
-          </a:p>
-          <a:p>
-            <a:pPr rtl="0" lvl="0">
-              <a:lnSpc>
-                <a:spcPct val="115000"/>
-              </a:lnSpc>
-              <a:spcBef>
-                <a:spcPts val="0"/>
-              </a:spcBef>
-              <a:buClr>
-                <a:schemeClr val="dk1"/>
-              </a:buClr>
-              <a:buSzPct val="91666"/>
-              <a:buFont typeface="Arial"/>
-              <a:buNone/>
-            </a:pPr>
-            <a:r>
-              <a:rPr sz="1200" lang="en"/>
-              <a:t>→ Sort decreasingly the data by votes, separating each element belonging to a certain column by a ‘;’</a:t>
-            </a:r>
-          </a:p>
-          <a:p>
-            <a:pPr rtl="0" lvl="0">
-              <a:lnSpc>
-                <a:spcPct val="115000"/>
-              </a:lnSpc>
-              <a:spcBef>
-                <a:spcPts val="0"/>
-              </a:spcBef>
-              <a:buClr>
-                <a:schemeClr val="dk1"/>
-              </a:buClr>
-              <a:buFont typeface="Arial"/>
-              <a:buNone/>
-            </a:pPr>
-            <a:r>
-              <a:t/>
-            </a:r>
-            <a:endParaRPr b="1" sz="1200"/>
           </a:p>
           <a:p>
             <a:pPr rtl="0" lvl="0">
@@ -4604,7 +4481,7 @@
             </a:pPr>
             <a:r>
               <a:rPr lang="en"/>
-              <a:t>The Script and the regex</a:t>
+              <a:t>Progress status (phase 2)</a:t>
             </a:r>
           </a:p>
         </p:txBody>
@@ -4619,21 +4496,12 @@
         </p:nvSpPr>
         <p:spPr>
           <a:xfrm>
-            <a:off y="1117025" x="4514000"/>
-            <a:ext cy="3880200" cx="4132799"/>
+            <a:off y="1212025" x="457200"/>
+            <a:ext cy="3725699" cx="8229600"/>
           </a:xfrm>
           <a:prstGeom prst="rect">
             <a:avLst/>
           </a:prstGeom>
-          <a:ln w="9525" cap="flat">
-            <a:solidFill>
-              <a:srgbClr val="000000"/>
-            </a:solidFill>
-            <a:prstDash val="dashDot"/>
-            <a:round/>
-            <a:headEnd w="med" len="med" type="none"/>
-            <a:tailEnd w="med" len="med" type="none"/>
-          </a:ln>
         </p:spPr>
         <p:txBody>
           <a:bodyPr bIns="91425" rIns="91425" lIns="91425" tIns="91425" anchor="t" anchorCtr="0">
@@ -4642,399 +4510,317 @@
           <a:lstStyle/>
           <a:p>
             <a:pPr rtl="0" lvl="0">
+              <a:lnSpc>
+                <a:spcPct val="115000"/>
+              </a:lnSpc>
+              <a:spcBef>
+                <a:spcPts val="0"/>
+              </a:spcBef>
+              <a:buNone/>
+            </a:pPr>
+            <a:r>
+              <a:rPr u="sng" b="1" sz="1800" lang="en"/>
+              <a:t>DONE:</a:t>
+            </a:r>
+          </a:p>
+          <a:p>
+            <a:pPr rtl="0" lvl="0">
+              <a:lnSpc>
+                <a:spcPct val="115000"/>
+              </a:lnSpc>
               <a:spcBef>
                 <a:spcPts val="0"/>
               </a:spcBef>
               <a:buClr>
                 <a:schemeClr val="dk1"/>
               </a:buClr>
-              <a:buSzPct val="100000"/>
+              <a:buSzPct val="91666"/>
               <a:buFont typeface="Arial"/>
               <a:buNone/>
             </a:pPr>
             <a:r>
-              <a:rPr sz="1100" lang="en"/>
-              <a:t>/.*&lt;div class="m_search_titre_recette"&gt;&lt;a href=.*&gt;\(.*\)&lt;\/a&gt;&lt;\/div&gt;/ { s//\1/;h;}</a:t>
+              <a:rPr b="1" sz="1200" lang="en"/>
+              <a:t>sed -n -f total.sed /tmp/raw</a:t>
             </a:r>
           </a:p>
           <a:p>
             <a:pPr rtl="0" lvl="0">
+              <a:lnSpc>
+                <a:spcPct val="115000"/>
+              </a:lnSpc>
               <a:spcBef>
                 <a:spcPts val="0"/>
               </a:spcBef>
               <a:buClr>
                 <a:schemeClr val="dk1"/>
               </a:buClr>
-              <a:buSzPct val="100000"/>
+              <a:buSzPct val="91666"/>
               <a:buFont typeface="Arial"/>
               <a:buNone/>
             </a:pPr>
             <a:r>
-              <a:rPr sz="1100" lang="en"/>
-              <a:t>/.*&lt;div class="m_search_nb_votes"&gt;(\([0-9]*\) vote[s]\{0,1\})&lt;\/div&gt;/ { s//\1/;H;}</a:t>
+              <a:rPr sz="1200" lang="en"/>
+              <a:t>→ Extract the wanted data from the HTML retrieved using the total.sed file. total.sed contains every regex</a:t>
             </a:r>
           </a:p>
           <a:p>
             <a:pPr rtl="0" lvl="0">
+              <a:lnSpc>
+                <a:spcPct val="115000"/>
+              </a:lnSpc>
               <a:spcBef>
                 <a:spcPts val="0"/>
               </a:spcBef>
               <a:buClr>
                 <a:schemeClr val="dk1"/>
               </a:buClr>
-              <a:buSzPct val="100000"/>
+              <a:buSzPct val="91666"/>
               <a:buFont typeface="Arial"/>
               <a:buNone/>
             </a:pPr>
             <a:r>
-              <a:rPr sz="1100" lang="en"/>
-              <a:t>/.*&lt;div class="m_search_type_plat"&gt;\(.*\)&lt;\/div&gt;/ { s//\1/;H;}</a:t>
+              <a:rPr b="1" sz="1200" lang="en"/>
+              <a:t>$ ./marmiton.sh cheesecake</a:t>
+            </a:r>
+            <a:r>
+              <a:rPr sz="1200" lang="en"/>
+              <a:t> 2→ Does a curl request on the page result for cheesecake</a:t>
             </a:r>
           </a:p>
           <a:p>
             <a:pPr rtl="0" lvl="0">
+              <a:lnSpc>
+                <a:spcPct val="115000"/>
+              </a:lnSpc>
               <a:spcBef>
                 <a:spcPts val="0"/>
               </a:spcBef>
               <a:buClr>
                 <a:schemeClr val="dk1"/>
               </a:buClr>
-              <a:buSzPct val="100000"/>
+              <a:buSzPct val="91666"/>
               <a:buFont typeface="Arial"/>
               <a:buNone/>
             </a:pPr>
             <a:r>
-              <a:rPr sz="1100" lang="en"/>
-              <a:t>/.*&lt;div class="m_search_tps_prepa"&gt;.*&lt;\/strong&gt;\([0-9]*\)mn&lt;\/div&gt;/ { s//\1/;H;}</a:t>
+              <a:rPr b="1" sz="1200" lang="en"/>
+              <a:t>sort --field-separator=';' -rn --key=$2 |column -t -s ";" </a:t>
             </a:r>
           </a:p>
           <a:p>
             <a:pPr rtl="0" lvl="0">
+              <a:lnSpc>
+                <a:spcPct val="115000"/>
+              </a:lnSpc>
               <a:spcBef>
                 <a:spcPts val="0"/>
               </a:spcBef>
               <a:buClr>
                 <a:schemeClr val="dk1"/>
               </a:buClr>
-              <a:buSzPct val="100000"/>
+              <a:buSzPct val="91666"/>
               <a:buFont typeface="Arial"/>
               <a:buNone/>
             </a:pPr>
             <a:r>
-              <a:rPr sz="1100" lang="en"/>
-              <a:t>/.*&lt;div class="m_search_tps_cuisson"&gt;.*&lt;\/strong&gt;\([0-9]*\)mn&lt;\/div&gt;/ { s//\1/;H;}</a:t>
+              <a:rPr sz="1200" lang="en"/>
+              <a:t>→ Sort decreasingly the data by votes, separating each element belonging to a certain column by a ‘;’</a:t>
             </a:r>
           </a:p>
           <a:p>
             <a:pPr rtl="0" lvl="0">
+              <a:lnSpc>
+                <a:spcPct val="115000"/>
+              </a:lnSpc>
+              <a:spcBef>
+                <a:spcPts val="0"/>
+              </a:spcBef>
+              <a:buNone/>
+            </a:pPr>
+            <a:r>
+              <a:rPr b="1" sz="1200" lang="en"/>
+              <a:t>echo "What recipe are you searching for? :"       </a:t>
+            </a:r>
+          </a:p>
+          <a:p>
+            <a:pPr rtl="0" lvl="0">
+              <a:lnSpc>
+                <a:spcPct val="115000"/>
+              </a:lnSpc>
               <a:spcBef>
                 <a:spcPts val="0"/>
               </a:spcBef>
               <a:buClr>
                 <a:schemeClr val="dk1"/>
               </a:buClr>
-              <a:buSzPct val="100000"/>
+              <a:buSzPct val="91666"/>
               <a:buFont typeface="Arial"/>
               <a:buNone/>
             </a:pPr>
             <a:r>
-              <a:rPr sz="1100" lang="en"/>
-              <a:t>/.*&lt;div class="m_search_result_part4"&gt;/ {</a:t>
+              <a:rPr b="1" sz="1200" lang="en"/>
+              <a:t>read recipe</a:t>
             </a:r>
           </a:p>
           <a:p>
             <a:pPr rtl="0" lvl="0">
+              <a:lnSpc>
+                <a:spcPct val="115000"/>
+              </a:lnSpc>
+              <a:spcBef>
+                <a:spcPts val="0"/>
+              </a:spcBef>
+              <a:buNone/>
+            </a:pPr>
+            <a:r>
+              <a:rPr sz="1200" lang="en"/>
+              <a:t>→ Ask the user to type in the thing he wants to prepare. Read retrieves the words</a:t>
+            </a:r>
+          </a:p>
+          <a:p>
+            <a:pPr rtl="0" lvl="0">
+              <a:lnSpc>
+                <a:spcPct val="115000"/>
+              </a:lnSpc>
               <a:spcBef>
                 <a:spcPts val="0"/>
               </a:spcBef>
               <a:buClr>
                 <a:schemeClr val="dk1"/>
               </a:buClr>
-              <a:buSzPct val="100000"/>
+              <a:buSzPct val="91666"/>
               <a:buFont typeface="Arial"/>
               <a:buNone/>
             </a:pPr>
             <a:r>
-              <a:rPr sz="1100" lang="en"/>
-              <a:t>    N</a:t>
+              <a:rPr b="1" sz="1200" lang="en"/>
+              <a:t>case $num in</a:t>
             </a:r>
           </a:p>
           <a:p>
             <a:pPr rtl="0" lvl="0">
+              <a:lnSpc>
+                <a:spcPct val="115000"/>
+              </a:lnSpc>
               <a:spcBef>
                 <a:spcPts val="0"/>
               </a:spcBef>
               <a:buClr>
                 <a:schemeClr val="dk1"/>
               </a:buClr>
-              <a:buSzPct val="100000"/>
+              <a:buSzPct val="91666"/>
               <a:buFont typeface="Arial"/>
               <a:buNone/>
             </a:pPr>
             <a:r>
-              <a:rPr sz="1100" lang="en"/>
-              <a:t>    /.*(pour \([0-9]*\) \(\w*\)).*/{ s//\1\r\n\2/;H;}</a:t>
+              <a:rPr b="1" sz="1200" lang="en"/>
+              <a:t>    1)</a:t>
             </a:r>
           </a:p>
           <a:p>
             <a:pPr rtl="0" lvl="0">
+              <a:lnSpc>
+                <a:spcPct val="115000"/>
+              </a:lnSpc>
               <a:spcBef>
                 <a:spcPts val="0"/>
               </a:spcBef>
               <a:buClr>
                 <a:schemeClr val="dk1"/>
               </a:buClr>
-              <a:buSzPct val="100000"/>
+              <a:buSzPct val="91666"/>
               <a:buFont typeface="Arial"/>
               <a:buNone/>
             </a:pPr>
             <a:r>
-              <a:rPr sz="1100" lang="en"/>
-              <a:t>    g</a:t>
+              <a:rPr b="1" sz="1200" lang="en"/>
+              <a:t>   	 sed -n -f total.sed /tmp/raw | sort --field-separator=';' --key=1 |column -t -s ";"</a:t>
             </a:r>
           </a:p>
           <a:p>
             <a:pPr rtl="0" lvl="0">
+              <a:lnSpc>
+                <a:spcPct val="115000"/>
+              </a:lnSpc>
               <a:spcBef>
                 <a:spcPts val="0"/>
               </a:spcBef>
               <a:buClr>
                 <a:schemeClr val="dk1"/>
               </a:buClr>
-              <a:buSzPct val="100000"/>
+              <a:buSzPct val="91666"/>
               <a:buFont typeface="Arial"/>
               <a:buNone/>
             </a:pPr>
             <a:r>
-              <a:rPr sz="1100" lang="en"/>
-              <a:t>    s/\r\n/;/gp</a:t>
-            </a:r>
-          </a:p>
-          <a:p>
-            <a:pPr>
-              <a:spcBef>
-                <a:spcPts val="0"/>
-              </a:spcBef>
-              <a:buNone/>
-            </a:pPr>
-            <a:r>
-              <a:rPr sz="1100" lang="en"/>
-              <a:t>}</a:t>
-            </a:r>
-          </a:p>
-        </p:txBody>
-      </p:sp>
-      <p:sp>
-        <p:nvSpPr>
-          <p:cNvPr id="63" name="Shape 63"/>
-          <p:cNvSpPr txBox="1"/>
-          <p:nvPr>
-            <p:ph idx="2" type="body"/>
-          </p:nvPr>
-        </p:nvSpPr>
-        <p:spPr>
-          <a:xfrm>
-            <a:off y="1469825" x="457200"/>
-            <a:ext cy="3174600" cx="3994500"/>
-          </a:xfrm>
-          <a:prstGeom prst="rect">
-            <a:avLst/>
-          </a:prstGeom>
-          <a:ln w="9525" cap="flat">
-            <a:solidFill>
-              <a:srgbClr val="000000"/>
-            </a:solidFill>
-            <a:prstDash val="solid"/>
-            <a:round/>
-            <a:headEnd w="med" len="med" type="none"/>
-            <a:tailEnd w="med" len="med" type="none"/>
-          </a:ln>
-        </p:spPr>
-        <p:txBody>
-          <a:bodyPr bIns="91425" rIns="91425" lIns="91425" tIns="91425" anchor="t" anchorCtr="0">
-            <a:noAutofit/>
-          </a:bodyPr>
-          <a:lstStyle/>
+              <a:rPr b="1" sz="1200" lang="en"/>
+              <a:t>   	 ;;</a:t>
+            </a:r>
+          </a:p>
           <a:p>
             <a:pPr rtl="0" lvl="0">
+              <a:lnSpc>
+                <a:spcPct val="115000"/>
+              </a:lnSpc>
               <a:spcBef>
                 <a:spcPts val="0"/>
               </a:spcBef>
               <a:buClr>
                 <a:schemeClr val="dk1"/>
               </a:buClr>
-              <a:buSzPct val="100000"/>
+              <a:buSzPct val="91666"/>
               <a:buFont typeface="Arial"/>
               <a:buNone/>
             </a:pPr>
             <a:r>
-              <a:rPr sz="1100" lang="en"/>
-              <a:t>#!/bin/bash</a:t>
+              <a:rPr b="1" sz="1200" lang="en"/>
+              <a:t>    2)</a:t>
             </a:r>
           </a:p>
           <a:p>
             <a:pPr rtl="0" lvl="0">
-              <a:spcBef>
-                <a:spcPts val="0"/>
-              </a:spcBef>
-              <a:buClr>
-                <a:schemeClr val="dk1"/>
-              </a:buClr>
-              <a:buFont typeface="Arial"/>
-              <a:buNone/>
-            </a:pPr>
-            <a:r>
-              <a:t/>
-            </a:r>
-            <a:endParaRPr sz="1100"/>
+              <a:lnSpc>
+                <a:spcPct val="115000"/>
+              </a:lnSpc>
+              <a:spcBef>
+                <a:spcPts val="0"/>
+              </a:spcBef>
+              <a:buNone/>
+            </a:pPr>
+            <a:r>
+              <a:rPr b="1" sz="1200" lang="en"/>
+              <a:t>   	 …</a:t>
+            </a:r>
           </a:p>
           <a:p>
             <a:pPr rtl="0" lvl="0">
-              <a:spcBef>
-                <a:spcPts val="0"/>
-              </a:spcBef>
-              <a:buClr>
-                <a:schemeClr val="dk1"/>
-              </a:buClr>
-              <a:buSzPct val="100000"/>
-              <a:buFont typeface="Arial"/>
-              <a:buNone/>
-            </a:pPr>
-            <a:r>
-              <a:rPr sz="1100" lang="en"/>
-              <a:t>rm /tmp/raw</a:t>
+              <a:lnSpc>
+                <a:spcPct val="115000"/>
+              </a:lnSpc>
+              <a:spcBef>
+                <a:spcPts val="0"/>
+              </a:spcBef>
+              <a:buNone/>
+            </a:pPr>
+            <a:r>
+              <a:rPr b="1" sz="1200" lang="en"/>
+              <a:t>esac</a:t>
             </a:r>
           </a:p>
           <a:p>
             <a:pPr rtl="0" lvl="0">
-              <a:spcBef>
-                <a:spcPts val="0"/>
-              </a:spcBef>
-              <a:buClr>
-                <a:schemeClr val="dk1"/>
-              </a:buClr>
-              <a:buSzPct val="100000"/>
-              <a:buFont typeface="Arial"/>
-              <a:buNone/>
-            </a:pPr>
-            <a:r>
-              <a:rPr sz="1100" lang="en"/>
-              <a:t>touch /tmp/raw</a:t>
-            </a:r>
-          </a:p>
-          <a:p>
-            <a:pPr rtl="0" lvl="0">
-              <a:spcBef>
-                <a:spcPts val="0"/>
-              </a:spcBef>
-              <a:buClr>
-                <a:schemeClr val="dk1"/>
-              </a:buClr>
-              <a:buSzPct val="100000"/>
-              <a:buFont typeface="Arial"/>
-              <a:buNone/>
-            </a:pPr>
-            <a:r>
-              <a:rPr sz="1100" lang="en"/>
-              <a:t>for i in {0..50..10}</a:t>
-            </a:r>
-          </a:p>
-          <a:p>
-            <a:pPr rtl="0" lvl="0">
-              <a:spcBef>
-                <a:spcPts val="0"/>
-              </a:spcBef>
-              <a:buClr>
-                <a:schemeClr val="dk1"/>
-              </a:buClr>
-              <a:buSzPct val="100000"/>
-              <a:buFont typeface="Arial"/>
-              <a:buNone/>
-            </a:pPr>
-            <a:r>
-              <a:rPr sz="1100" lang="en"/>
-              <a:t>do</a:t>
-            </a:r>
-          </a:p>
-          <a:p>
-            <a:pPr rtl="0" lvl="0">
-              <a:spcBef>
-                <a:spcPts val="0"/>
-              </a:spcBef>
-              <a:buClr>
-                <a:schemeClr val="dk1"/>
-              </a:buClr>
-              <a:buSzPct val="100000"/>
-              <a:buFont typeface="Arial"/>
-              <a:buNone/>
-            </a:pPr>
-            <a:r>
-              <a:rPr sz="1100" lang="en"/>
-              <a:t>    curl -s http://www.marmiton.org/recettes/recherche.aspx?aqt=$1\&amp;start=$i &gt;&gt; /tmp/raw</a:t>
-            </a:r>
-          </a:p>
-          <a:p>
-            <a:pPr rtl="0" lvl="0">
-              <a:spcBef>
-                <a:spcPts val="0"/>
-              </a:spcBef>
-              <a:buClr>
-                <a:schemeClr val="dk1"/>
-              </a:buClr>
-              <a:buSzPct val="100000"/>
-              <a:buFont typeface="Arial"/>
-              <a:buNone/>
-            </a:pPr>
-            <a:r>
-              <a:rPr sz="1100" lang="en"/>
-              <a:t>done</a:t>
-            </a:r>
-          </a:p>
-          <a:p>
-            <a:pPr rtl="0" lvl="0">
-              <a:spcBef>
-                <a:spcPts val="0"/>
-              </a:spcBef>
-              <a:buClr>
-                <a:schemeClr val="dk1"/>
-              </a:buClr>
-              <a:buSzPct val="100000"/>
-              <a:buFont typeface="Arial"/>
-              <a:buNone/>
-            </a:pPr>
-            <a:r>
-              <a:rPr sz="1100" lang="en"/>
-              <a:t># Extract data from the HTML page</a:t>
-            </a:r>
-          </a:p>
-          <a:p>
-            <a:pPr rtl="0" lvl="0">
-              <a:spcBef>
-                <a:spcPts val="0"/>
-              </a:spcBef>
-              <a:buClr>
-                <a:schemeClr val="dk1"/>
-              </a:buClr>
-              <a:buSzPct val="100000"/>
-              <a:buFont typeface="Arial"/>
-              <a:buNone/>
-            </a:pPr>
-            <a:r>
-              <a:rPr sz="1100" lang="en"/>
-              <a:t>sed -n -f total.sed /tmp/raw | sort --field-separator=';' -rn --key=$2 |column -t -s ";"</a:t>
-            </a:r>
-          </a:p>
-          <a:p>
-            <a:pPr>
-              <a:spcBef>
-                <a:spcPts val="0"/>
-              </a:spcBef>
-              <a:buNone/>
-            </a:pPr>
-            <a:r>
-              <a:t/>
-            </a:r>
-            <a:endParaRPr sz="1100"/>
+              <a:lnSpc>
+                <a:spcPct val="115000"/>
+              </a:lnSpc>
+              <a:spcBef>
+                <a:spcPts val="0"/>
+              </a:spcBef>
+              <a:buNone/>
+            </a:pPr>
+            <a:r>
+              <a:rPr sz="1200" lang="en"/>
+              <a:t>→ According to what the user wanted to sort by, it launches the right command</a:t>
+            </a:r>
           </a:p>
         </p:txBody>
       </p:sp>
@@ -5054,7 +4840,7 @@
   <p:cSld>
     <p:spTree>
       <p:nvGrpSpPr>
-        <p:cNvPr id="67" name="Shape 67"/>
+        <p:cNvPr id="66" name="Shape 66"/>
         <p:cNvGrpSpPr/>
         <p:nvPr/>
       </p:nvGrpSpPr>
@@ -5068,7 +4854,7 @@
       </p:grpSpPr>
       <p:sp>
         <p:nvSpPr>
-          <p:cNvPr id="68" name="Shape 68"/>
+          <p:cNvPr id="67" name="Shape 67"/>
           <p:cNvSpPr txBox="1"/>
           <p:nvPr>
             <p:ph type="title"/>
@@ -5097,26 +4883,26 @@
             </a:pPr>
             <a:r>
               <a:rPr lang="en"/>
-              <a:t>Script using cheesecake </a:t>
+              <a:t>Script using baguette</a:t>
             </a:r>
           </a:p>
         </p:txBody>
       </p:sp>
       <p:pic>
         <p:nvPicPr>
-          <p:cNvPr id="69" name="Shape 69"/>
+          <p:cNvPr id="68" name="Shape 68"/>
           <p:cNvPicPr preferRelativeResize="0"/>
           <p:nvPr/>
         </p:nvPicPr>
         <p:blipFill rotWithShape="1">
           <a:blip r:embed="rId3"/>
-          <a:srcRect t="10108" b="2371" r="1806" l="0"/>
+          <a:srcRect t="0" b="23699" r="0" l="0"/>
           <a:stretch/>
         </p:blipFill>
         <p:spPr>
           <a:xfrm>
-            <a:off y="1258150" x="672450"/>
-            <a:ext cy="3429849" cx="7799098"/>
+            <a:off y="1144675" x="279950"/>
+            <a:ext cy="3924499" cx="8584099"/>
           </a:xfrm>
           <a:prstGeom prst="rect">
             <a:avLst/>
@@ -5143,7 +4929,7 @@
   <p:cSld>
     <p:spTree>
       <p:nvGrpSpPr>
-        <p:cNvPr id="73" name="Shape 73"/>
+        <p:cNvPr id="72" name="Shape 72"/>
         <p:cNvGrpSpPr/>
         <p:nvPr/>
       </p:nvGrpSpPr>
@@ -5157,7 +4943,7 @@
       </p:grpSpPr>
       <p:sp>
         <p:nvSpPr>
-          <p:cNvPr id="74" name="Shape 74"/>
+          <p:cNvPr id="73" name="Shape 73"/>
           <p:cNvSpPr txBox="1"/>
           <p:nvPr>
             <p:ph type="title"/>
@@ -5193,7 +4979,7 @@
       </p:sp>
       <p:sp>
         <p:nvSpPr>
-          <p:cNvPr id="75" name="Shape 75"/>
+          <p:cNvPr id="74" name="Shape 74"/>
           <p:cNvSpPr txBox="1"/>
           <p:nvPr>
             <p:ph idx="1" type="body"/>
@@ -5226,7 +5012,7 @@
             <a:r>
               <a:t/>
             </a:r>
-            <a:endParaRPr sz="1200"/>
+            <a:endParaRPr sz="1400" i="1"/>
           </a:p>
           <a:p>
             <a:pPr rtl="0" lvl="0" indent="-317500" marL="457200">
@@ -5245,78 +5031,6 @@
             </a:pPr>
             <a:r>
               <a:rPr sz="1400" lang="en"/>
-              <a:t>Start the script using only ./marmiton.sh instead of ./marmiton.sh baguette 2 for example </a:t>
-            </a:r>
-            <a:r>
-              <a:rPr sz="1400" lang="en" i="1"/>
-              <a:t>(it’s mandatory to enter 2 arguments alongside ./marmiton.sh before launching the script)</a:t>
-            </a:r>
-          </a:p>
-          <a:p>
-            <a:pPr rtl="0" lvl="0" indent="-317500" marL="457200">
-              <a:lnSpc>
-                <a:spcPct val="115000"/>
-              </a:lnSpc>
-              <a:spcBef>
-                <a:spcPts val="0"/>
-              </a:spcBef>
-              <a:buClr>
-                <a:schemeClr val="dk1"/>
-              </a:buClr>
-              <a:buSzPct val="100000"/>
-              <a:buFont typeface="Arial"/>
-              <a:buChar char="●"/>
-            </a:pPr>
-            <a:r>
-              <a:rPr sz="1400" lang="en"/>
-              <a:t>Ask the user : a recipe or the number of guests … </a:t>
-            </a:r>
-            <a:r>
-              <a:rPr sz="1400" lang="en" i="1"/>
-              <a:t>(using echo and read commands)</a:t>
-            </a:r>
-          </a:p>
-          <a:p>
-            <a:pPr rtl="0" lvl="0" indent="-317500" marL="457200">
-              <a:lnSpc>
-                <a:spcPct val="115000"/>
-              </a:lnSpc>
-              <a:spcBef>
-                <a:spcPts val="0"/>
-              </a:spcBef>
-              <a:buClr>
-                <a:schemeClr val="dk1"/>
-              </a:buClr>
-              <a:buSzPct val="100000"/>
-              <a:buFont typeface="Arial"/>
-              <a:buChar char="●"/>
-            </a:pPr>
-            <a:r>
-              <a:rPr sz="1400" lang="en"/>
-              <a:t>Ask the user how he wants to sort the results </a:t>
-            </a:r>
-            <a:r>
-              <a:rPr sz="1400" lang="en" i="1"/>
-              <a:t>(using case)</a:t>
-            </a:r>
-          </a:p>
-          <a:p>
-            <a:pPr rtl="0" lvl="0" indent="-317500" marL="457200">
-              <a:lnSpc>
-                <a:spcPct val="115000"/>
-              </a:lnSpc>
-              <a:spcBef>
-                <a:spcPts val="0"/>
-              </a:spcBef>
-              <a:buClr>
-                <a:schemeClr val="dk1"/>
-              </a:buClr>
-              <a:buSzPct val="100000"/>
-              <a:buFont typeface="Arial"/>
-              <a:buChar char="●"/>
-            </a:pPr>
-            <a:r>
-              <a:rPr sz="1400" lang="en"/>
               <a:t>Add up preparation time and cooking time in order to ask how much time the user has to cook</a:t>
             </a:r>
           </a:p>
@@ -5324,7 +5038,7 @@
       </p:sp>
       <p:pic>
         <p:nvPicPr>
-          <p:cNvPr id="76" name="Shape 76"/>
+          <p:cNvPr id="75" name="Shape 75"/>
           <p:cNvPicPr preferRelativeResize="0"/>
           <p:nvPr/>
         </p:nvPicPr>

</xml_diff>

<commit_message>
modify powerpoint, update script marmiton.sh, add while question in qsts_sys_ex.txt, update project explanations in Système_exploitation.txt
</commit_message>
<xml_diff>
--- a/projects/marmiton/Marmiton_project.pptx
+++ b/projects/marmiton/Marmiton_project.pptx
@@ -15,6 +15,9 @@
     <p:sldId id="260" r:id="rId10"/>
     <p:sldId id="261" r:id="rId11"/>
     <p:sldId id="262" r:id="rId12"/>
+    <p:sldId id="263" r:id="rId13"/>
+    <p:sldId id="264" r:id="rId14"/>
+    <p:sldId id="265" r:id="rId15"/>
   </p:sldIdLst>
   <p:sldSz cy="5143500" cx="9144000"/>
   <p:notesSz cy="9144000" cx="6858000"/>
@@ -462,6 +465,101 @@
 </p:notes>
 </file>
 
+<file path=ppt/notesSlides/notesSlide10.xml><?xml version="1.0" encoding="utf-8"?>
+<p:notes xmlns:a="http://schemas.openxmlformats.org/drawingml/2006/main" xmlns:r="http://schemas.openxmlformats.org/officeDocument/2006/relationships" xmlns:mc="http://schemas.openxmlformats.org/markup-compatibility/2006" xmlns:mv="urn:schemas-microsoft-com:mac:vml" xmlns:p="http://schemas.openxmlformats.org/presentationml/2006/main" xmlns:c="http://schemas.openxmlformats.org/drawingml/2006/chart" xmlns:dgm="http://schemas.openxmlformats.org/drawingml/2006/diagram" xmlns:o="urn:schemas-microsoft-com:office:office" xmlns:v="urn:schemas-microsoft-com:vml" xmlns:pvml="urn:schemas-microsoft-com:office:powerpoint" xmlns:com="http://schemas.openxmlformats.org/drawingml/2006/compatibility" xmlns:p14="http://schemas.microsoft.com/office/powerpoint/2010/main" showMasterSp="0" showMasterPhAnim="0">
+  <p:cSld>
+    <p:spTree>
+      <p:nvGrpSpPr>
+        <p:cNvPr id="100" name="Shape 100"/>
+        <p:cNvGrpSpPr/>
+        <p:nvPr/>
+      </p:nvGrpSpPr>
+      <p:grpSpPr>
+        <a:xfrm>
+          <a:off y="0" x="0"/>
+          <a:ext cy="0" cx="0"/>
+          <a:chOff y="0" x="0"/>
+          <a:chExt cy="0" cx="0"/>
+        </a:xfrm>
+      </p:grpSpPr>
+      <p:sp>
+        <p:nvSpPr>
+          <p:cNvPr id="101" name="Shape 101"/>
+          <p:cNvSpPr/>
+          <p:nvPr>
+            <p:ph idx="2" type="sldImg"/>
+          </p:nvPr>
+        </p:nvSpPr>
+        <p:spPr>
+          <a:xfrm>
+            <a:off y="685800" x="381187"/>
+            <a:ext cy="3429000" cx="6096299"/>
+          </a:xfrm>
+          <a:custGeom>
+            <a:pathLst>
+              <a:path w="120000" extrusionOk="0" h="120000">
+                <a:moveTo>
+                  <a:pt y="0" x="0"/>
+                </a:moveTo>
+                <a:lnTo>
+                  <a:pt y="0" x="120000"/>
+                </a:lnTo>
+                <a:lnTo>
+                  <a:pt y="120000" x="120000"/>
+                </a:lnTo>
+                <a:lnTo>
+                  <a:pt y="120000" x="0"/>
+                </a:lnTo>
+                <a:close/>
+              </a:path>
+            </a:pathLst>
+          </a:custGeom>
+        </p:spPr>
+      </p:sp>
+      <p:sp>
+        <p:nvSpPr>
+          <p:cNvPr id="102" name="Shape 102"/>
+          <p:cNvSpPr txBox="1"/>
+          <p:nvPr>
+            <p:ph idx="1" type="body"/>
+          </p:nvPr>
+        </p:nvSpPr>
+        <p:spPr>
+          <a:xfrm>
+            <a:off y="4343400" x="685800"/>
+            <a:ext cy="4114800" cx="5486399"/>
+          </a:xfrm>
+          <a:prstGeom prst="rect">
+            <a:avLst/>
+          </a:prstGeom>
+        </p:spPr>
+        <p:txBody>
+          <a:bodyPr bIns="91425" rIns="91425" lIns="91425" tIns="91425" anchor="t" anchorCtr="0">
+            <a:noAutofit/>
+          </a:bodyPr>
+          <a:lstStyle/>
+          <a:p>
+            <a:pPr>
+              <a:spcBef>
+                <a:spcPts val="0"/>
+              </a:spcBef>
+              <a:buNone/>
+            </a:pPr>
+            <a:r>
+              <a:t/>
+            </a:r>
+            <a:endParaRPr/>
+          </a:p>
+        </p:txBody>
+      </p:sp>
+    </p:spTree>
+  </p:cSld>
+  <p:clrMapOvr>
+    <a:masterClrMapping/>
+  </p:clrMapOvr>
+</p:notes>
+</file>
+
 <file path=ppt/notesSlides/notesSlide2.xml><?xml version="1.0" encoding="utf-8"?>
 <p:notes xmlns:a="http://schemas.openxmlformats.org/drawingml/2006/main" xmlns:r="http://schemas.openxmlformats.org/officeDocument/2006/relationships" xmlns:mc="http://schemas.openxmlformats.org/markup-compatibility/2006" xmlns:mv="urn:schemas-microsoft-com:mac:vml" xmlns:p="http://schemas.openxmlformats.org/presentationml/2006/main" xmlns:c="http://schemas.openxmlformats.org/drawingml/2006/chart" xmlns:dgm="http://schemas.openxmlformats.org/drawingml/2006/diagram" xmlns:o="urn:schemas-microsoft-com:office:office" xmlns:v="urn:schemas-microsoft-com:vml" xmlns:pvml="urn:schemas-microsoft-com:office:powerpoint" xmlns:com="http://schemas.openxmlformats.org/drawingml/2006/compatibility" xmlns:p14="http://schemas.microsoft.com/office/powerpoint/2010/main" showMasterSp="0" showMasterPhAnim="0">
   <p:cSld>
@@ -562,7 +660,7 @@
   <p:cSld>
     <p:spTree>
       <p:nvGrpSpPr>
-        <p:cNvPr id="49" name="Shape 49"/>
+        <p:cNvPr id="53" name="Shape 53"/>
         <p:cNvGrpSpPr/>
         <p:nvPr/>
       </p:nvGrpSpPr>
@@ -576,7 +674,7 @@
       </p:grpSpPr>
       <p:sp>
         <p:nvSpPr>
-          <p:cNvPr id="50" name="Shape 50"/>
+          <p:cNvPr id="54" name="Shape 54"/>
           <p:cNvSpPr/>
           <p:nvPr>
             <p:ph idx="2" type="sldImg"/>
@@ -610,7 +708,7 @@
       </p:sp>
       <p:sp>
         <p:nvSpPr>
-          <p:cNvPr id="51" name="Shape 51"/>
+          <p:cNvPr id="55" name="Shape 55"/>
           <p:cNvSpPr txBox="1"/>
           <p:nvPr>
             <p:ph idx="1" type="body"/>
@@ -657,7 +755,7 @@
   <p:cSld>
     <p:spTree>
       <p:nvGrpSpPr>
-        <p:cNvPr id="57" name="Shape 57"/>
+        <p:cNvPr id="60" name="Shape 60"/>
         <p:cNvGrpSpPr/>
         <p:nvPr/>
       </p:nvGrpSpPr>
@@ -671,7 +769,7 @@
       </p:grpSpPr>
       <p:sp>
         <p:nvSpPr>
-          <p:cNvPr id="58" name="Shape 58"/>
+          <p:cNvPr id="61" name="Shape 61"/>
           <p:cNvSpPr/>
           <p:nvPr>
             <p:ph idx="2" type="sldImg"/>
@@ -705,7 +803,7 @@
       </p:sp>
       <p:sp>
         <p:nvSpPr>
-          <p:cNvPr id="59" name="Shape 59"/>
+          <p:cNvPr id="62" name="Shape 62"/>
           <p:cNvSpPr txBox="1"/>
           <p:nvPr>
             <p:ph idx="1" type="body"/>
@@ -752,7 +850,7 @@
   <p:cSld>
     <p:spTree>
       <p:nvGrpSpPr>
-        <p:cNvPr id="63" name="Shape 63"/>
+        <p:cNvPr id="67" name="Shape 67"/>
         <p:cNvGrpSpPr/>
         <p:nvPr/>
       </p:nvGrpSpPr>
@@ -766,7 +864,7 @@
       </p:grpSpPr>
       <p:sp>
         <p:nvSpPr>
-          <p:cNvPr id="64" name="Shape 64"/>
+          <p:cNvPr id="68" name="Shape 68"/>
           <p:cNvSpPr/>
           <p:nvPr>
             <p:ph idx="2" type="sldImg"/>
@@ -800,7 +898,7 @@
       </p:sp>
       <p:sp>
         <p:nvSpPr>
-          <p:cNvPr id="65" name="Shape 65"/>
+          <p:cNvPr id="69" name="Shape 69"/>
           <p:cNvSpPr txBox="1"/>
           <p:nvPr>
             <p:ph idx="1" type="body"/>
@@ -847,7 +945,7 @@
   <p:cSld>
     <p:spTree>
       <p:nvGrpSpPr>
-        <p:cNvPr id="69" name="Shape 69"/>
+        <p:cNvPr id="74" name="Shape 74"/>
         <p:cNvGrpSpPr/>
         <p:nvPr/>
       </p:nvGrpSpPr>
@@ -861,7 +959,7 @@
       </p:grpSpPr>
       <p:sp>
         <p:nvSpPr>
-          <p:cNvPr id="70" name="Shape 70"/>
+          <p:cNvPr id="75" name="Shape 75"/>
           <p:cNvSpPr/>
           <p:nvPr>
             <p:ph idx="2" type="sldImg"/>
@@ -895,7 +993,7 @@
       </p:sp>
       <p:sp>
         <p:nvSpPr>
-          <p:cNvPr id="71" name="Shape 71"/>
+          <p:cNvPr id="76" name="Shape 76"/>
           <p:cNvSpPr txBox="1"/>
           <p:nvPr>
             <p:ph idx="1" type="body"/>
@@ -942,7 +1040,7 @@
   <p:cSld>
     <p:spTree>
       <p:nvGrpSpPr>
-        <p:cNvPr id="76" name="Shape 76"/>
+        <p:cNvPr id="80" name="Shape 80"/>
         <p:cNvGrpSpPr/>
         <p:nvPr/>
       </p:nvGrpSpPr>
@@ -956,7 +1054,7 @@
       </p:grpSpPr>
       <p:sp>
         <p:nvSpPr>
-          <p:cNvPr id="77" name="Shape 77"/>
+          <p:cNvPr id="81" name="Shape 81"/>
           <p:cNvSpPr/>
           <p:nvPr>
             <p:ph idx="2" type="sldImg"/>
@@ -990,7 +1088,197 @@
       </p:sp>
       <p:sp>
         <p:nvSpPr>
-          <p:cNvPr id="78" name="Shape 78"/>
+          <p:cNvPr id="82" name="Shape 82"/>
+          <p:cNvSpPr txBox="1"/>
+          <p:nvPr>
+            <p:ph idx="1" type="body"/>
+          </p:nvPr>
+        </p:nvSpPr>
+        <p:spPr>
+          <a:xfrm>
+            <a:off y="4343400" x="685800"/>
+            <a:ext cy="4114800" cx="5486399"/>
+          </a:xfrm>
+          <a:prstGeom prst="rect">
+            <a:avLst/>
+          </a:prstGeom>
+        </p:spPr>
+        <p:txBody>
+          <a:bodyPr bIns="91425" rIns="91425" lIns="91425" tIns="91425" anchor="t" anchorCtr="0">
+            <a:noAutofit/>
+          </a:bodyPr>
+          <a:lstStyle/>
+          <a:p>
+            <a:pPr>
+              <a:spcBef>
+                <a:spcPts val="0"/>
+              </a:spcBef>
+              <a:buNone/>
+            </a:pPr>
+            <a:r>
+              <a:t/>
+            </a:r>
+            <a:endParaRPr/>
+          </a:p>
+        </p:txBody>
+      </p:sp>
+    </p:spTree>
+  </p:cSld>
+  <p:clrMapOvr>
+    <a:masterClrMapping/>
+  </p:clrMapOvr>
+</p:notes>
+</file>
+
+<file path=ppt/notesSlides/notesSlide8.xml><?xml version="1.0" encoding="utf-8"?>
+<p:notes xmlns:a="http://schemas.openxmlformats.org/drawingml/2006/main" xmlns:r="http://schemas.openxmlformats.org/officeDocument/2006/relationships" xmlns:mc="http://schemas.openxmlformats.org/markup-compatibility/2006" xmlns:mv="urn:schemas-microsoft-com:mac:vml" xmlns:p="http://schemas.openxmlformats.org/presentationml/2006/main" xmlns:c="http://schemas.openxmlformats.org/drawingml/2006/chart" xmlns:dgm="http://schemas.openxmlformats.org/drawingml/2006/diagram" xmlns:o="urn:schemas-microsoft-com:office:office" xmlns:v="urn:schemas-microsoft-com:vml" xmlns:pvml="urn:schemas-microsoft-com:office:powerpoint" xmlns:com="http://schemas.openxmlformats.org/drawingml/2006/compatibility" xmlns:p14="http://schemas.microsoft.com/office/powerpoint/2010/main" showMasterSp="0" showMasterPhAnim="0">
+  <p:cSld>
+    <p:spTree>
+      <p:nvGrpSpPr>
+        <p:cNvPr id="87" name="Shape 87"/>
+        <p:cNvGrpSpPr/>
+        <p:nvPr/>
+      </p:nvGrpSpPr>
+      <p:grpSpPr>
+        <a:xfrm>
+          <a:off y="0" x="0"/>
+          <a:ext cy="0" cx="0"/>
+          <a:chOff y="0" x="0"/>
+          <a:chExt cy="0" cx="0"/>
+        </a:xfrm>
+      </p:grpSpPr>
+      <p:sp>
+        <p:nvSpPr>
+          <p:cNvPr id="88" name="Shape 88"/>
+          <p:cNvSpPr/>
+          <p:nvPr>
+            <p:ph idx="2" type="sldImg"/>
+          </p:nvPr>
+        </p:nvSpPr>
+        <p:spPr>
+          <a:xfrm>
+            <a:off y="685800" x="381187"/>
+            <a:ext cy="3429000" cx="6096299"/>
+          </a:xfrm>
+          <a:custGeom>
+            <a:pathLst>
+              <a:path w="120000" extrusionOk="0" h="120000">
+                <a:moveTo>
+                  <a:pt y="0" x="0"/>
+                </a:moveTo>
+                <a:lnTo>
+                  <a:pt y="0" x="120000"/>
+                </a:lnTo>
+                <a:lnTo>
+                  <a:pt y="120000" x="120000"/>
+                </a:lnTo>
+                <a:lnTo>
+                  <a:pt y="120000" x="0"/>
+                </a:lnTo>
+                <a:close/>
+              </a:path>
+            </a:pathLst>
+          </a:custGeom>
+        </p:spPr>
+      </p:sp>
+      <p:sp>
+        <p:nvSpPr>
+          <p:cNvPr id="89" name="Shape 89"/>
+          <p:cNvSpPr txBox="1"/>
+          <p:nvPr>
+            <p:ph idx="1" type="body"/>
+          </p:nvPr>
+        </p:nvSpPr>
+        <p:spPr>
+          <a:xfrm>
+            <a:off y="4343400" x="685800"/>
+            <a:ext cy="4114800" cx="5486399"/>
+          </a:xfrm>
+          <a:prstGeom prst="rect">
+            <a:avLst/>
+          </a:prstGeom>
+        </p:spPr>
+        <p:txBody>
+          <a:bodyPr bIns="91425" rIns="91425" lIns="91425" tIns="91425" anchor="t" anchorCtr="0">
+            <a:noAutofit/>
+          </a:bodyPr>
+          <a:lstStyle/>
+          <a:p>
+            <a:pPr>
+              <a:spcBef>
+                <a:spcPts val="0"/>
+              </a:spcBef>
+              <a:buNone/>
+            </a:pPr>
+            <a:r>
+              <a:t/>
+            </a:r>
+            <a:endParaRPr/>
+          </a:p>
+        </p:txBody>
+      </p:sp>
+    </p:spTree>
+  </p:cSld>
+  <p:clrMapOvr>
+    <a:masterClrMapping/>
+  </p:clrMapOvr>
+</p:notes>
+</file>
+
+<file path=ppt/notesSlides/notesSlide9.xml><?xml version="1.0" encoding="utf-8"?>
+<p:notes xmlns:a="http://schemas.openxmlformats.org/drawingml/2006/main" xmlns:r="http://schemas.openxmlformats.org/officeDocument/2006/relationships" xmlns:mc="http://schemas.openxmlformats.org/markup-compatibility/2006" xmlns:mv="urn:schemas-microsoft-com:mac:vml" xmlns:p="http://schemas.openxmlformats.org/presentationml/2006/main" xmlns:c="http://schemas.openxmlformats.org/drawingml/2006/chart" xmlns:dgm="http://schemas.openxmlformats.org/drawingml/2006/diagram" xmlns:o="urn:schemas-microsoft-com:office:office" xmlns:v="urn:schemas-microsoft-com:vml" xmlns:pvml="urn:schemas-microsoft-com:office:powerpoint" xmlns:com="http://schemas.openxmlformats.org/drawingml/2006/compatibility" xmlns:p14="http://schemas.microsoft.com/office/powerpoint/2010/main" showMasterSp="0" showMasterPhAnim="0">
+  <p:cSld>
+    <p:spTree>
+      <p:nvGrpSpPr>
+        <p:cNvPr id="93" name="Shape 93"/>
+        <p:cNvGrpSpPr/>
+        <p:nvPr/>
+      </p:nvGrpSpPr>
+      <p:grpSpPr>
+        <a:xfrm>
+          <a:off y="0" x="0"/>
+          <a:ext cy="0" cx="0"/>
+          <a:chOff y="0" x="0"/>
+          <a:chExt cy="0" cx="0"/>
+        </a:xfrm>
+      </p:grpSpPr>
+      <p:sp>
+        <p:nvSpPr>
+          <p:cNvPr id="94" name="Shape 94"/>
+          <p:cNvSpPr/>
+          <p:nvPr>
+            <p:ph idx="2" type="sldImg"/>
+          </p:nvPr>
+        </p:nvSpPr>
+        <p:spPr>
+          <a:xfrm>
+            <a:off y="685800" x="381187"/>
+            <a:ext cy="3429000" cx="6096299"/>
+          </a:xfrm>
+          <a:custGeom>
+            <a:pathLst>
+              <a:path w="120000" extrusionOk="0" h="120000">
+                <a:moveTo>
+                  <a:pt y="0" x="0"/>
+                </a:moveTo>
+                <a:lnTo>
+                  <a:pt y="0" x="120000"/>
+                </a:lnTo>
+                <a:lnTo>
+                  <a:pt y="120000" x="120000"/>
+                </a:lnTo>
+                <a:lnTo>
+                  <a:pt y="120000" x="0"/>
+                </a:lnTo>
+                <a:close/>
+              </a:path>
+            </a:pathLst>
+          </a:custGeom>
+        </p:spPr>
+      </p:sp>
+      <p:sp>
+        <p:nvSpPr>
+          <p:cNvPr id="95" name="Shape 95"/>
           <p:cNvSpPr txBox="1"/>
           <p:nvPr>
             <p:ph idx="1" type="body"/>
@@ -3236,6 +3524,289 @@
 </p:sld>
 </file>
 
+<file path=ppt/slides/slide10.xml><?xml version="1.0" encoding="utf-8"?>
+<p:sld xmlns:a="http://schemas.openxmlformats.org/drawingml/2006/main" xmlns:r="http://schemas.openxmlformats.org/officeDocument/2006/relationships" xmlns:mc="http://schemas.openxmlformats.org/markup-compatibility/2006" xmlns:mv="urn:schemas-microsoft-com:mac:vml" xmlns:p="http://schemas.openxmlformats.org/presentationml/2006/main" xmlns:c="http://schemas.openxmlformats.org/drawingml/2006/chart" xmlns:dgm="http://schemas.openxmlformats.org/drawingml/2006/diagram" xmlns:o="urn:schemas-microsoft-com:office:office" xmlns:v="urn:schemas-microsoft-com:vml" xmlns:pvml="urn:schemas-microsoft-com:office:powerpoint" xmlns:com="http://schemas.openxmlformats.org/drawingml/2006/compatibility" xmlns:p14="http://schemas.microsoft.com/office/powerpoint/2010/main">
+  <p:cSld>
+    <p:spTree>
+      <p:nvGrpSpPr>
+        <p:cNvPr id="96" name="Shape 96"/>
+        <p:cNvGrpSpPr/>
+        <p:nvPr/>
+      </p:nvGrpSpPr>
+      <p:grpSpPr>
+        <a:xfrm>
+          <a:off y="0" x="0"/>
+          <a:ext cy="0" cx="0"/>
+          <a:chOff y="0" x="0"/>
+          <a:chExt cy="0" cx="0"/>
+        </a:xfrm>
+      </p:grpSpPr>
+      <p:sp>
+        <p:nvSpPr>
+          <p:cNvPr id="97" name="Shape 97"/>
+          <p:cNvSpPr txBox="1"/>
+          <p:nvPr>
+            <p:ph type="title"/>
+          </p:nvPr>
+        </p:nvSpPr>
+        <p:spPr>
+          <a:xfrm>
+            <a:off y="205978" x="457200"/>
+            <a:ext cy="857400" cx="8229600"/>
+          </a:xfrm>
+          <a:prstGeom prst="rect">
+            <a:avLst/>
+          </a:prstGeom>
+        </p:spPr>
+        <p:txBody>
+          <a:bodyPr bIns="91425" rIns="91425" lIns="91425" tIns="91425" anchor="b" anchorCtr="0">
+            <a:noAutofit/>
+          </a:bodyPr>
+          <a:lstStyle/>
+          <a:p>
+            <a:pPr rtl="0" lvl="0">
+              <a:spcBef>
+                <a:spcPts val="0"/>
+              </a:spcBef>
+              <a:buNone/>
+            </a:pPr>
+            <a:r>
+              <a:rPr lang="en"/>
+              <a:t>Progress status (phase 3)</a:t>
+            </a:r>
+          </a:p>
+        </p:txBody>
+      </p:sp>
+      <p:sp>
+        <p:nvSpPr>
+          <p:cNvPr id="98" name="Shape 98"/>
+          <p:cNvSpPr txBox="1"/>
+          <p:nvPr>
+            <p:ph idx="1" type="body"/>
+          </p:nvPr>
+        </p:nvSpPr>
+        <p:spPr>
+          <a:xfrm>
+            <a:off y="1063375" x="1986975"/>
+            <a:ext cy="3725699" cx="6852300"/>
+          </a:xfrm>
+          <a:prstGeom prst="rect">
+            <a:avLst/>
+          </a:prstGeom>
+        </p:spPr>
+        <p:txBody>
+          <a:bodyPr bIns="91425" rIns="91425" lIns="91425" tIns="91425" anchor="t" anchorCtr="0">
+            <a:noAutofit/>
+          </a:bodyPr>
+          <a:lstStyle/>
+          <a:p>
+            <a:pPr rtl="0" lvl="0">
+              <a:lnSpc>
+                <a:spcPct val="115000"/>
+              </a:lnSpc>
+              <a:spcBef>
+                <a:spcPts val="0"/>
+              </a:spcBef>
+              <a:buNone/>
+            </a:pPr>
+            <a:r>
+              <a:t/>
+            </a:r>
+            <a:endParaRPr sz="1400" i="1"/>
+          </a:p>
+          <a:p>
+            <a:pPr rtl="0" lvl="0" indent="-317500" marL="457200">
+              <a:lnSpc>
+                <a:spcPct val="115000"/>
+              </a:lnSpc>
+              <a:spcBef>
+                <a:spcPts val="0"/>
+              </a:spcBef>
+              <a:buClr>
+                <a:schemeClr val="dk1"/>
+              </a:buClr>
+              <a:buSzPct val="100000"/>
+              <a:buFont typeface="Arial"/>
+              <a:buChar char="●"/>
+            </a:pPr>
+            <a:r>
+              <a:rPr sz="1400" lang="en"/>
+              <a:t>Prevent the script from errors due to the elements written by the user when asked the name of the recipe </a:t>
+            </a:r>
+          </a:p>
+          <a:p>
+            <a:pPr rtl="0" lvl="0">
+              <a:lnSpc>
+                <a:spcPct val="115000"/>
+              </a:lnSpc>
+              <a:spcBef>
+                <a:spcPts val="0"/>
+              </a:spcBef>
+              <a:buNone/>
+            </a:pPr>
+            <a:r>
+              <a:t/>
+            </a:r>
+            <a:endParaRPr sz="1400"/>
+          </a:p>
+          <a:p>
+            <a:pPr rtl="0" lvl="0" indent="-317500" marL="457200">
+              <a:lnSpc>
+                <a:spcPct val="115000"/>
+              </a:lnSpc>
+              <a:spcBef>
+                <a:spcPts val="0"/>
+              </a:spcBef>
+              <a:buClr>
+                <a:schemeClr val="dk1"/>
+              </a:buClr>
+              <a:buSzPct val="100000"/>
+              <a:buFont typeface="Arial"/>
+              <a:buChar char="●"/>
+            </a:pPr>
+            <a:r>
+              <a:rPr sz="1400" lang="en"/>
+              <a:t>Retrieve the recipe’s page corresponding to the best result considering the user’s choices </a:t>
+            </a:r>
+            <a:r>
+              <a:rPr sz="1400" lang="en" i="1"/>
+              <a:t>(by storing the sorted results in another file and using regex into the URL used to display recipes on Marmiton)</a:t>
+            </a:r>
+          </a:p>
+          <a:p>
+            <a:pPr rtl="0" lvl="0">
+              <a:lnSpc>
+                <a:spcPct val="115000"/>
+              </a:lnSpc>
+              <a:spcBef>
+                <a:spcPts val="0"/>
+              </a:spcBef>
+              <a:buClr>
+                <a:srgbClr val="000000"/>
+              </a:buClr>
+              <a:buFont typeface="Arial"/>
+              <a:buNone/>
+            </a:pPr>
+            <a:r>
+              <a:t/>
+            </a:r>
+            <a:endParaRPr sz="1400"/>
+          </a:p>
+          <a:p>
+            <a:pPr rtl="0" lvl="0" indent="-317500" marL="457200">
+              <a:lnSpc>
+                <a:spcPct val="115000"/>
+              </a:lnSpc>
+              <a:spcBef>
+                <a:spcPts val="0"/>
+              </a:spcBef>
+              <a:buClr>
+                <a:schemeClr val="dk1"/>
+              </a:buClr>
+              <a:buSzPct val="100000"/>
+              <a:buFont typeface="Arial"/>
+              <a:buChar char="●"/>
+            </a:pPr>
+            <a:r>
+              <a:rPr sz="1400" lang="en"/>
+              <a:t>Add up preparation time and cooking time in order to ask how much time the user has to cook</a:t>
+            </a:r>
+          </a:p>
+          <a:p>
+            <a:pPr rtl="0" lvl="0">
+              <a:lnSpc>
+                <a:spcPct val="115000"/>
+              </a:lnSpc>
+              <a:spcBef>
+                <a:spcPts val="0"/>
+              </a:spcBef>
+              <a:buNone/>
+            </a:pPr>
+            <a:r>
+              <a:t/>
+            </a:r>
+            <a:endParaRPr sz="1400"/>
+          </a:p>
+          <a:p>
+            <a:pPr rtl="0" lvl="0">
+              <a:lnSpc>
+                <a:spcPct val="115000"/>
+              </a:lnSpc>
+              <a:spcBef>
+                <a:spcPts val="0"/>
+              </a:spcBef>
+              <a:buNone/>
+            </a:pPr>
+            <a:r>
+              <a:t/>
+            </a:r>
+            <a:endParaRPr sz="1400"/>
+          </a:p>
+          <a:p>
+            <a:pPr rtl="0" lvl="0">
+              <a:lnSpc>
+                <a:spcPct val="115000"/>
+              </a:lnSpc>
+              <a:spcBef>
+                <a:spcPts val="0"/>
+              </a:spcBef>
+              <a:buNone/>
+            </a:pPr>
+            <a:r>
+              <a:t/>
+            </a:r>
+            <a:endParaRPr sz="1400"/>
+          </a:p>
+          <a:p>
+            <a:pPr rtl="0" lvl="0">
+              <a:lnSpc>
+                <a:spcPct val="115000"/>
+              </a:lnSpc>
+              <a:spcBef>
+                <a:spcPts val="0"/>
+              </a:spcBef>
+              <a:buNone/>
+            </a:pPr>
+            <a:r>
+              <a:rPr sz="1400" lang="en" i="1"/>
+              <a:t>We will most likely not have enough time to do all of those but they are possible evolutions/ameliorations to our script. </a:t>
+            </a:r>
+          </a:p>
+        </p:txBody>
+      </p:sp>
+      <p:pic>
+        <p:nvPicPr>
+          <p:cNvPr id="99" name="Shape 99"/>
+          <p:cNvPicPr preferRelativeResize="0"/>
+          <p:nvPr/>
+        </p:nvPicPr>
+        <p:blipFill>
+          <a:blip r:embed="rId3"/>
+          <a:stretch>
+            <a:fillRect/>
+          </a:stretch>
+        </p:blipFill>
+        <p:spPr>
+          <a:xfrm>
+            <a:off y="1256425" x="219950"/>
+            <a:ext cy="1430900" cx="1614624"/>
+          </a:xfrm>
+          <a:prstGeom prst="rect">
+            <a:avLst/>
+          </a:prstGeom>
+        </p:spPr>
+      </p:pic>
+    </p:spTree>
+  </p:cSld>
+  <p:clrMapOvr>
+    <a:masterClrMapping/>
+  </p:clrMapOvr>
+  <p:transition spd="slow">
+    <p:cut/>
+  </p:transition>
+</p:sld>
+</file>
+
 <file path=ppt/slides/slide2.xml><?xml version="1.0" encoding="utf-8"?>
 <p:sld xmlns:a="http://schemas.openxmlformats.org/drawingml/2006/main" xmlns:r="http://schemas.openxmlformats.org/officeDocument/2006/relationships" xmlns:mc="http://schemas.openxmlformats.org/markup-compatibility/2006" xmlns:mv="urn:schemas-microsoft-com:mac:vml" xmlns:p="http://schemas.openxmlformats.org/presentationml/2006/main" xmlns:c="http://schemas.openxmlformats.org/drawingml/2006/chart" xmlns:dgm="http://schemas.openxmlformats.org/drawingml/2006/diagram" xmlns:o="urn:schemas-microsoft-com:office:office" xmlns:v="urn:schemas-microsoft-com:vml" xmlns:pvml="urn:schemas-microsoft-com:office:powerpoint" xmlns:com="http://schemas.openxmlformats.org/drawingml/2006/compatibility" xmlns:p14="http://schemas.microsoft.com/office/powerpoint/2010/main">
   <p:cSld>
@@ -3499,7 +4070,7 @@
         </p:nvSpPr>
         <p:spPr>
           <a:xfrm>
-            <a:off y="188203" x="457200"/>
+            <a:off y="205978" x="457200"/>
             <a:ext cy="857400" cx="8229600"/>
           </a:xfrm>
           <a:prstGeom prst="rect">
@@ -3520,7 +4091,7 @@
             </a:pPr>
             <a:r>
               <a:rPr lang="en"/>
-              <a:t>Progress status (phase 1) </a:t>
+              <a:t>How we proceeded</a:t>
             </a:r>
           </a:p>
         </p:txBody>
@@ -3535,8 +4106,8 @@
         </p:nvSpPr>
         <p:spPr>
           <a:xfrm>
-            <a:off y="1200150" x="457200"/>
-            <a:ext cy="3725699" cx="6074099"/>
+            <a:off y="1191150" x="465300"/>
+            <a:ext cy="2114999" cx="3994500"/>
           </a:xfrm>
           <a:prstGeom prst="rect">
             <a:avLst/>
@@ -3548,342 +4119,237 @@
           </a:bodyPr>
           <a:lstStyle/>
           <a:p>
-            <a:pPr rtl="0" lvl="0">
-              <a:lnSpc>
-                <a:spcPct val="115000"/>
-              </a:lnSpc>
-              <a:spcBef>
-                <a:spcPts val="0"/>
-              </a:spcBef>
-              <a:buClr>
-                <a:schemeClr val="dk1"/>
-              </a:buClr>
-              <a:buSzPct val="61111"/>
-              <a:buFont typeface="Arial"/>
-              <a:buNone/>
-            </a:pPr>
-            <a:r>
-              <a:rPr u="sng" b="1" sz="1800" lang="en"/>
-              <a:t>DONE:</a:t>
-            </a:r>
-          </a:p>
-          <a:p>
-            <a:pPr rtl="0" lvl="0">
-              <a:lnSpc>
-                <a:spcPct val="115000"/>
-              </a:lnSpc>
-              <a:spcBef>
-                <a:spcPts val="0"/>
-              </a:spcBef>
-              <a:buClr>
-                <a:schemeClr val="dk1"/>
-              </a:buClr>
-              <a:buSzPct val="61111"/>
-              <a:buFont typeface="Arial"/>
-              <a:buNone/>
-            </a:pPr>
-            <a:r>
-              <a:rPr b="1" sz="1800" lang="en"/>
-              <a:t>sed -n "1 p" ~/recipe.txt</a:t>
-            </a:r>
+            <a:pPr algn="ctr" rtl="0" lvl="0">
+              <a:spcBef>
+                <a:spcPts val="0"/>
+              </a:spcBef>
+              <a:buNone/>
+            </a:pPr>
+            <a:r>
+              <a:rPr lang="en"/>
+              <a:t>Phase 1</a:t>
+            </a:r>
+          </a:p>
+          <a:p>
+            <a:pPr>
+              <a:spcBef>
+                <a:spcPts val="0"/>
+              </a:spcBef>
+              <a:buNone/>
+            </a:pPr>
             <a:r>
               <a:rPr sz="1800" lang="en"/>
-              <a:t> → first line of the recipe book</a:t>
-            </a:r>
-          </a:p>
-          <a:p>
-            <a:pPr rtl="0" lvl="0">
-              <a:lnSpc>
-                <a:spcPct val="115000"/>
-              </a:lnSpc>
-              <a:spcBef>
-                <a:spcPts val="0"/>
-              </a:spcBef>
-              <a:buClr>
-                <a:schemeClr val="dk1"/>
-              </a:buClr>
-              <a:buSzPct val="61111"/>
-              <a:buFont typeface="Arial"/>
-              <a:buNone/>
-            </a:pPr>
-            <a:r>
-              <a:rPr b="1" sz="1800" lang="en"/>
-              <a:t>grep “^.*$” recipe.txt </a:t>
-            </a:r>
-            <a:r>
-              <a:rPr sz="1800" lang="en"/>
-              <a:t>→ distinguish each line </a:t>
-            </a:r>
-          </a:p>
-          <a:p>
-            <a:pPr rtl="0" lvl="0">
-              <a:lnSpc>
-                <a:spcPct val="115000"/>
-              </a:lnSpc>
-              <a:spcBef>
-                <a:spcPts val="0"/>
-              </a:spcBef>
-              <a:buClr>
-                <a:schemeClr val="dk1"/>
-              </a:buClr>
-              <a:buSzPct val="61111"/>
-              <a:buFont typeface="Arial"/>
-              <a:buNone/>
-            </a:pPr>
-            <a:r>
-              <a:rPr b="1" sz="1800" lang="en"/>
-              <a:t>sed -n "1 p;5 p"</a:t>
-            </a:r>
-            <a:r>
-              <a:rPr sz="1800" lang="en"/>
-              <a:t> → print the lines 1 and 5</a:t>
-            </a:r>
-          </a:p>
-          <a:p>
-            <a:pPr rtl="0" lvl="0">
-              <a:lnSpc>
-                <a:spcPct val="115000"/>
-              </a:lnSpc>
-              <a:spcBef>
-                <a:spcPts val="0"/>
-              </a:spcBef>
-              <a:buClr>
-                <a:schemeClr val="dk1"/>
-              </a:buClr>
-              <a:buSzPct val="78571"/>
-              <a:buFont typeface="Arial"/>
-              <a:buNone/>
-            </a:pPr>
-            <a:r>
-              <a:rPr b="1" sz="1400" lang="en"/>
-              <a:t>sed -n "5p" recipe.txt | sed -e "s/\(.*personnes)\).*$/\1/" | sed -e "s/.*\([0-9]\{2\}\).*\([0-9]\{2\}\).*/[\1,\2]/"</a:t>
-            </a:r>
-            <a:r>
-              <a:rPr sz="1800" lang="en"/>
-              <a:t> → print [15,30]</a:t>
-            </a:r>
-          </a:p>
-          <a:p>
-            <a:pPr rtl="0" lvl="0">
-              <a:lnSpc>
-                <a:spcPct val="115000"/>
-              </a:lnSpc>
-              <a:spcBef>
-                <a:spcPts val="0"/>
-              </a:spcBef>
-              <a:buClr>
-                <a:schemeClr val="dk1"/>
-              </a:buClr>
-              <a:buFont typeface="Arial"/>
-              <a:buNone/>
-            </a:pPr>
-            <a:r>
-              <a:t/>
-            </a:r>
-            <a:endParaRPr sz="1800"/>
-          </a:p>
-          <a:p>
-            <a:pPr rtl="0" lvl="0">
-              <a:lnSpc>
-                <a:spcPct val="115000"/>
-              </a:lnSpc>
-              <a:spcBef>
-                <a:spcPts val="0"/>
-              </a:spcBef>
-              <a:buClr>
-                <a:schemeClr val="dk1"/>
-              </a:buClr>
-              <a:buSzPct val="61111"/>
-              <a:buFont typeface="Arial"/>
-              <a:buNone/>
-            </a:pPr>
-            <a:r>
-              <a:rPr u="sng" b="1" sz="1800" lang="en"/>
-              <a:t>TO DO:</a:t>
-            </a:r>
-          </a:p>
-          <a:p>
-            <a:pPr rtl="0" lvl="0">
-              <a:lnSpc>
-                <a:spcPct val="115000"/>
-              </a:lnSpc>
-              <a:spcBef>
-                <a:spcPts val="0"/>
-              </a:spcBef>
-              <a:buClr>
-                <a:schemeClr val="dk1"/>
-              </a:buClr>
-              <a:buSzPct val="61111"/>
-              <a:buFont typeface="Arial"/>
-              <a:buNone/>
-            </a:pPr>
-            <a:r>
-              <a:rPr sz="1800" lang="en"/>
-              <a:t>script that :</a:t>
-            </a:r>
-          </a:p>
-          <a:p>
-            <a:pPr rtl="0" lvl="0" indent="-298450" marL="457200">
-              <a:lnSpc>
-                <a:spcPct val="115000"/>
-              </a:lnSpc>
-              <a:spcBef>
-                <a:spcPts val="0"/>
-              </a:spcBef>
-              <a:spcAft>
-                <a:spcPts val="1000"/>
-              </a:spcAft>
-              <a:buClr>
-                <a:schemeClr val="dk1"/>
-              </a:buClr>
-              <a:buSzPct val="61111"/>
-              <a:buFont typeface="Arial"/>
-              <a:buChar char="●"/>
-            </a:pPr>
-            <a:r>
-              <a:rPr sz="1800" lang="en"/>
-              <a:t>show the first and fifth lines of each recipes</a:t>
-            </a:r>
-          </a:p>
-          <a:p>
-            <a:pPr rtl="0" lvl="0" indent="-298450" marL="457200">
-              <a:lnSpc>
-                <a:spcPct val="115000"/>
-              </a:lnSpc>
-              <a:spcBef>
-                <a:spcPts val="0"/>
-              </a:spcBef>
-              <a:spcAft>
-                <a:spcPts val="1000"/>
-              </a:spcAft>
-              <a:buClr>
-                <a:schemeClr val="dk1"/>
-              </a:buClr>
-              <a:buSzPct val="61111"/>
-              <a:buFont typeface="Arial"/>
-              <a:buChar char="●"/>
-            </a:pPr>
-            <a:r>
-              <a:rPr sz="1800" lang="en"/>
-              <a:t>retrieve time of cooking and time of preparation</a:t>
-            </a:r>
-          </a:p>
-          <a:p>
-            <a:pPr rtl="0" lvl="0" indent="-298450" marL="457200">
-              <a:lnSpc>
-                <a:spcPct val="115000"/>
-              </a:lnSpc>
-              <a:spcBef>
-                <a:spcPts val="0"/>
-              </a:spcBef>
-              <a:spcAft>
-                <a:spcPts val="1000"/>
-              </a:spcAft>
-              <a:buClr>
-                <a:schemeClr val="dk1"/>
-              </a:buClr>
-              <a:buSzPct val="61111"/>
-              <a:buFont typeface="Arial"/>
-              <a:buChar char="●"/>
-            </a:pPr>
-            <a:r>
-              <a:rPr sz="1800" lang="en"/>
-              <a:t>organise them by time of cooking</a:t>
-            </a:r>
-          </a:p>
-          <a:p>
-            <a:pPr rtl="0" lvl="0">
-              <a:lnSpc>
-                <a:spcPct val="115000"/>
-              </a:lnSpc>
-              <a:spcBef>
-                <a:spcPts val="0"/>
-              </a:spcBef>
-              <a:buClr>
-                <a:schemeClr val="dk1"/>
-              </a:buClr>
-              <a:buFont typeface="Arial"/>
-              <a:buNone/>
-            </a:pPr>
-            <a:r>
-              <a:t/>
-            </a:r>
-            <a:endParaRPr sz="1800"/>
-          </a:p>
-          <a:p>
-            <a:pPr rtl="0" lvl="0">
-              <a:lnSpc>
-                <a:spcPct val="115000"/>
-              </a:lnSpc>
-              <a:spcBef>
-                <a:spcPts val="0"/>
-              </a:spcBef>
-              <a:buClr>
-                <a:schemeClr val="dk1"/>
-              </a:buClr>
-              <a:buFont typeface="Arial"/>
-              <a:buNone/>
-            </a:pPr>
-            <a:r>
-              <a:t/>
-            </a:r>
-            <a:endParaRPr sz="1800"/>
-          </a:p>
-          <a:p>
-            <a:pPr rtl="0" lvl="0">
-              <a:lnSpc>
-                <a:spcPct val="115000"/>
-              </a:lnSpc>
-              <a:spcBef>
-                <a:spcPts val="0"/>
-              </a:spcBef>
-              <a:buClr>
-                <a:schemeClr val="dk1"/>
-              </a:buClr>
-              <a:buFont typeface="Arial"/>
-              <a:buNone/>
-            </a:pPr>
-            <a:r>
-              <a:t/>
-            </a:r>
-            <a:endParaRPr sz="1800"/>
-          </a:p>
-          <a:p>
-            <a:pPr>
-              <a:spcBef>
-                <a:spcPts val="0"/>
-              </a:spcBef>
-              <a:buNone/>
-            </a:pPr>
-            <a:r>
-              <a:t/>
-            </a:r>
-            <a:endParaRPr sz="1800"/>
+              <a:t>When we discovered bash and had to try out commands without really knowing where we were going.</a:t>
+            </a:r>
           </a:p>
         </p:txBody>
       </p:sp>
-      <p:pic>
-        <p:nvPicPr>
+      <p:sp>
+        <p:nvSpPr>
           <p:cNvPr id="48" name="Shape 48"/>
-          <p:cNvPicPr preferRelativeResize="0"/>
-          <p:nvPr/>
-        </p:nvPicPr>
-        <p:blipFill>
-          <a:blip r:embed="rId3"/>
-          <a:stretch>
-            <a:fillRect/>
-          </a:stretch>
-        </p:blipFill>
+          <p:cNvSpPr txBox="1"/>
+          <p:nvPr>
+            <p:ph idx="2" type="body"/>
+          </p:nvPr>
+        </p:nvSpPr>
         <p:spPr>
           <a:xfrm>
-            <a:off y="1350700" x="7173250"/>
-            <a:ext cy="1353600" cx="1353600"/>
+            <a:off y="1191150" x="4692300"/>
+            <a:ext cy="2486400" cx="3994500"/>
           </a:xfrm>
           <a:prstGeom prst="rect">
             <a:avLst/>
           </a:prstGeom>
         </p:spPr>
-      </p:pic>
+        <p:txBody>
+          <a:bodyPr bIns="91425" rIns="91425" lIns="91425" tIns="91425" anchor="t" anchorCtr="0">
+            <a:noAutofit/>
+          </a:bodyPr>
+          <a:lstStyle/>
+          <a:p>
+            <a:pPr algn="ctr" rtl="0" lvl="0">
+              <a:spcBef>
+                <a:spcPts val="0"/>
+              </a:spcBef>
+              <a:buNone/>
+            </a:pPr>
+            <a:r>
+              <a:rPr lang="en"/>
+              <a:t>Phase 2</a:t>
+            </a:r>
+          </a:p>
+          <a:p>
+            <a:pPr rtl="0" lvl="0">
+              <a:spcBef>
+                <a:spcPts val="0"/>
+              </a:spcBef>
+              <a:buNone/>
+            </a:pPr>
+            <a:r>
+              <a:rPr sz="1800" lang="en"/>
+              <a:t>When we started to understand how a script works and where to put our regex thingies.</a:t>
+            </a:r>
+          </a:p>
+          <a:p>
+            <a:pPr rtl="0" lvl="0">
+              <a:spcBef>
+                <a:spcPts val="0"/>
+              </a:spcBef>
+              <a:buNone/>
+            </a:pPr>
+            <a:r>
+              <a:rPr sz="1800" lang="en"/>
+              <a:t>It shows for the most part the latest advancement for our bash script.</a:t>
+            </a:r>
+          </a:p>
+          <a:p>
+            <a:pPr>
+              <a:spcBef>
+                <a:spcPts val="0"/>
+              </a:spcBef>
+              <a:buNone/>
+            </a:pPr>
+            <a:r>
+              <a:t/>
+            </a:r>
+            <a:endParaRPr/>
+          </a:p>
+        </p:txBody>
+      </p:sp>
+      <p:sp>
+        <p:nvSpPr>
+          <p:cNvPr id="49" name="Shape 49"/>
+          <p:cNvSpPr txBox="1"/>
+          <p:nvPr/>
+        </p:nvSpPr>
+        <p:spPr>
+          <a:xfrm>
+            <a:off y="4489425" x="1100050"/>
+            <a:ext cy="457200" cx="3657600"/>
+          </a:xfrm>
+          <a:prstGeom prst="rect">
+            <a:avLst/>
+          </a:prstGeom>
+        </p:spPr>
+        <p:txBody>
+          <a:bodyPr bIns="91425" rIns="91425" lIns="91425" tIns="91425" anchor="t" anchorCtr="0">
+            <a:noAutofit/>
+          </a:bodyPr>
+          <a:lstStyle/>
+          <a:p>
+            <a:pPr>
+              <a:spcBef>
+                <a:spcPts val="0"/>
+              </a:spcBef>
+              <a:buNone/>
+            </a:pPr>
+            <a:r>
+              <a:t/>
+            </a:r>
+            <a:endParaRPr/>
+          </a:p>
+        </p:txBody>
+      </p:sp>
+      <p:cxnSp>
+        <p:nvCxnSpPr>
+          <p:cNvPr id="50" name="Shape 50"/>
+          <p:cNvCxnSpPr/>
+          <p:nvPr/>
+        </p:nvCxnSpPr>
+        <p:spPr>
+          <a:xfrm>
+            <a:off y="1308175" x="4451700"/>
+            <a:ext cy="1991999" cx="8100"/>
+          </a:xfrm>
+          <a:prstGeom prst="straightConnector1">
+            <a:avLst/>
+          </a:prstGeom>
+          <a:noFill/>
+          <a:ln w="19050" cap="flat">
+            <a:solidFill>
+              <a:schemeClr val="dk2"/>
+            </a:solidFill>
+            <a:prstDash val="solid"/>
+            <a:round/>
+            <a:headEnd w="lg" len="lg" type="none"/>
+            <a:tailEnd w="lg" len="lg" type="none"/>
+          </a:ln>
+        </p:spPr>
+      </p:cxnSp>
+      <p:cxnSp>
+        <p:nvCxnSpPr>
+          <p:cNvPr id="51" name="Shape 51"/>
+          <p:cNvCxnSpPr/>
+          <p:nvPr/>
+        </p:nvCxnSpPr>
+        <p:spPr>
+          <a:xfrm rot="10800000">
+            <a:off y="3500850" x="1229850"/>
+            <a:ext cy="0" cx="6451799"/>
+          </a:xfrm>
+          <a:prstGeom prst="straightConnector1">
+            <a:avLst/>
+          </a:prstGeom>
+          <a:noFill/>
+          <a:ln w="19050" cap="flat">
+            <a:solidFill>
+              <a:schemeClr val="dk2"/>
+            </a:solidFill>
+            <a:prstDash val="solid"/>
+            <a:round/>
+            <a:headEnd w="lg" len="lg" type="none"/>
+            <a:tailEnd w="lg" len="lg" type="none"/>
+          </a:ln>
+        </p:spPr>
+      </p:cxnSp>
+      <p:sp>
+        <p:nvSpPr>
+          <p:cNvPr id="52" name="Shape 52"/>
+          <p:cNvSpPr txBox="1"/>
+          <p:nvPr>
+            <p:ph idx="3" type="body"/>
+          </p:nvPr>
+        </p:nvSpPr>
+        <p:spPr>
+          <a:xfrm>
+            <a:off y="3427950" x="541650"/>
+            <a:ext cy="3725699" cx="8060699"/>
+          </a:xfrm>
+          <a:prstGeom prst="rect">
+            <a:avLst/>
+          </a:prstGeom>
+        </p:spPr>
+        <p:txBody>
+          <a:bodyPr bIns="91425" rIns="91425" lIns="91425" tIns="91425" anchor="t" anchorCtr="0">
+            <a:noAutofit/>
+          </a:bodyPr>
+          <a:lstStyle/>
+          <a:p>
+            <a:pPr algn="ctr" rtl="0" lvl="0">
+              <a:spcBef>
+                <a:spcPts val="0"/>
+              </a:spcBef>
+              <a:buNone/>
+            </a:pPr>
+            <a:r>
+              <a:rPr lang="en"/>
+              <a:t>Phase 3</a:t>
+            </a:r>
+          </a:p>
+          <a:p>
+            <a:pPr rtl="0" lvl="0">
+              <a:spcBef>
+                <a:spcPts val="0"/>
+              </a:spcBef>
+              <a:buNone/>
+            </a:pPr>
+            <a:r>
+              <a:rPr sz="1800" lang="en"/>
+              <a:t>It’s our TO-DO list. We modify it every time we succeed into doing something (achievements are transferred to phase 2)  and it shows our next goals.</a:t>
+            </a:r>
+          </a:p>
+        </p:txBody>
+      </p:sp>
     </p:spTree>
   </p:cSld>
   <p:clrMapOvr>
@@ -3900,7 +4366,7 @@
   <p:cSld>
     <p:spTree>
       <p:nvGrpSpPr>
-        <p:cNvPr id="52" name="Shape 52"/>
+        <p:cNvPr id="56" name="Shape 56"/>
         <p:cNvGrpSpPr/>
         <p:nvPr/>
       </p:nvGrpSpPr>
@@ -3914,7 +4380,7 @@
       </p:grpSpPr>
       <p:sp>
         <p:nvSpPr>
-          <p:cNvPr id="53" name="Shape 53"/>
+          <p:cNvPr id="57" name="Shape 57"/>
           <p:cNvSpPr txBox="1"/>
           <p:nvPr>
             <p:ph type="title"/>
@@ -3935,7 +4401,7 @@
           </a:bodyPr>
           <a:lstStyle/>
           <a:p>
-            <a:pPr rtl="0" lvl="0">
+            <a:pPr>
               <a:spcBef>
                 <a:spcPts val="0"/>
               </a:spcBef>
@@ -3943,14 +4409,14 @@
             </a:pPr>
             <a:r>
               <a:rPr lang="en"/>
-              <a:t>Progress status (phase 2)</a:t>
+              <a:t>Progress status (phase 1) </a:t>
             </a:r>
           </a:p>
         </p:txBody>
       </p:sp>
       <p:sp>
         <p:nvSpPr>
-          <p:cNvPr id="54" name="Shape 54"/>
+          <p:cNvPr id="58" name="Shape 58"/>
           <p:cNvSpPr txBox="1"/>
           <p:nvPr>
             <p:ph idx="1" type="body"/>
@@ -3958,8 +4424,8 @@
         </p:nvSpPr>
         <p:spPr>
           <a:xfrm>
-            <a:off y="1202000" x="269450"/>
-            <a:ext cy="3725699" cx="7327800"/>
+            <a:off y="1200150" x="457200"/>
+            <a:ext cy="3725699" cx="6074099"/>
           </a:xfrm>
           <a:prstGeom prst="rect">
             <a:avLst/>
@@ -4001,178 +4467,256 @@
               <a:buClr>
                 <a:schemeClr val="dk1"/>
               </a:buClr>
+              <a:buSzPct val="61111"/>
+              <a:buFont typeface="Arial"/>
+              <a:buNone/>
+            </a:pPr>
+            <a:r>
+              <a:rPr b="1" sz="1800" lang="en"/>
+              <a:t>sed -n "1 p" ~/recipe.txt</a:t>
+            </a:r>
+            <a:r>
+              <a:rPr sz="1800" lang="en"/>
+              <a:t> → first line of the recipe book</a:t>
+            </a:r>
+          </a:p>
+          <a:p>
+            <a:pPr rtl="0" lvl="0">
+              <a:lnSpc>
+                <a:spcPct val="115000"/>
+              </a:lnSpc>
+              <a:spcBef>
+                <a:spcPts val="0"/>
+              </a:spcBef>
+              <a:buClr>
+                <a:schemeClr val="dk1"/>
+              </a:buClr>
+              <a:buSzPct val="61111"/>
+              <a:buFont typeface="Arial"/>
+              <a:buNone/>
+            </a:pPr>
+            <a:r>
+              <a:rPr b="1" sz="1800" lang="en"/>
+              <a:t>grep “^.*$” recipe.txt </a:t>
+            </a:r>
+            <a:r>
+              <a:rPr sz="1800" lang="en"/>
+              <a:t>→ distinguish each line </a:t>
+            </a:r>
+          </a:p>
+          <a:p>
+            <a:pPr rtl="0" lvl="0">
+              <a:lnSpc>
+                <a:spcPct val="115000"/>
+              </a:lnSpc>
+              <a:spcBef>
+                <a:spcPts val="0"/>
+              </a:spcBef>
+              <a:buClr>
+                <a:schemeClr val="dk1"/>
+              </a:buClr>
+              <a:buSzPct val="61111"/>
+              <a:buFont typeface="Arial"/>
+              <a:buNone/>
+            </a:pPr>
+            <a:r>
+              <a:rPr b="1" sz="1800" lang="en"/>
+              <a:t>sed -n "1 p;5 p"</a:t>
+            </a:r>
+            <a:r>
+              <a:rPr sz="1800" lang="en"/>
+              <a:t> → print the lines 1 and 5</a:t>
+            </a:r>
+          </a:p>
+          <a:p>
+            <a:pPr rtl="0" lvl="0">
+              <a:lnSpc>
+                <a:spcPct val="115000"/>
+              </a:lnSpc>
+              <a:spcBef>
+                <a:spcPts val="0"/>
+              </a:spcBef>
+              <a:buClr>
+                <a:schemeClr val="dk1"/>
+              </a:buClr>
               <a:buSzPct val="78571"/>
               <a:buFont typeface="Arial"/>
               <a:buNone/>
             </a:pPr>
             <a:r>
               <a:rPr b="1" sz="1400" lang="en"/>
-              <a:t>for i in {0..50..10}</a:t>
-            </a:r>
-          </a:p>
-          <a:p>
-            <a:pPr rtl="0" lvl="0">
-              <a:lnSpc>
-                <a:spcPct val="115000"/>
-              </a:lnSpc>
-              <a:spcBef>
-                <a:spcPts val="0"/>
-              </a:spcBef>
-              <a:buClr>
-                <a:schemeClr val="dk1"/>
-              </a:buClr>
-              <a:buSzPct val="78571"/>
+              <a:t>sed -n "5p" recipe.txt | sed -e "s/\(.*personnes)\).*$/\1/" | sed -e "s/.*\([0-9]\{2\}\).*\([0-9]\{2\}\).*/[\1,\2]/"</a:t>
+            </a:r>
+            <a:r>
+              <a:rPr sz="1800" lang="en"/>
+              <a:t> → print [15,30]</a:t>
+            </a:r>
+          </a:p>
+          <a:p>
+            <a:pPr rtl="0" lvl="0">
+              <a:lnSpc>
+                <a:spcPct val="115000"/>
+              </a:lnSpc>
+              <a:spcBef>
+                <a:spcPts val="0"/>
+              </a:spcBef>
+              <a:buClr>
+                <a:schemeClr val="dk1"/>
+              </a:buClr>
               <a:buFont typeface="Arial"/>
               <a:buNone/>
             </a:pPr>
             <a:r>
-              <a:rPr b="1" sz="1400" lang="en"/>
-              <a:t>do</a:t>
-            </a:r>
-          </a:p>
-          <a:p>
-            <a:pPr rtl="0" lvl="0">
-              <a:lnSpc>
-                <a:spcPct val="115000"/>
-              </a:lnSpc>
-              <a:spcBef>
-                <a:spcPts val="0"/>
-              </a:spcBef>
-              <a:buClr>
-                <a:schemeClr val="dk1"/>
-              </a:buClr>
-              <a:buSzPct val="78571"/>
+              <a:t/>
+            </a:r>
+            <a:endParaRPr sz="1800"/>
+          </a:p>
+          <a:p>
+            <a:pPr rtl="0" lvl="0">
+              <a:lnSpc>
+                <a:spcPct val="115000"/>
+              </a:lnSpc>
+              <a:spcBef>
+                <a:spcPts val="0"/>
+              </a:spcBef>
+              <a:buClr>
+                <a:schemeClr val="dk1"/>
+              </a:buClr>
+              <a:buSzPct val="61111"/>
               <a:buFont typeface="Arial"/>
               <a:buNone/>
             </a:pPr>
             <a:r>
-              <a:rPr b="1" sz="1400" lang="en"/>
-              <a:t>curl -s http://www.marmiton.org/recettes/recherche.aspx?aqt=$1\&amp;start=$i &gt;&gt; /tmp/raw</a:t>
-            </a:r>
-          </a:p>
-          <a:p>
-            <a:pPr rtl="0" lvl="0">
-              <a:lnSpc>
-                <a:spcPct val="115000"/>
-              </a:lnSpc>
-              <a:spcBef>
-                <a:spcPts val="0"/>
-              </a:spcBef>
-              <a:buClr>
-                <a:schemeClr val="dk1"/>
-              </a:buClr>
-              <a:buSzPct val="78571"/>
+              <a:rPr u="sng" b="1" sz="1800" lang="en"/>
+              <a:t>TO DO:</a:t>
+            </a:r>
+          </a:p>
+          <a:p>
+            <a:pPr rtl="0" lvl="0">
+              <a:lnSpc>
+                <a:spcPct val="115000"/>
+              </a:lnSpc>
+              <a:spcBef>
+                <a:spcPts val="0"/>
+              </a:spcBef>
+              <a:buClr>
+                <a:schemeClr val="dk1"/>
+              </a:buClr>
+              <a:buSzPct val="61111"/>
               <a:buFont typeface="Arial"/>
               <a:buNone/>
             </a:pPr>
             <a:r>
-              <a:rPr b="1" sz="1400" lang="en"/>
-              <a:t>done</a:t>
-            </a:r>
-          </a:p>
-          <a:p>
-            <a:pPr rtl="0" lvl="0">
-              <a:lnSpc>
-                <a:spcPct val="115000"/>
-              </a:lnSpc>
-              <a:spcBef>
-                <a:spcPts val="0"/>
-              </a:spcBef>
-              <a:buClr>
-                <a:schemeClr val="dk1"/>
-              </a:buClr>
-              <a:buSzPct val="78571"/>
+              <a:rPr sz="1800" lang="en"/>
+              <a:t>script that :</a:t>
+            </a:r>
+          </a:p>
+          <a:p>
+            <a:pPr rtl="0" lvl="0" indent="-298450" marL="457200">
+              <a:lnSpc>
+                <a:spcPct val="115000"/>
+              </a:lnSpc>
+              <a:spcBef>
+                <a:spcPts val="0"/>
+              </a:spcBef>
+              <a:spcAft>
+                <a:spcPts val="1000"/>
+              </a:spcAft>
+              <a:buClr>
+                <a:schemeClr val="dk1"/>
+              </a:buClr>
+              <a:buSzPct val="61111"/>
               <a:buFont typeface="Arial"/>
-              <a:buNone/>
-            </a:pPr>
-            <a:r>
-              <a:rPr sz="1400" lang="en"/>
-              <a:t>→ Loop retrieving the HTML content of the first six pages result and stores it in a temp file</a:t>
-            </a:r>
-          </a:p>
-          <a:p>
-            <a:pPr rtl="0" lvl="0">
-              <a:lnSpc>
-                <a:spcPct val="115000"/>
-              </a:lnSpc>
-              <a:spcBef>
-                <a:spcPts val="0"/>
-              </a:spcBef>
-              <a:buClr>
-                <a:schemeClr val="dk1"/>
-              </a:buClr>
-              <a:buSzPct val="78571"/>
+              <a:buChar char="●"/>
+            </a:pPr>
+            <a:r>
+              <a:rPr sz="1800" lang="en"/>
+              <a:t>show the first and fifth lines of each recipes</a:t>
+            </a:r>
+          </a:p>
+          <a:p>
+            <a:pPr rtl="0" lvl="0" indent="-298450" marL="457200">
+              <a:lnSpc>
+                <a:spcPct val="115000"/>
+              </a:lnSpc>
+              <a:spcBef>
+                <a:spcPts val="0"/>
+              </a:spcBef>
+              <a:spcAft>
+                <a:spcPts val="1000"/>
+              </a:spcAft>
+              <a:buClr>
+                <a:schemeClr val="dk1"/>
+              </a:buClr>
+              <a:buSzPct val="61111"/>
               <a:buFont typeface="Arial"/>
-              <a:buNone/>
-            </a:pPr>
-            <a:r>
-              <a:rPr b="1" sz="1400" lang="en"/>
-              <a:t>/.*&lt;div class="m_search_titre_recette"&gt;&lt;a href=.*&gt;\(.*\)&lt;\/a&gt;&lt;\/div&gt;/ { s//\1/p;} </a:t>
-            </a:r>
-          </a:p>
-          <a:p>
-            <a:pPr rtl="0" lvl="0">
-              <a:lnSpc>
-                <a:spcPct val="115000"/>
-              </a:lnSpc>
-              <a:spcBef>
-                <a:spcPts val="0"/>
-              </a:spcBef>
-              <a:buClr>
-                <a:schemeClr val="dk1"/>
-              </a:buClr>
-              <a:buSzPct val="78571"/>
+              <a:buChar char="●"/>
+            </a:pPr>
+            <a:r>
+              <a:rPr sz="1800" lang="en"/>
+              <a:t>retrieve time of cooking and time of preparation</a:t>
+            </a:r>
+          </a:p>
+          <a:p>
+            <a:pPr rtl="0" lvl="0" indent="-298450" marL="457200">
+              <a:lnSpc>
+                <a:spcPct val="115000"/>
+              </a:lnSpc>
+              <a:spcBef>
+                <a:spcPts val="0"/>
+              </a:spcBef>
+              <a:spcAft>
+                <a:spcPts val="1000"/>
+              </a:spcAft>
+              <a:buClr>
+                <a:schemeClr val="dk1"/>
+              </a:buClr>
+              <a:buSzPct val="61111"/>
               <a:buFont typeface="Arial"/>
-              <a:buNone/>
-            </a:pPr>
-            <a:r>
-              <a:rPr sz="1400" lang="en"/>
-              <a:t>→ Research in the HTML content the elements corresponding to this regex.Same thing for preparation time, cooking time, type of recipe and votes. Differs from the regex for the number of persons</a:t>
-            </a:r>
-          </a:p>
-          <a:p>
-            <a:pPr rtl="0" lvl="0">
-              <a:lnSpc>
-                <a:spcPct val="115000"/>
-              </a:lnSpc>
-              <a:spcBef>
-                <a:spcPts val="0"/>
-              </a:spcBef>
-              <a:buClr>
-                <a:schemeClr val="dk1"/>
-              </a:buClr>
-              <a:buSzPct val="78571"/>
+              <a:buChar char="●"/>
+            </a:pPr>
+            <a:r>
+              <a:rPr sz="1800" lang="en"/>
+              <a:t>organise them by time of cooking</a:t>
+            </a:r>
+          </a:p>
+          <a:p>
+            <a:pPr rtl="0" lvl="0">
+              <a:lnSpc>
+                <a:spcPct val="115000"/>
+              </a:lnSpc>
+              <a:spcBef>
+                <a:spcPts val="0"/>
+              </a:spcBef>
+              <a:buClr>
+                <a:schemeClr val="dk1"/>
+              </a:buClr>
               <a:buFont typeface="Arial"/>
               <a:buNone/>
             </a:pPr>
             <a:r>
-              <a:rPr b="1" sz="1400" lang="en"/>
-              <a:t>...{ s//\1\r\n\2/;H;} g  s/\r\n/;/gp </a:t>
-            </a:r>
-            <a:r>
-              <a:rPr sz="1400" lang="en"/>
-              <a:t>(example)</a:t>
-            </a:r>
-          </a:p>
-          <a:p>
-            <a:pPr rtl="0" lvl="0">
-              <a:lnSpc>
-                <a:spcPct val="115000"/>
-              </a:lnSpc>
-              <a:spcBef>
-                <a:spcPts val="0"/>
-              </a:spcBef>
-              <a:buClr>
-                <a:schemeClr val="dk1"/>
-              </a:buClr>
-              <a:buSzPct val="78571"/>
+              <a:t/>
+            </a:r>
+            <a:endParaRPr sz="1800"/>
+          </a:p>
+          <a:p>
+            <a:pPr rtl="0" lvl="0">
+              <a:lnSpc>
+                <a:spcPct val="115000"/>
+              </a:lnSpc>
+              <a:spcBef>
+                <a:spcPts val="0"/>
+              </a:spcBef>
+              <a:buClr>
+                <a:schemeClr val="dk1"/>
+              </a:buClr>
               <a:buFont typeface="Arial"/>
               <a:buNone/>
             </a:pPr>
             <a:r>
-              <a:rPr sz="1400" lang="en"/>
-              <a:t>→ Use of the hold buffer and pattern buffer via h, H and g</a:t>
-            </a:r>
+              <a:t/>
+            </a:r>
+            <a:endParaRPr sz="1800"/>
           </a:p>
           <a:p>
             <a:pPr rtl="0" lvl="0">
@@ -4191,181 +4735,10 @@
             <a:r>
               <a:t/>
             </a:r>
-            <a:endParaRPr sz="1200"/>
-          </a:p>
-          <a:p>
-            <a:pPr rtl="0" lvl="0">
-              <a:lnSpc>
-                <a:spcPct val="115000"/>
-              </a:lnSpc>
-              <a:spcBef>
-                <a:spcPts val="0"/>
-              </a:spcBef>
-              <a:buClr>
-                <a:schemeClr val="dk1"/>
-              </a:buClr>
-              <a:buFont typeface="Arial"/>
-              <a:buNone/>
-            </a:pPr>
-            <a:r>
-              <a:t/>
-            </a:r>
-            <a:endParaRPr sz="1200"/>
-          </a:p>
-          <a:p>
-            <a:pPr rtl="0" lvl="0">
-              <a:lnSpc>
-                <a:spcPct val="115000"/>
-              </a:lnSpc>
-              <a:spcBef>
-                <a:spcPts val="0"/>
-              </a:spcBef>
-              <a:buClr>
-                <a:schemeClr val="dk1"/>
-              </a:buClr>
-              <a:buFont typeface="Arial"/>
-              <a:buNone/>
-            </a:pPr>
-            <a:r>
-              <a:t/>
-            </a:r>
-            <a:endParaRPr sz="1200"/>
-          </a:p>
-          <a:p>
-            <a:pPr rtl="0" lvl="0">
-              <a:lnSpc>
-                <a:spcPct val="115000"/>
-              </a:lnSpc>
-              <a:spcBef>
-                <a:spcPts val="0"/>
-              </a:spcBef>
-              <a:buClr>
-                <a:schemeClr val="dk1"/>
-              </a:buClr>
-              <a:buFont typeface="Arial"/>
-              <a:buNone/>
-            </a:pPr>
-            <a:r>
-              <a:t/>
-            </a:r>
-            <a:endParaRPr sz="1200"/>
-          </a:p>
-          <a:p>
-            <a:pPr rtl="0" lvl="0">
-              <a:lnSpc>
-                <a:spcPct val="115000"/>
-              </a:lnSpc>
-              <a:spcBef>
-                <a:spcPts val="0"/>
-              </a:spcBef>
-              <a:buClr>
-                <a:schemeClr val="dk1"/>
-              </a:buClr>
-              <a:buFont typeface="Arial"/>
-              <a:buNone/>
-            </a:pPr>
-            <a:r>
-              <a:t/>
-            </a:r>
-            <a:endParaRPr sz="1200"/>
-          </a:p>
-          <a:p>
-            <a:pPr rtl="0" lvl="0">
-              <a:lnSpc>
-                <a:spcPct val="115000"/>
-              </a:lnSpc>
-              <a:spcBef>
-                <a:spcPts val="0"/>
-              </a:spcBef>
-              <a:buClr>
-                <a:schemeClr val="dk1"/>
-              </a:buClr>
-              <a:buFont typeface="Arial"/>
-              <a:buNone/>
-            </a:pPr>
-            <a:r>
-              <a:t/>
-            </a:r>
-            <a:endParaRPr sz="1200"/>
-          </a:p>
-          <a:p>
-            <a:pPr rtl="0" lvl="0">
-              <a:lnSpc>
-                <a:spcPct val="115000"/>
-              </a:lnSpc>
-              <a:spcBef>
-                <a:spcPts val="0"/>
-              </a:spcBef>
-              <a:buClr>
-                <a:schemeClr val="dk1"/>
-              </a:buClr>
-              <a:buFont typeface="Arial"/>
-              <a:buNone/>
-            </a:pPr>
-            <a:r>
-              <a:t/>
-            </a:r>
-            <a:endParaRPr sz="1200"/>
-          </a:p>
-          <a:p>
-            <a:pPr rtl="0" lvl="0">
-              <a:lnSpc>
-                <a:spcPct val="115000"/>
-              </a:lnSpc>
-              <a:spcBef>
-                <a:spcPts val="0"/>
-              </a:spcBef>
-              <a:buClr>
-                <a:schemeClr val="dk1"/>
-              </a:buClr>
-              <a:buFont typeface="Arial"/>
-              <a:buNone/>
-            </a:pPr>
-            <a:r>
-              <a:t/>
-            </a:r>
             <a:endParaRPr sz="1800"/>
           </a:p>
           <a:p>
-            <a:pPr rtl="0" lvl="0">
-              <a:lnSpc>
-                <a:spcPct val="115000"/>
-              </a:lnSpc>
-              <a:spcBef>
-                <a:spcPts val="0"/>
-              </a:spcBef>
-              <a:buClr>
-                <a:schemeClr val="dk1"/>
-              </a:buClr>
-              <a:buFont typeface="Arial"/>
-              <a:buNone/>
-            </a:pPr>
-            <a:r>
-              <a:t/>
-            </a:r>
-            <a:endParaRPr sz="1800"/>
-          </a:p>
-          <a:p>
-            <a:pPr rtl="0" lvl="0">
-              <a:lnSpc>
-                <a:spcPct val="115000"/>
-              </a:lnSpc>
-              <a:spcBef>
-                <a:spcPts val="0"/>
-              </a:spcBef>
-              <a:buClr>
-                <a:schemeClr val="dk1"/>
-              </a:buClr>
-              <a:buFont typeface="Arial"/>
-              <a:buNone/>
-            </a:pPr>
-            <a:r>
-              <a:t/>
-            </a:r>
-            <a:endParaRPr sz="1800"/>
-          </a:p>
-          <a:p>
-            <a:pPr rtl="0" lvl="0">
+            <a:pPr>
               <a:spcBef>
                 <a:spcPts val="0"/>
               </a:spcBef>
@@ -4380,7 +4753,7 @@
       </p:sp>
       <p:pic>
         <p:nvPicPr>
-          <p:cNvPr id="55" name="Shape 55"/>
+          <p:cNvPr id="59" name="Shape 59"/>
           <p:cNvPicPr preferRelativeResize="0"/>
           <p:nvPr/>
         </p:nvPicPr>
@@ -4392,30 +4765,8 @@
         </p:blipFill>
         <p:spPr>
           <a:xfrm>
-            <a:off y="1350675" x="7550100"/>
+            <a:off y="1350700" x="7173250"/>
             <a:ext cy="1353600" cx="1353600"/>
-          </a:xfrm>
-          <a:prstGeom prst="rect">
-            <a:avLst/>
-          </a:prstGeom>
-        </p:spPr>
-      </p:pic>
-      <p:pic>
-        <p:nvPicPr>
-          <p:cNvPr id="56" name="Shape 56"/>
-          <p:cNvPicPr preferRelativeResize="0"/>
-          <p:nvPr/>
-        </p:nvPicPr>
-        <p:blipFill>
-          <a:blip r:embed="rId4"/>
-          <a:stretch>
-            <a:fillRect/>
-          </a:stretch>
-        </p:blipFill>
-        <p:spPr>
-          <a:xfrm>
-            <a:off y="3465450" x="7597237"/>
-            <a:ext cy="1053725" cx="1259325"/>
           </a:xfrm>
           <a:prstGeom prst="rect">
             <a:avLst/>
@@ -4438,7 +4789,7 @@
   <p:cSld>
     <p:spTree>
       <p:nvGrpSpPr>
-        <p:cNvPr id="60" name="Shape 60"/>
+        <p:cNvPr id="63" name="Shape 63"/>
         <p:cNvGrpSpPr/>
         <p:nvPr/>
       </p:nvGrpSpPr>
@@ -4452,7 +4803,7 @@
       </p:grpSpPr>
       <p:sp>
         <p:nvSpPr>
-          <p:cNvPr id="61" name="Shape 61"/>
+          <p:cNvPr id="64" name="Shape 64"/>
           <p:cNvSpPr txBox="1"/>
           <p:nvPr>
             <p:ph type="title"/>
@@ -4460,7 +4811,7 @@
         </p:nvSpPr>
         <p:spPr>
           <a:xfrm>
-            <a:off y="205978" x="457200"/>
+            <a:off y="188203" x="457200"/>
             <a:ext cy="857400" cx="8229600"/>
           </a:xfrm>
           <a:prstGeom prst="rect">
@@ -4473,7 +4824,7 @@
           </a:bodyPr>
           <a:lstStyle/>
           <a:p>
-            <a:pPr>
+            <a:pPr rtl="0" lvl="0">
               <a:spcBef>
                 <a:spcPts val="0"/>
               </a:spcBef>
@@ -4488,7 +4839,7 @@
       </p:sp>
       <p:sp>
         <p:nvSpPr>
-          <p:cNvPr id="62" name="Shape 62"/>
+          <p:cNvPr id="65" name="Shape 65"/>
           <p:cNvSpPr txBox="1"/>
           <p:nvPr>
             <p:ph idx="1" type="body"/>
@@ -4496,8 +4847,8 @@
         </p:nvSpPr>
         <p:spPr>
           <a:xfrm>
-            <a:off y="1212025" x="457200"/>
-            <a:ext cy="3725699" cx="8229600"/>
+            <a:off y="1417800" x="457200"/>
+            <a:ext cy="3725699" cx="7327800"/>
           </a:xfrm>
           <a:prstGeom prst="rect">
             <a:avLst/>
@@ -4516,6 +4867,11 @@
               <a:spcBef>
                 <a:spcPts val="0"/>
               </a:spcBef>
+              <a:buClr>
+                <a:schemeClr val="dk1"/>
+              </a:buClr>
+              <a:buSzPct val="61111"/>
+              <a:buFont typeface="Arial"/>
               <a:buNone/>
             </a:pPr>
             <a:r>
@@ -4534,296 +4890,461 @@
               <a:buClr>
                 <a:schemeClr val="dk1"/>
               </a:buClr>
-              <a:buSzPct val="91666"/>
               <a:buFont typeface="Arial"/>
               <a:buNone/>
             </a:pPr>
             <a:r>
-              <a:rPr b="1" sz="1200" lang="en"/>
-              <a:t>sed -n -f total.sed /tmp/raw</a:t>
-            </a:r>
-          </a:p>
-          <a:p>
-            <a:pPr rtl="0" lvl="0">
-              <a:lnSpc>
-                <a:spcPct val="115000"/>
-              </a:lnSpc>
-              <a:spcBef>
-                <a:spcPts val="0"/>
-              </a:spcBef>
-              <a:buClr>
-                <a:schemeClr val="dk1"/>
-              </a:buClr>
-              <a:buSzPct val="91666"/>
+              <a:t/>
+            </a:r>
+            <a:endParaRPr u="sng" b="1" sz="1800"/>
+          </a:p>
+          <a:p>
+            <a:pPr rtl="0" lvl="0">
+              <a:lnSpc>
+                <a:spcPct val="115000"/>
+              </a:lnSpc>
+              <a:spcBef>
+                <a:spcPts val="0"/>
+              </a:spcBef>
+              <a:buClr>
+                <a:schemeClr val="dk1"/>
+              </a:buClr>
+              <a:buSzPct val="84615"/>
               <a:buFont typeface="Arial"/>
               <a:buNone/>
             </a:pPr>
             <a:r>
-              <a:rPr sz="1200" lang="en"/>
-              <a:t>→ Extract the wanted data from the HTML retrieved using the total.sed file. total.sed contains every regex</a:t>
-            </a:r>
-          </a:p>
-          <a:p>
-            <a:pPr rtl="0" lvl="0">
-              <a:lnSpc>
-                <a:spcPct val="115000"/>
-              </a:lnSpc>
-              <a:spcBef>
-                <a:spcPts val="0"/>
-              </a:spcBef>
-              <a:buClr>
-                <a:schemeClr val="dk1"/>
-              </a:buClr>
-              <a:buSzPct val="91666"/>
+              <a:rPr b="1" sz="1300" lang="en"/>
+              <a:t>$ ./marmiton.sh</a:t>
+            </a:r>
+            <a:r>
+              <a:rPr sz="1300" lang="en"/>
+              <a:t>→ Launches the script in the bash shell</a:t>
+            </a:r>
+          </a:p>
+          <a:p>
+            <a:pPr rtl="0" lvl="0">
+              <a:lnSpc>
+                <a:spcPct val="115000"/>
+              </a:lnSpc>
+              <a:spcBef>
+                <a:spcPts val="0"/>
+              </a:spcBef>
+              <a:buClr>
+                <a:schemeClr val="dk1"/>
+              </a:buClr>
+              <a:buSzPct val="84615"/>
               <a:buFont typeface="Arial"/>
               <a:buNone/>
             </a:pPr>
             <a:r>
-              <a:rPr b="1" sz="1200" lang="en"/>
-              <a:t>$ ./marmiton.sh cheesecake</a:t>
-            </a:r>
-            <a:r>
-              <a:rPr sz="1200" lang="en"/>
-              <a:t> 2→ Does a curl request on the page result for cheesecake</a:t>
-            </a:r>
-          </a:p>
-          <a:p>
-            <a:pPr rtl="0" lvl="0">
-              <a:lnSpc>
-                <a:spcPct val="115000"/>
-              </a:lnSpc>
-              <a:spcBef>
-                <a:spcPts val="0"/>
-              </a:spcBef>
-              <a:buClr>
-                <a:schemeClr val="dk1"/>
-              </a:buClr>
-              <a:buSzPct val="91666"/>
+              <a:rPr b="1" sz="1300" lang="en"/>
+              <a:t>for i in {0..50..10}</a:t>
+            </a:r>
+          </a:p>
+          <a:p>
+            <a:pPr rtl="0" lvl="0">
+              <a:lnSpc>
+                <a:spcPct val="115000"/>
+              </a:lnSpc>
+              <a:spcBef>
+                <a:spcPts val="0"/>
+              </a:spcBef>
+              <a:buClr>
+                <a:schemeClr val="dk1"/>
+              </a:buClr>
+              <a:buSzPct val="84615"/>
               <a:buFont typeface="Arial"/>
               <a:buNone/>
             </a:pPr>
             <a:r>
-              <a:rPr b="1" sz="1200" lang="en"/>
-              <a:t>sort --field-separator=';' -rn --key=$2 |column -t -s ";" </a:t>
-            </a:r>
-          </a:p>
-          <a:p>
-            <a:pPr rtl="0" lvl="0">
-              <a:lnSpc>
-                <a:spcPct val="115000"/>
-              </a:lnSpc>
-              <a:spcBef>
-                <a:spcPts val="0"/>
-              </a:spcBef>
-              <a:buClr>
-                <a:schemeClr val="dk1"/>
-              </a:buClr>
-              <a:buSzPct val="91666"/>
+              <a:rPr b="1" sz="1300" lang="en"/>
+              <a:t>do</a:t>
+            </a:r>
+          </a:p>
+          <a:p>
+            <a:pPr rtl="0" lvl="0">
+              <a:lnSpc>
+                <a:spcPct val="115000"/>
+              </a:lnSpc>
+              <a:spcBef>
+                <a:spcPts val="0"/>
+              </a:spcBef>
+              <a:buClr>
+                <a:schemeClr val="dk1"/>
+              </a:buClr>
+              <a:buSzPct val="84615"/>
               <a:buFont typeface="Arial"/>
               <a:buNone/>
             </a:pPr>
             <a:r>
-              <a:rPr sz="1200" lang="en"/>
-              <a:t>→ Sort decreasingly the data by votes, separating each element belonging to a certain column by a ‘;’</a:t>
-            </a:r>
-          </a:p>
-          <a:p>
-            <a:pPr rtl="0" lvl="0">
-              <a:lnSpc>
-                <a:spcPct val="115000"/>
-              </a:lnSpc>
-              <a:spcBef>
-                <a:spcPts val="0"/>
-              </a:spcBef>
-              <a:buNone/>
-            </a:pPr>
-            <a:r>
-              <a:rPr b="1" sz="1200" lang="en"/>
-              <a:t>echo "What recipe are you searching for? :"       </a:t>
-            </a:r>
-          </a:p>
-          <a:p>
-            <a:pPr rtl="0" lvl="0">
-              <a:lnSpc>
-                <a:spcPct val="115000"/>
-              </a:lnSpc>
-              <a:spcBef>
-                <a:spcPts val="0"/>
-              </a:spcBef>
-              <a:buClr>
-                <a:schemeClr val="dk1"/>
-              </a:buClr>
-              <a:buSzPct val="91666"/>
+              <a:rPr b="1" sz="1300" lang="en"/>
+              <a:t>curl -s http://www.marmiton.org/recettes/recherche.aspx?aqt=$1\&amp;start=$i &gt;&gt; /tmp/raw</a:t>
+            </a:r>
+          </a:p>
+          <a:p>
+            <a:pPr rtl="0" lvl="0">
+              <a:lnSpc>
+                <a:spcPct val="115000"/>
+              </a:lnSpc>
+              <a:spcBef>
+                <a:spcPts val="0"/>
+              </a:spcBef>
+              <a:buClr>
+                <a:schemeClr val="dk1"/>
+              </a:buClr>
+              <a:buSzPct val="84615"/>
               <a:buFont typeface="Arial"/>
               <a:buNone/>
             </a:pPr>
             <a:r>
-              <a:rPr b="1" sz="1200" lang="en"/>
-              <a:t>read recipe</a:t>
-            </a:r>
-          </a:p>
-          <a:p>
-            <a:pPr rtl="0" lvl="0">
-              <a:lnSpc>
-                <a:spcPct val="115000"/>
-              </a:lnSpc>
-              <a:spcBef>
-                <a:spcPts val="0"/>
-              </a:spcBef>
-              <a:buNone/>
-            </a:pPr>
-            <a:r>
-              <a:rPr sz="1200" lang="en"/>
-              <a:t>→ Ask the user to type in the thing he wants to prepare. Read retrieves the words</a:t>
-            </a:r>
-          </a:p>
-          <a:p>
-            <a:pPr rtl="0" lvl="0">
-              <a:lnSpc>
-                <a:spcPct val="115000"/>
-              </a:lnSpc>
-              <a:spcBef>
-                <a:spcPts val="0"/>
-              </a:spcBef>
-              <a:buClr>
-                <a:schemeClr val="dk1"/>
-              </a:buClr>
-              <a:buSzPct val="91666"/>
+              <a:rPr b="1" sz="1300" lang="en"/>
+              <a:t>done</a:t>
+            </a:r>
+          </a:p>
+          <a:p>
+            <a:pPr rtl="0" lvl="0">
+              <a:lnSpc>
+                <a:spcPct val="115000"/>
+              </a:lnSpc>
+              <a:spcBef>
+                <a:spcPts val="0"/>
+              </a:spcBef>
+              <a:buClr>
+                <a:schemeClr val="dk1"/>
+              </a:buClr>
+              <a:buSzPct val="84615"/>
               <a:buFont typeface="Arial"/>
               <a:buNone/>
             </a:pPr>
             <a:r>
-              <a:rPr b="1" sz="1200" lang="en"/>
-              <a:t>case $num in</a:t>
-            </a:r>
-          </a:p>
-          <a:p>
-            <a:pPr rtl="0" lvl="0">
-              <a:lnSpc>
-                <a:spcPct val="115000"/>
-              </a:lnSpc>
-              <a:spcBef>
-                <a:spcPts val="0"/>
-              </a:spcBef>
-              <a:buClr>
-                <a:schemeClr val="dk1"/>
-              </a:buClr>
-              <a:buSzPct val="91666"/>
+              <a:rPr sz="1300" lang="en"/>
+              <a:t>→ Loop retrieving the HTML content of the first six pages result and stores it in a temp file</a:t>
+            </a:r>
+          </a:p>
+          <a:p>
+            <a:pPr rtl="0" lvl="0">
+              <a:lnSpc>
+                <a:spcPct val="115000"/>
+              </a:lnSpc>
+              <a:spcBef>
+                <a:spcPts val="0"/>
+              </a:spcBef>
+              <a:buClr>
+                <a:schemeClr val="dk1"/>
+              </a:buClr>
+              <a:buSzPct val="84615"/>
               <a:buFont typeface="Arial"/>
               <a:buNone/>
             </a:pPr>
             <a:r>
-              <a:rPr b="1" sz="1200" lang="en"/>
-              <a:t>    1)</a:t>
-            </a:r>
-          </a:p>
-          <a:p>
-            <a:pPr rtl="0" lvl="0">
-              <a:lnSpc>
-                <a:spcPct val="115000"/>
-              </a:lnSpc>
-              <a:spcBef>
-                <a:spcPts val="0"/>
-              </a:spcBef>
-              <a:buClr>
-                <a:schemeClr val="dk1"/>
-              </a:buClr>
-              <a:buSzPct val="91666"/>
+              <a:rPr b="1" sz="1300" lang="en"/>
+              <a:t>/.*&lt;div class="m_search_titre_recette"&gt;&lt;a href=.*&gt;\(.*\)&lt;\/a&gt;&lt;\/div&gt;/ { s//\1/p;} </a:t>
+            </a:r>
+          </a:p>
+          <a:p>
+            <a:pPr rtl="0" lvl="0">
+              <a:lnSpc>
+                <a:spcPct val="115000"/>
+              </a:lnSpc>
+              <a:spcBef>
+                <a:spcPts val="0"/>
+              </a:spcBef>
+              <a:buClr>
+                <a:schemeClr val="dk1"/>
+              </a:buClr>
+              <a:buSzPct val="84615"/>
               <a:buFont typeface="Arial"/>
               <a:buNone/>
             </a:pPr>
             <a:r>
-              <a:rPr b="1" sz="1200" lang="en"/>
-              <a:t>   	 sed -n -f total.sed /tmp/raw | sort --field-separator=';' --key=1 |column -t -s ";"</a:t>
-            </a:r>
-          </a:p>
-          <a:p>
-            <a:pPr rtl="0" lvl="0">
-              <a:lnSpc>
-                <a:spcPct val="115000"/>
-              </a:lnSpc>
-              <a:spcBef>
-                <a:spcPts val="0"/>
-              </a:spcBef>
-              <a:buClr>
-                <a:schemeClr val="dk1"/>
-              </a:buClr>
-              <a:buSzPct val="91666"/>
+              <a:rPr sz="1300" lang="en"/>
+              <a:t>→ Research in the HTML content the elements corresponding to this regex.Same thing for preparation time, cooking time, type of recipe and votes. Differs from the regex for the number of persons</a:t>
+            </a:r>
+          </a:p>
+          <a:p>
+            <a:pPr rtl="0" lvl="0">
+              <a:lnSpc>
+                <a:spcPct val="115000"/>
+              </a:lnSpc>
+              <a:spcBef>
+                <a:spcPts val="0"/>
+              </a:spcBef>
+              <a:buClr>
+                <a:schemeClr val="dk1"/>
+              </a:buClr>
               <a:buFont typeface="Arial"/>
               <a:buNone/>
             </a:pPr>
             <a:r>
-              <a:rPr b="1" sz="1200" lang="en"/>
-              <a:t>   	 ;;</a:t>
-            </a:r>
-          </a:p>
-          <a:p>
-            <a:pPr rtl="0" lvl="0">
-              <a:lnSpc>
-                <a:spcPct val="115000"/>
-              </a:lnSpc>
-              <a:spcBef>
-                <a:spcPts val="0"/>
-              </a:spcBef>
-              <a:buClr>
-                <a:schemeClr val="dk1"/>
-              </a:buClr>
-              <a:buSzPct val="91666"/>
+              <a:t/>
+            </a:r>
+            <a:endParaRPr sz="1300"/>
+          </a:p>
+          <a:p>
+            <a:pPr rtl="0" lvl="0">
+              <a:lnSpc>
+                <a:spcPct val="115000"/>
+              </a:lnSpc>
+              <a:spcBef>
+                <a:spcPts val="0"/>
+              </a:spcBef>
+              <a:buClr>
+                <a:schemeClr val="dk1"/>
+              </a:buClr>
               <a:buFont typeface="Arial"/>
               <a:buNone/>
             </a:pPr>
             <a:r>
-              <a:rPr b="1" sz="1200" lang="en"/>
-              <a:t>    2)</a:t>
-            </a:r>
-          </a:p>
-          <a:p>
-            <a:pPr rtl="0" lvl="0">
-              <a:lnSpc>
-                <a:spcPct val="115000"/>
-              </a:lnSpc>
-              <a:spcBef>
-                <a:spcPts val="0"/>
-              </a:spcBef>
-              <a:buNone/>
-            </a:pPr>
-            <a:r>
-              <a:rPr b="1" sz="1200" lang="en"/>
-              <a:t>   	 …</a:t>
-            </a:r>
-          </a:p>
-          <a:p>
-            <a:pPr rtl="0" lvl="0">
-              <a:lnSpc>
-                <a:spcPct val="115000"/>
-              </a:lnSpc>
-              <a:spcBef>
-                <a:spcPts val="0"/>
-              </a:spcBef>
-              <a:buNone/>
-            </a:pPr>
-            <a:r>
-              <a:rPr b="1" sz="1200" lang="en"/>
-              <a:t>esac</a:t>
-            </a:r>
-          </a:p>
-          <a:p>
-            <a:pPr rtl="0" lvl="0">
-              <a:lnSpc>
-                <a:spcPct val="115000"/>
-              </a:lnSpc>
-              <a:spcBef>
-                <a:spcPts val="0"/>
-              </a:spcBef>
-              <a:buNone/>
-            </a:pPr>
-            <a:r>
-              <a:rPr sz="1200" lang="en"/>
-              <a:t>→ According to what the user wanted to sort by, it launches the right command</a:t>
-            </a:r>
+              <a:t/>
+            </a:r>
+            <a:endParaRPr sz="1300"/>
+          </a:p>
+          <a:p>
+            <a:pPr rtl="0" lvl="0">
+              <a:lnSpc>
+                <a:spcPct val="115000"/>
+              </a:lnSpc>
+              <a:spcBef>
+                <a:spcPts val="0"/>
+              </a:spcBef>
+              <a:buClr>
+                <a:schemeClr val="dk1"/>
+              </a:buClr>
+              <a:buFont typeface="Arial"/>
+              <a:buNone/>
+            </a:pPr>
+            <a:r>
+              <a:t/>
+            </a:r>
+            <a:endParaRPr sz="1300"/>
+          </a:p>
+          <a:p>
+            <a:pPr rtl="0" lvl="0">
+              <a:lnSpc>
+                <a:spcPct val="115000"/>
+              </a:lnSpc>
+              <a:spcBef>
+                <a:spcPts val="0"/>
+              </a:spcBef>
+              <a:buClr>
+                <a:schemeClr val="dk1"/>
+              </a:buClr>
+              <a:buFont typeface="Arial"/>
+              <a:buNone/>
+            </a:pPr>
+            <a:r>
+              <a:t/>
+            </a:r>
+            <a:endParaRPr sz="1200"/>
+          </a:p>
+          <a:p>
+            <a:pPr rtl="0" lvl="0">
+              <a:lnSpc>
+                <a:spcPct val="115000"/>
+              </a:lnSpc>
+              <a:spcBef>
+                <a:spcPts val="0"/>
+              </a:spcBef>
+              <a:buClr>
+                <a:schemeClr val="dk1"/>
+              </a:buClr>
+              <a:buFont typeface="Arial"/>
+              <a:buNone/>
+            </a:pPr>
+            <a:r>
+              <a:t/>
+            </a:r>
+            <a:endParaRPr sz="1200"/>
+          </a:p>
+          <a:p>
+            <a:pPr rtl="0" lvl="0">
+              <a:lnSpc>
+                <a:spcPct val="115000"/>
+              </a:lnSpc>
+              <a:spcBef>
+                <a:spcPts val="0"/>
+              </a:spcBef>
+              <a:buClr>
+                <a:schemeClr val="dk1"/>
+              </a:buClr>
+              <a:buFont typeface="Arial"/>
+              <a:buNone/>
+            </a:pPr>
+            <a:r>
+              <a:t/>
+            </a:r>
+            <a:endParaRPr sz="1200"/>
+          </a:p>
+          <a:p>
+            <a:pPr rtl="0" lvl="0">
+              <a:lnSpc>
+                <a:spcPct val="115000"/>
+              </a:lnSpc>
+              <a:spcBef>
+                <a:spcPts val="0"/>
+              </a:spcBef>
+              <a:buClr>
+                <a:schemeClr val="dk1"/>
+              </a:buClr>
+              <a:buFont typeface="Arial"/>
+              <a:buNone/>
+            </a:pPr>
+            <a:r>
+              <a:t/>
+            </a:r>
+            <a:endParaRPr sz="1200"/>
+          </a:p>
+          <a:p>
+            <a:pPr rtl="0" lvl="0">
+              <a:lnSpc>
+                <a:spcPct val="115000"/>
+              </a:lnSpc>
+              <a:spcBef>
+                <a:spcPts val="0"/>
+              </a:spcBef>
+              <a:buClr>
+                <a:schemeClr val="dk1"/>
+              </a:buClr>
+              <a:buFont typeface="Arial"/>
+              <a:buNone/>
+            </a:pPr>
+            <a:r>
+              <a:t/>
+            </a:r>
+            <a:endParaRPr sz="1200"/>
+          </a:p>
+          <a:p>
+            <a:pPr rtl="0" lvl="0">
+              <a:lnSpc>
+                <a:spcPct val="115000"/>
+              </a:lnSpc>
+              <a:spcBef>
+                <a:spcPts val="0"/>
+              </a:spcBef>
+              <a:buClr>
+                <a:schemeClr val="dk1"/>
+              </a:buClr>
+              <a:buFont typeface="Arial"/>
+              <a:buNone/>
+            </a:pPr>
+            <a:r>
+              <a:t/>
+            </a:r>
+            <a:endParaRPr sz="1200"/>
+          </a:p>
+          <a:p>
+            <a:pPr rtl="0" lvl="0">
+              <a:lnSpc>
+                <a:spcPct val="115000"/>
+              </a:lnSpc>
+              <a:spcBef>
+                <a:spcPts val="0"/>
+              </a:spcBef>
+              <a:buClr>
+                <a:schemeClr val="dk1"/>
+              </a:buClr>
+              <a:buFont typeface="Arial"/>
+              <a:buNone/>
+            </a:pPr>
+            <a:r>
+              <a:t/>
+            </a:r>
+            <a:endParaRPr sz="1200"/>
+          </a:p>
+          <a:p>
+            <a:pPr rtl="0" lvl="0">
+              <a:lnSpc>
+                <a:spcPct val="115000"/>
+              </a:lnSpc>
+              <a:spcBef>
+                <a:spcPts val="0"/>
+              </a:spcBef>
+              <a:buClr>
+                <a:schemeClr val="dk1"/>
+              </a:buClr>
+              <a:buFont typeface="Arial"/>
+              <a:buNone/>
+            </a:pPr>
+            <a:r>
+              <a:t/>
+            </a:r>
+            <a:endParaRPr sz="1800"/>
+          </a:p>
+          <a:p>
+            <a:pPr rtl="0" lvl="0">
+              <a:lnSpc>
+                <a:spcPct val="115000"/>
+              </a:lnSpc>
+              <a:spcBef>
+                <a:spcPts val="0"/>
+              </a:spcBef>
+              <a:buClr>
+                <a:schemeClr val="dk1"/>
+              </a:buClr>
+              <a:buFont typeface="Arial"/>
+              <a:buNone/>
+            </a:pPr>
+            <a:r>
+              <a:t/>
+            </a:r>
+            <a:endParaRPr sz="1800"/>
+          </a:p>
+          <a:p>
+            <a:pPr rtl="0" lvl="0">
+              <a:lnSpc>
+                <a:spcPct val="115000"/>
+              </a:lnSpc>
+              <a:spcBef>
+                <a:spcPts val="0"/>
+              </a:spcBef>
+              <a:buClr>
+                <a:schemeClr val="dk1"/>
+              </a:buClr>
+              <a:buFont typeface="Arial"/>
+              <a:buNone/>
+            </a:pPr>
+            <a:r>
+              <a:t/>
+            </a:r>
+            <a:endParaRPr sz="1800"/>
+          </a:p>
+          <a:p>
+            <a:pPr rtl="0" lvl="0">
+              <a:spcBef>
+                <a:spcPts val="0"/>
+              </a:spcBef>
+              <a:buNone/>
+            </a:pPr>
+            <a:r>
+              <a:t/>
+            </a:r>
+            <a:endParaRPr sz="1800"/>
           </a:p>
         </p:txBody>
       </p:sp>
+      <p:pic>
+        <p:nvPicPr>
+          <p:cNvPr id="66" name="Shape 66"/>
+          <p:cNvPicPr preferRelativeResize="0"/>
+          <p:nvPr/>
+        </p:nvPicPr>
+        <p:blipFill>
+          <a:blip r:embed="rId3"/>
+          <a:stretch>
+            <a:fillRect/>
+          </a:stretch>
+        </p:blipFill>
+        <p:spPr>
+          <a:xfrm>
+            <a:off y="1766900" x="7597250"/>
+            <a:ext cy="1353600" cx="1353600"/>
+          </a:xfrm>
+          <a:prstGeom prst="rect">
+            <a:avLst/>
+          </a:prstGeom>
+        </p:spPr>
+      </p:pic>
     </p:spTree>
   </p:cSld>
   <p:clrMapOvr>
@@ -4840,7 +5361,7 @@
   <p:cSld>
     <p:spTree>
       <p:nvGrpSpPr>
-        <p:cNvPr id="66" name="Shape 66"/>
+        <p:cNvPr id="70" name="Shape 70"/>
         <p:cNvGrpSpPr/>
         <p:nvPr/>
       </p:nvGrpSpPr>
@@ -4854,7 +5375,7 @@
       </p:grpSpPr>
       <p:sp>
         <p:nvSpPr>
-          <p:cNvPr id="67" name="Shape 67"/>
+          <p:cNvPr id="71" name="Shape 71"/>
           <p:cNvSpPr txBox="1"/>
           <p:nvPr>
             <p:ph type="title"/>
@@ -4883,34 +5404,289 @@
             </a:pPr>
             <a:r>
               <a:rPr lang="en"/>
-              <a:t>Script using baguette</a:t>
-            </a:r>
+              <a:t>Progress status (phase 2)</a:t>
+            </a:r>
+          </a:p>
+        </p:txBody>
+      </p:sp>
+      <p:sp>
+        <p:nvSpPr>
+          <p:cNvPr id="72" name="Shape 72"/>
+          <p:cNvSpPr txBox="1"/>
+          <p:nvPr>
+            <p:ph idx="1" type="body"/>
+          </p:nvPr>
+        </p:nvSpPr>
+        <p:spPr>
+          <a:xfrm>
+            <a:off y="1417800" x="457200"/>
+            <a:ext cy="3725699" cx="8229600"/>
+          </a:xfrm>
+          <a:prstGeom prst="rect">
+            <a:avLst/>
+          </a:prstGeom>
+        </p:spPr>
+        <p:txBody>
+          <a:bodyPr bIns="91425" rIns="91425" lIns="91425" tIns="91425" anchor="t" anchorCtr="0">
+            <a:noAutofit/>
+          </a:bodyPr>
+          <a:lstStyle/>
+          <a:p>
+            <a:pPr rtl="0" lvl="0">
+              <a:lnSpc>
+                <a:spcPct val="115000"/>
+              </a:lnSpc>
+              <a:spcBef>
+                <a:spcPts val="0"/>
+              </a:spcBef>
+              <a:buNone/>
+            </a:pPr>
+            <a:r>
+              <a:rPr u="sng" b="1" sz="1800" lang="en"/>
+              <a:t>DONE:</a:t>
+            </a:r>
+          </a:p>
+          <a:p>
+            <a:pPr rtl="0" lvl="0">
+              <a:lnSpc>
+                <a:spcPct val="115000"/>
+              </a:lnSpc>
+              <a:spcBef>
+                <a:spcPts val="0"/>
+              </a:spcBef>
+              <a:buNone/>
+            </a:pPr>
+            <a:r>
+              <a:t/>
+            </a:r>
+            <a:endParaRPr u="sng" b="1" sz="1800"/>
+          </a:p>
+          <a:p>
+            <a:pPr rtl="0" lvl="0">
+              <a:lnSpc>
+                <a:spcPct val="115000"/>
+              </a:lnSpc>
+              <a:spcBef>
+                <a:spcPts val="0"/>
+              </a:spcBef>
+              <a:buClr>
+                <a:schemeClr val="dk1"/>
+              </a:buClr>
+              <a:buSzPct val="84615"/>
+              <a:buFont typeface="Arial"/>
+              <a:buNone/>
+            </a:pPr>
+            <a:r>
+              <a:rPr b="1" sz="1300" lang="en"/>
+              <a:t>...{ s//\1\r\n\2/;H;} g  s/\r\n/;/gp </a:t>
+            </a:r>
+            <a:r>
+              <a:rPr sz="1300" lang="en"/>
+              <a:t>(example)</a:t>
+            </a:r>
+          </a:p>
+          <a:p>
+            <a:pPr rtl="0" lvl="0">
+              <a:lnSpc>
+                <a:spcPct val="115000"/>
+              </a:lnSpc>
+              <a:spcBef>
+                <a:spcPts val="0"/>
+              </a:spcBef>
+              <a:buClr>
+                <a:schemeClr val="dk1"/>
+              </a:buClr>
+              <a:buSzPct val="84615"/>
+              <a:buFont typeface="Arial"/>
+              <a:buNone/>
+            </a:pPr>
+            <a:r>
+              <a:rPr sz="1300" lang="en"/>
+              <a:t>→ Changing every regex with the use of the hold buffer and pattern buffer via h, H and g</a:t>
+            </a:r>
+          </a:p>
+          <a:p>
+            <a:pPr rtl="0" lvl="0">
+              <a:lnSpc>
+                <a:spcPct val="115000"/>
+              </a:lnSpc>
+              <a:spcBef>
+                <a:spcPts val="0"/>
+              </a:spcBef>
+              <a:buClr>
+                <a:schemeClr val="dk1"/>
+              </a:buClr>
+              <a:buSzPct val="84615"/>
+              <a:buFont typeface="Arial"/>
+              <a:buNone/>
+            </a:pPr>
+            <a:r>
+              <a:rPr b="1" sz="1300" lang="en"/>
+              <a:t>sed -n -f total.sed /tmp/raw</a:t>
+            </a:r>
+          </a:p>
+          <a:p>
+            <a:pPr rtl="0" lvl="0">
+              <a:lnSpc>
+                <a:spcPct val="115000"/>
+              </a:lnSpc>
+              <a:spcBef>
+                <a:spcPts val="0"/>
+              </a:spcBef>
+              <a:buClr>
+                <a:schemeClr val="dk1"/>
+              </a:buClr>
+              <a:buSzPct val="84615"/>
+              <a:buFont typeface="Arial"/>
+              <a:buNone/>
+            </a:pPr>
+            <a:r>
+              <a:rPr sz="1300" lang="en"/>
+              <a:t>→ Extract the wanted data from the HTML retrieved using the total.sed file. total.sed contains every regex</a:t>
+            </a:r>
+          </a:p>
+          <a:p>
+            <a:pPr rtl="0" lvl="0">
+              <a:lnSpc>
+                <a:spcPct val="115000"/>
+              </a:lnSpc>
+              <a:spcBef>
+                <a:spcPts val="0"/>
+              </a:spcBef>
+              <a:buClr>
+                <a:schemeClr val="dk1"/>
+              </a:buClr>
+              <a:buSzPct val="84615"/>
+              <a:buFont typeface="Arial"/>
+              <a:buNone/>
+            </a:pPr>
+            <a:r>
+              <a:rPr b="1" sz="1300" lang="en"/>
+              <a:t>sort --field-separator=';' -rn --key=$2 |column -t -s ";" </a:t>
+            </a:r>
+          </a:p>
+          <a:p>
+            <a:pPr rtl="0" lvl="0">
+              <a:lnSpc>
+                <a:spcPct val="115000"/>
+              </a:lnSpc>
+              <a:spcBef>
+                <a:spcPts val="0"/>
+              </a:spcBef>
+              <a:buClr>
+                <a:schemeClr val="dk1"/>
+              </a:buClr>
+              <a:buSzPct val="84615"/>
+              <a:buFont typeface="Arial"/>
+              <a:buNone/>
+            </a:pPr>
+            <a:r>
+              <a:rPr sz="1300" lang="en"/>
+              <a:t>→ Sort decreasingly the data by votes, separating each element belonging to a certain column by a ‘;’</a:t>
+            </a:r>
+          </a:p>
+          <a:p>
+            <a:pPr rtl="0" lvl="0">
+              <a:lnSpc>
+                <a:spcPct val="115000"/>
+              </a:lnSpc>
+              <a:spcBef>
+                <a:spcPts val="0"/>
+              </a:spcBef>
+              <a:buNone/>
+            </a:pPr>
+            <a:r>
+              <a:rPr b="1" sz="1300" lang="en"/>
+              <a:t>echo "What recipe are you searching for? :"       </a:t>
+            </a:r>
+          </a:p>
+          <a:p>
+            <a:pPr rtl="0" lvl="0">
+              <a:lnSpc>
+                <a:spcPct val="115000"/>
+              </a:lnSpc>
+              <a:spcBef>
+                <a:spcPts val="0"/>
+              </a:spcBef>
+              <a:buClr>
+                <a:schemeClr val="dk1"/>
+              </a:buClr>
+              <a:buSzPct val="84615"/>
+              <a:buFont typeface="Arial"/>
+              <a:buNone/>
+            </a:pPr>
+            <a:r>
+              <a:rPr b="1" sz="1300" lang="en"/>
+              <a:t>read recipe</a:t>
+            </a:r>
+          </a:p>
+          <a:p>
+            <a:pPr rtl="0" lvl="0">
+              <a:lnSpc>
+                <a:spcPct val="115000"/>
+              </a:lnSpc>
+              <a:spcBef>
+                <a:spcPts val="0"/>
+              </a:spcBef>
+              <a:buNone/>
+            </a:pPr>
+            <a:r>
+              <a:rPr sz="1300" lang="en"/>
+              <a:t>→ Ask the user to type in the thing he wants to prepare. Read retrieves the words. Same thing for the sorting out.</a:t>
+            </a:r>
+          </a:p>
+          <a:p>
+            <a:pPr rtl="0" lvl="0">
+              <a:lnSpc>
+                <a:spcPct val="115000"/>
+              </a:lnSpc>
+              <a:spcBef>
+                <a:spcPts val="0"/>
+              </a:spcBef>
+              <a:buNone/>
+            </a:pPr>
+            <a:r>
+              <a:t/>
+            </a:r>
+            <a:endParaRPr sz="1300"/>
+          </a:p>
+          <a:p>
+            <a:pPr rtl="0" lvl="0">
+              <a:lnSpc>
+                <a:spcPct val="115000"/>
+              </a:lnSpc>
+              <a:spcBef>
+                <a:spcPts val="0"/>
+              </a:spcBef>
+              <a:buNone/>
+            </a:pPr>
+            <a:r>
+              <a:t/>
+            </a:r>
+            <a:endParaRPr b="1" sz="1200"/>
           </a:p>
         </p:txBody>
       </p:sp>
       <p:pic>
         <p:nvPicPr>
-          <p:cNvPr id="68" name="Shape 68"/>
+          <p:cNvPr id="73" name="Shape 73"/>
           <p:cNvPicPr preferRelativeResize="0"/>
           <p:nvPr/>
         </p:nvPicPr>
-        <p:blipFill rotWithShape="1">
+        <p:blipFill>
           <a:blip r:embed="rId3"/>
-          <a:srcRect t="0" b="23699" r="0" l="0"/>
-          <a:stretch/>
+          <a:stretch>
+            <a:fillRect/>
+          </a:stretch>
         </p:blipFill>
         <p:spPr>
           <a:xfrm>
-            <a:off y="1144675" x="279950"/>
-            <a:ext cy="3924499" cx="8584099"/>
+            <a:off y="1417800" x="7597212"/>
+            <a:ext cy="1053725" cx="1259325"/>
           </a:xfrm>
           <a:prstGeom prst="rect">
             <a:avLst/>
           </a:prstGeom>
-          <a:noFill/>
-          <a:ln>
-            <a:noFill/>
-          </a:ln>
         </p:spPr>
       </p:pic>
     </p:spTree>
@@ -4929,7 +5705,7 @@
   <p:cSld>
     <p:spTree>
       <p:nvGrpSpPr>
-        <p:cNvPr id="72" name="Shape 72"/>
+        <p:cNvPr id="77" name="Shape 77"/>
         <p:cNvGrpSpPr/>
         <p:nvPr/>
       </p:nvGrpSpPr>
@@ -4943,7 +5719,7 @@
       </p:grpSpPr>
       <p:sp>
         <p:nvSpPr>
-          <p:cNvPr id="73" name="Shape 73"/>
+          <p:cNvPr id="78" name="Shape 78"/>
           <p:cNvSpPr txBox="1"/>
           <p:nvPr>
             <p:ph type="title"/>
@@ -4964,7 +5740,7 @@
           </a:bodyPr>
           <a:lstStyle/>
           <a:p>
-            <a:pPr rtl="0" lvl="0">
+            <a:pPr>
               <a:spcBef>
                 <a:spcPts val="0"/>
               </a:spcBef>
@@ -4972,14 +5748,14 @@
             </a:pPr>
             <a:r>
               <a:rPr lang="en"/>
-              <a:t>Progress status (phase 3)</a:t>
+              <a:t>Progress status (phase 2)</a:t>
             </a:r>
           </a:p>
         </p:txBody>
       </p:sp>
       <p:sp>
         <p:nvSpPr>
-          <p:cNvPr id="74" name="Shape 74"/>
+          <p:cNvPr id="79" name="Shape 79"/>
           <p:cNvSpPr txBox="1"/>
           <p:nvPr>
             <p:ph idx="1" type="body"/>
@@ -4987,8 +5763,8 @@
         </p:nvSpPr>
         <p:spPr>
           <a:xfrm>
-            <a:off y="1200150" x="1986975"/>
-            <a:ext cy="3725699" cx="6852300"/>
+            <a:off y="1063375" x="457200"/>
+            <a:ext cy="3725699" cx="8229600"/>
           </a:xfrm>
           <a:prstGeom prst="rect">
             <a:avLst/>
@@ -5010,15 +5786,390 @@
               <a:buNone/>
             </a:pPr>
             <a:r>
-              <a:t/>
-            </a:r>
-            <a:endParaRPr sz="1400" i="1"/>
-          </a:p>
-          <a:p>
-            <a:pPr rtl="0" lvl="0" indent="-317500" marL="457200">
-              <a:lnSpc>
-                <a:spcPct val="115000"/>
-              </a:lnSpc>
+              <a:rPr u="sng" b="1" sz="1800" lang="en"/>
+              <a:t>DONE:</a:t>
+            </a:r>
+          </a:p>
+          <a:p>
+            <a:pPr rtl="0" lvl="0">
+              <a:lnSpc>
+                <a:spcPct val="115000"/>
+              </a:lnSpc>
+              <a:spcBef>
+                <a:spcPts val="0"/>
+              </a:spcBef>
+              <a:buNone/>
+            </a:pPr>
+            <a:r>
+              <a:rPr b="1" sz="1200" lang="en"/>
+              <a:t>re='^[1-6]$'</a:t>
+            </a:r>
+          </a:p>
+          <a:p>
+            <a:pPr rtl="0" lvl="0">
+              <a:lnSpc>
+                <a:spcPct val="115000"/>
+              </a:lnSpc>
+              <a:spcBef>
+                <a:spcPts val="0"/>
+              </a:spcBef>
+              <a:buNone/>
+            </a:pPr>
+            <a:r>
+              <a:rPr sz="1200" lang="en"/>
+              <a:t>→ Introducing the variable re, in order to specify the range possible (1 to 6) </a:t>
+            </a:r>
+          </a:p>
+          <a:p>
+            <a:pPr rtl="0" lvl="0">
+              <a:lnSpc>
+                <a:spcPct val="115000"/>
+              </a:lnSpc>
+              <a:spcBef>
+                <a:spcPts val="0"/>
+              </a:spcBef>
+              <a:buNone/>
+            </a:pPr>
+            <a:r>
+              <a:rPr b="1" sz="1200" lang="en"/>
+              <a:t>while ! [[ $num =~ $re ]]; do</a:t>
+            </a:r>
+          </a:p>
+          <a:p>
+            <a:pPr rtl="0" lvl="0">
+              <a:lnSpc>
+                <a:spcPct val="115000"/>
+              </a:lnSpc>
+              <a:spcBef>
+                <a:spcPts val="0"/>
+              </a:spcBef>
+              <a:buNone/>
+            </a:pPr>
+            <a:r>
+              <a:rPr sz="1200" lang="en"/>
+              <a:t>→ The re variable is used into a regex to prevent errors (wrong element entered by the user)</a:t>
+            </a:r>
+          </a:p>
+          <a:p>
+            <a:pPr rtl="0" lvl="0">
+              <a:lnSpc>
+                <a:spcPct val="115000"/>
+              </a:lnSpc>
+              <a:spcBef>
+                <a:spcPts val="0"/>
+              </a:spcBef>
+              <a:buClr>
+                <a:schemeClr val="dk1"/>
+              </a:buClr>
+              <a:buSzPct val="91666"/>
+              <a:buFont typeface="Arial"/>
+              <a:buNone/>
+            </a:pPr>
+            <a:r>
+              <a:rPr b="1" sz="1200" lang="en"/>
+              <a:t>    echo "You didn't enter the right command, please try again!";</a:t>
+            </a:r>
+          </a:p>
+          <a:p>
+            <a:pPr rtl="0" lvl="0">
+              <a:lnSpc>
+                <a:spcPct val="115000"/>
+              </a:lnSpc>
+              <a:spcBef>
+                <a:spcPts val="0"/>
+              </a:spcBef>
+              <a:buClr>
+                <a:schemeClr val="dk1"/>
+              </a:buClr>
+              <a:buSzPct val="91666"/>
+              <a:buFont typeface="Arial"/>
+              <a:buNone/>
+            </a:pPr>
+            <a:r>
+              <a:rPr b="1" sz="1200" lang="en"/>
+              <a:t>    read num;</a:t>
+            </a:r>
+          </a:p>
+          <a:p>
+            <a:pPr rtl="0" lvl="0">
+              <a:lnSpc>
+                <a:spcPct val="115000"/>
+              </a:lnSpc>
+              <a:spcBef>
+                <a:spcPts val="0"/>
+              </a:spcBef>
+              <a:buNone/>
+            </a:pPr>
+            <a:r>
+              <a:rPr b="1" sz="1200" lang="en"/>
+              <a:t>done</a:t>
+            </a:r>
+          </a:p>
+          <a:p>
+            <a:pPr rtl="0" lvl="0">
+              <a:lnSpc>
+                <a:spcPct val="115000"/>
+              </a:lnSpc>
+              <a:spcBef>
+                <a:spcPts val="0"/>
+              </a:spcBef>
+              <a:buNone/>
+            </a:pPr>
+            <a:r>
+              <a:rPr sz="1200" lang="en"/>
+              <a:t>→ The loop allows us to ask the user an unlimited number of time to enter the right command until he does it so</a:t>
+            </a:r>
+          </a:p>
+          <a:p>
+            <a:pPr rtl="0" lvl="0">
+              <a:lnSpc>
+                <a:spcPct val="115000"/>
+              </a:lnSpc>
+              <a:spcBef>
+                <a:spcPts val="0"/>
+              </a:spcBef>
+              <a:buClr>
+                <a:schemeClr val="dk1"/>
+              </a:buClr>
+              <a:buSzPct val="91666"/>
+              <a:buFont typeface="Arial"/>
+              <a:buNone/>
+            </a:pPr>
+            <a:r>
+              <a:rPr b="1" sz="1200" lang="en"/>
+              <a:t>case $num in</a:t>
+            </a:r>
+          </a:p>
+          <a:p>
+            <a:pPr rtl="0" lvl="0">
+              <a:lnSpc>
+                <a:spcPct val="115000"/>
+              </a:lnSpc>
+              <a:spcBef>
+                <a:spcPts val="0"/>
+              </a:spcBef>
+              <a:buClr>
+                <a:schemeClr val="dk1"/>
+              </a:buClr>
+              <a:buSzPct val="91666"/>
+              <a:buFont typeface="Arial"/>
+              <a:buNone/>
+            </a:pPr>
+            <a:r>
+              <a:rPr b="1" sz="1200" lang="en"/>
+              <a:t>    1)</a:t>
+            </a:r>
+          </a:p>
+          <a:p>
+            <a:pPr rtl="0" lvl="0">
+              <a:lnSpc>
+                <a:spcPct val="115000"/>
+              </a:lnSpc>
+              <a:spcBef>
+                <a:spcPts val="0"/>
+              </a:spcBef>
+              <a:buClr>
+                <a:schemeClr val="dk1"/>
+              </a:buClr>
+              <a:buSzPct val="91666"/>
+              <a:buFont typeface="Arial"/>
+              <a:buNone/>
+            </a:pPr>
+            <a:r>
+              <a:rPr b="1" sz="1200" lang="en"/>
+              <a:t>   	 sed -n -f total.sed /tmp/raw | sort --field-separator=';' --key=1 |column -t -s ";"</a:t>
+            </a:r>
+          </a:p>
+          <a:p>
+            <a:pPr rtl="0" lvl="0">
+              <a:lnSpc>
+                <a:spcPct val="115000"/>
+              </a:lnSpc>
+              <a:spcBef>
+                <a:spcPts val="0"/>
+              </a:spcBef>
+              <a:buClr>
+                <a:schemeClr val="dk1"/>
+              </a:buClr>
+              <a:buSzPct val="91666"/>
+              <a:buFont typeface="Arial"/>
+              <a:buNone/>
+            </a:pPr>
+            <a:r>
+              <a:rPr b="1" sz="1200" lang="en"/>
+              <a:t>   	 ;;</a:t>
+            </a:r>
+          </a:p>
+          <a:p>
+            <a:pPr rtl="0" lvl="0">
+              <a:lnSpc>
+                <a:spcPct val="115000"/>
+              </a:lnSpc>
+              <a:spcBef>
+                <a:spcPts val="0"/>
+              </a:spcBef>
+              <a:buClr>
+                <a:schemeClr val="dk1"/>
+              </a:buClr>
+              <a:buSzPct val="91666"/>
+              <a:buFont typeface="Arial"/>
+              <a:buNone/>
+            </a:pPr>
+            <a:r>
+              <a:rPr b="1" sz="1200" lang="en"/>
+              <a:t>    2)</a:t>
+            </a:r>
+          </a:p>
+          <a:p>
+            <a:pPr rtl="0" lvl="0">
+              <a:lnSpc>
+                <a:spcPct val="115000"/>
+              </a:lnSpc>
+              <a:spcBef>
+                <a:spcPts val="0"/>
+              </a:spcBef>
+              <a:buClr>
+                <a:schemeClr val="dk1"/>
+              </a:buClr>
+              <a:buSzPct val="91666"/>
+              <a:buFont typeface="Arial"/>
+              <a:buNone/>
+            </a:pPr>
+            <a:r>
+              <a:rPr b="1" sz="1200" lang="en"/>
+              <a:t>   	 …</a:t>
+            </a:r>
+          </a:p>
+          <a:p>
+            <a:pPr rtl="0" lvl="0">
+              <a:lnSpc>
+                <a:spcPct val="115000"/>
+              </a:lnSpc>
+              <a:spcBef>
+                <a:spcPts val="0"/>
+              </a:spcBef>
+              <a:buClr>
+                <a:schemeClr val="dk1"/>
+              </a:buClr>
+              <a:buSzPct val="91666"/>
+              <a:buFont typeface="Arial"/>
+              <a:buNone/>
+            </a:pPr>
+            <a:r>
+              <a:rPr b="1" sz="1200" lang="en"/>
+              <a:t>esac</a:t>
+            </a:r>
+          </a:p>
+          <a:p>
+            <a:pPr lvl="0">
+              <a:lnSpc>
+                <a:spcPct val="115000"/>
+              </a:lnSpc>
+              <a:spcBef>
+                <a:spcPts val="0"/>
+              </a:spcBef>
+              <a:buClr>
+                <a:schemeClr val="dk1"/>
+              </a:buClr>
+              <a:buSzPct val="91666"/>
+              <a:buFont typeface="Arial"/>
+              <a:buNone/>
+            </a:pPr>
+            <a:r>
+              <a:rPr sz="1200" lang="en"/>
+              <a:t>→ According to what the user wanted to sort by, it launches the right command. It is more scalable that way</a:t>
+            </a:r>
+          </a:p>
+        </p:txBody>
+      </p:sp>
+    </p:spTree>
+  </p:cSld>
+  <p:clrMapOvr>
+    <a:masterClrMapping/>
+  </p:clrMapOvr>
+  <p:transition spd="slow">
+    <p:cut/>
+  </p:transition>
+</p:sld>
+</file>
+
+<file path=ppt/slides/slide8.xml><?xml version="1.0" encoding="utf-8"?>
+<p:sld xmlns:a="http://schemas.openxmlformats.org/drawingml/2006/main" xmlns:r="http://schemas.openxmlformats.org/officeDocument/2006/relationships" xmlns:mc="http://schemas.openxmlformats.org/markup-compatibility/2006" xmlns:mv="urn:schemas-microsoft-com:mac:vml" xmlns:p="http://schemas.openxmlformats.org/presentationml/2006/main" xmlns:c="http://schemas.openxmlformats.org/drawingml/2006/chart" xmlns:dgm="http://schemas.openxmlformats.org/drawingml/2006/diagram" xmlns:o="urn:schemas-microsoft-com:office:office" xmlns:v="urn:schemas-microsoft-com:vml" xmlns:pvml="urn:schemas-microsoft-com:office:powerpoint" xmlns:com="http://schemas.openxmlformats.org/drawingml/2006/compatibility" xmlns:p14="http://schemas.microsoft.com/office/powerpoint/2010/main">
+  <p:cSld>
+    <p:spTree>
+      <p:nvGrpSpPr>
+        <p:cNvPr id="83" name="Shape 83"/>
+        <p:cNvGrpSpPr/>
+        <p:nvPr/>
+      </p:nvGrpSpPr>
+      <p:grpSpPr>
+        <a:xfrm>
+          <a:off y="0" x="0"/>
+          <a:ext cy="0" cx="0"/>
+          <a:chOff y="0" x="0"/>
+          <a:chExt cy="0" cx="0"/>
+        </a:xfrm>
+      </p:grpSpPr>
+      <p:sp>
+        <p:nvSpPr>
+          <p:cNvPr id="84" name="Shape 84"/>
+          <p:cNvSpPr txBox="1"/>
+          <p:nvPr>
+            <p:ph type="title"/>
+          </p:nvPr>
+        </p:nvSpPr>
+        <p:spPr>
+          <a:xfrm>
+            <a:off y="205978" x="457200"/>
+            <a:ext cy="857400" cx="8229600"/>
+          </a:xfrm>
+          <a:prstGeom prst="rect">
+            <a:avLst/>
+          </a:prstGeom>
+        </p:spPr>
+        <p:txBody>
+          <a:bodyPr bIns="91425" rIns="91425" lIns="91425" tIns="91425" anchor="b" anchorCtr="0">
+            <a:noAutofit/>
+          </a:bodyPr>
+          <a:lstStyle/>
+          <a:p>
+            <a:pPr>
+              <a:spcBef>
+                <a:spcPts val="0"/>
+              </a:spcBef>
+              <a:buNone/>
+            </a:pPr>
+            <a:r>
+              <a:rPr lang="en"/>
+              <a:t>Testing Phase</a:t>
+            </a:r>
+          </a:p>
+        </p:txBody>
+      </p:sp>
+      <p:sp>
+        <p:nvSpPr>
+          <p:cNvPr id="85" name="Shape 85"/>
+          <p:cNvSpPr txBox="1"/>
+          <p:nvPr>
+            <p:ph idx="1" type="body"/>
+          </p:nvPr>
+        </p:nvSpPr>
+        <p:spPr>
+          <a:xfrm>
+            <a:off y="1200150" x="457200"/>
+            <a:ext cy="3725699" cx="8229600"/>
+          </a:xfrm>
+          <a:prstGeom prst="rect">
+            <a:avLst/>
+          </a:prstGeom>
+        </p:spPr>
+        <p:txBody>
+          <a:bodyPr bIns="91425" rIns="91425" lIns="91425" tIns="91425" anchor="t" anchorCtr="0">
+            <a:noAutofit/>
+          </a:bodyPr>
+          <a:lstStyle/>
+          <a:p>
+            <a:pPr rtl="0" lvl="0" indent="-381000" marL="457200">
               <a:spcBef>
                 <a:spcPts val="0"/>
               </a:spcBef>
@@ -5027,18 +6178,103 @@
               </a:buClr>
               <a:buSzPct val="100000"/>
               <a:buFont typeface="Arial"/>
-              <a:buChar char="●"/>
-            </a:pPr>
-            <a:r>
-              <a:rPr sz="1400" lang="en"/>
-              <a:t>Add up preparation time and cooking time in order to ask how much time the user has to cook</a:t>
-            </a:r>
+              <a:buAutoNum type="arabicPeriod"/>
+            </a:pPr>
+            <a:r>
+              <a:rPr sz="2400" lang="en"/>
+              <a:t>Launch the marmiton.sh script </a:t>
+            </a:r>
+            <a:r>
+              <a:rPr b="1" sz="2400" lang="en"/>
+              <a:t>: $ ./marmiton.sh</a:t>
+            </a:r>
+          </a:p>
+          <a:p>
+            <a:pPr rtl="0" lvl="0" indent="-381000" marL="457200">
+              <a:spcBef>
+                <a:spcPts val="0"/>
+              </a:spcBef>
+              <a:buClr>
+                <a:schemeClr val="dk1"/>
+              </a:buClr>
+              <a:buSzPct val="100000"/>
+              <a:buFont typeface="Arial"/>
+              <a:buAutoNum type="arabicPeriod"/>
+            </a:pPr>
+            <a:r>
+              <a:rPr sz="2400" lang="en"/>
+              <a:t>Enter the recipe that you’re looking for</a:t>
+            </a:r>
+            <a:br>
+              <a:rPr sz="2400" lang="en"/>
+            </a:br>
+            <a:r>
+              <a:rPr sz="2400" lang="en"/>
+              <a:t>ex: </a:t>
+            </a:r>
+            <a:r>
+              <a:rPr b="1" sz="2400" lang="en"/>
+              <a:t>ratatouille </a:t>
+            </a:r>
+          </a:p>
+          <a:p>
+            <a:pPr rtl="0" lvl="0" indent="-381000" marL="457200">
+              <a:spcBef>
+                <a:spcPts val="0"/>
+              </a:spcBef>
+              <a:buClr>
+                <a:schemeClr val="dk1"/>
+              </a:buClr>
+              <a:buSzPct val="100000"/>
+              <a:buFont typeface="Arial"/>
+              <a:buAutoNum type="arabicPeriod"/>
+            </a:pPr>
+            <a:r>
+              <a:rPr sz="2400" lang="en"/>
+              <a:t>Then sort the results by : title, votes, time …</a:t>
+            </a:r>
+          </a:p>
+          <a:p>
+            <a:pPr rtl="0" lvl="0">
+              <a:spcBef>
+                <a:spcPts val="0"/>
+              </a:spcBef>
+              <a:buNone/>
+            </a:pPr>
+            <a:r>
+              <a:t/>
+            </a:r>
+            <a:endParaRPr sz="2400"/>
+          </a:p>
+          <a:p>
+            <a:pPr rtl="0" lvl="0">
+              <a:spcBef>
+                <a:spcPts val="0"/>
+              </a:spcBef>
+              <a:buNone/>
+            </a:pPr>
+            <a:r>
+              <a:rPr sz="2400" lang="en" i="1"/>
+              <a:t>See the how_to_marmiton file for more details</a:t>
+            </a:r>
+          </a:p>
+          <a:p>
+            <a:pPr rtl="0" lvl="0">
+              <a:spcBef>
+                <a:spcPts val="0"/>
+              </a:spcBef>
+              <a:buNone/>
+            </a:pPr>
+            <a:r>
+              <a:t/>
+            </a:r>
+            <a:endParaRPr sz="2400"/>
           </a:p>
         </p:txBody>
       </p:sp>
       <p:pic>
         <p:nvPicPr>
-          <p:cNvPr id="75" name="Shape 75"/>
+          <p:cNvPr id="86" name="Shape 86"/>
           <p:cNvPicPr preferRelativeResize="0"/>
           <p:nvPr/>
         </p:nvPicPr>
@@ -5050,12 +6286,101 @@
         </p:blipFill>
         <p:spPr>
           <a:xfrm>
-            <a:off y="1256425" x="219950"/>
-            <a:ext cy="1430900" cx="1614624"/>
+            <a:off y="1787500" x="7035475"/>
+            <a:ext cy="1678174" cx="1651324"/>
           </a:xfrm>
           <a:prstGeom prst="rect">
             <a:avLst/>
           </a:prstGeom>
+        </p:spPr>
+      </p:pic>
+    </p:spTree>
+  </p:cSld>
+  <p:clrMapOvr>
+    <a:masterClrMapping/>
+  </p:clrMapOvr>
+  <p:transition spd="slow">
+    <p:cut/>
+  </p:transition>
+</p:sld>
+</file>
+
+<file path=ppt/slides/slide9.xml><?xml version="1.0" encoding="utf-8"?>
+<p:sld xmlns:a="http://schemas.openxmlformats.org/drawingml/2006/main" xmlns:r="http://schemas.openxmlformats.org/officeDocument/2006/relationships" xmlns:mc="http://schemas.openxmlformats.org/markup-compatibility/2006" xmlns:mv="urn:schemas-microsoft-com:mac:vml" xmlns:p="http://schemas.openxmlformats.org/presentationml/2006/main" xmlns:c="http://schemas.openxmlformats.org/drawingml/2006/chart" xmlns:dgm="http://schemas.openxmlformats.org/drawingml/2006/diagram" xmlns:o="urn:schemas-microsoft-com:office:office" xmlns:v="urn:schemas-microsoft-com:vml" xmlns:pvml="urn:schemas-microsoft-com:office:powerpoint" xmlns:com="http://schemas.openxmlformats.org/drawingml/2006/compatibility" xmlns:p14="http://schemas.microsoft.com/office/powerpoint/2010/main">
+  <p:cSld>
+    <p:spTree>
+      <p:nvGrpSpPr>
+        <p:cNvPr id="90" name="Shape 90"/>
+        <p:cNvGrpSpPr/>
+        <p:nvPr/>
+      </p:nvGrpSpPr>
+      <p:grpSpPr>
+        <a:xfrm>
+          <a:off y="0" x="0"/>
+          <a:ext cy="0" cx="0"/>
+          <a:chOff y="0" x="0"/>
+          <a:chExt cy="0" cx="0"/>
+        </a:xfrm>
+      </p:grpSpPr>
+      <p:sp>
+        <p:nvSpPr>
+          <p:cNvPr id="91" name="Shape 91"/>
+          <p:cNvSpPr txBox="1"/>
+          <p:nvPr>
+            <p:ph type="title"/>
+          </p:nvPr>
+        </p:nvSpPr>
+        <p:spPr>
+          <a:xfrm>
+            <a:off y="205978" x="457200"/>
+            <a:ext cy="857400" cx="8229600"/>
+          </a:xfrm>
+          <a:prstGeom prst="rect">
+            <a:avLst/>
+          </a:prstGeom>
+        </p:spPr>
+        <p:txBody>
+          <a:bodyPr bIns="91425" rIns="91425" lIns="91425" tIns="91425" anchor="b" anchorCtr="0">
+            <a:noAutofit/>
+          </a:bodyPr>
+          <a:lstStyle/>
+          <a:p>
+            <a:pPr>
+              <a:spcBef>
+                <a:spcPts val="0"/>
+              </a:spcBef>
+              <a:buNone/>
+            </a:pPr>
+            <a:r>
+              <a:rPr lang="en"/>
+              <a:t>Script using baguette</a:t>
+            </a:r>
+          </a:p>
+        </p:txBody>
+      </p:sp>
+      <p:pic>
+        <p:nvPicPr>
+          <p:cNvPr id="92" name="Shape 92"/>
+          <p:cNvPicPr preferRelativeResize="0"/>
+          <p:nvPr/>
+        </p:nvPicPr>
+        <p:blipFill rotWithShape="1">
+          <a:blip r:embed="rId3"/>
+          <a:srcRect t="0" b="23699" r="0" l="0"/>
+          <a:stretch/>
+        </p:blipFill>
+        <p:spPr>
+          <a:xfrm>
+            <a:off y="1220875" x="279950"/>
+            <a:ext cy="3924499" cx="8584099"/>
+          </a:xfrm>
+          <a:prstGeom prst="rect">
+            <a:avLst/>
+          </a:prstGeom>
+          <a:noFill/>
+          <a:ln>
+            <a:noFill/>
+          </a:ln>
         </p:spPr>
       </p:pic>
     </p:spTree>
@@ -5070,9 +6395,9 @@
 </file>
 
 <file path=ppt/theme/theme1.xml><?xml version="1.0" encoding="utf-8"?>
-<a:theme xmlns:a="http://schemas.openxmlformats.org/drawingml/2006/main" xmlns:r="http://schemas.openxmlformats.org/officeDocument/2006/relationships" name="swiss">
+<a:theme xmlns:a="http://schemas.openxmlformats.org/drawingml/2006/main" xmlns:r="http://schemas.openxmlformats.org/officeDocument/2006/relationships" name="Custom Theme">
   <a:themeElements>
-    <a:clrScheme name="Custom 218">
+    <a:clrScheme name="Default">
       <a:dk1>
         <a:srgbClr val="000000"/>
       </a:dk1>
@@ -5080,34 +6405,34 @@
         <a:srgbClr val="FFFFFF"/>
       </a:lt1>
       <a:dk2>
-        <a:srgbClr val="5B595A"/>
+        <a:srgbClr val="158158"/>
       </a:dk2>
       <a:lt2>
-        <a:srgbClr val="CFD4D4"/>
+        <a:srgbClr val="F3F3F3"/>
       </a:lt2>
       <a:accent1>
-        <a:srgbClr val="CC0202"/>
+        <a:srgbClr val="058DC7"/>
       </a:accent1>
       <a:accent2>
-        <a:srgbClr val="228AFF"/>
+        <a:srgbClr val="50B432"/>
       </a:accent2>
       <a:accent3>
-        <a:srgbClr val="FBC82F"/>
+        <a:srgbClr val="ED561B"/>
       </a:accent3>
       <a:accent4>
-        <a:srgbClr val="253E91"/>
+        <a:srgbClr val="EDEF00"/>
       </a:accent4>
       <a:accent5>
-        <a:srgbClr val="F68D0C"/>
+        <a:srgbClr val="24CBE5"/>
       </a:accent5>
       <a:accent6>
-        <a:srgbClr val="257E12"/>
+        <a:srgbClr val="64E572"/>
       </a:accent6>
       <a:hlink>
-        <a:srgbClr val="144C72"/>
+        <a:srgbClr val="2200CC"/>
       </a:hlink>
       <a:folHlink>
-        <a:srgbClr val="8C9D92"/>
+        <a:srgbClr val="551A8B"/>
       </a:folHlink>
     </a:clrScheme>
     <a:fontScheme name="Office">
@@ -5347,9 +6672,9 @@
 </file>
 
 <file path=ppt/theme/theme2.xml><?xml version="1.0" encoding="utf-8"?>
-<a:theme xmlns:a="http://schemas.openxmlformats.org/drawingml/2006/main" xmlns:r="http://schemas.openxmlformats.org/officeDocument/2006/relationships" name="Custom Theme">
+<a:theme xmlns:a="http://schemas.openxmlformats.org/drawingml/2006/main" xmlns:r="http://schemas.openxmlformats.org/officeDocument/2006/relationships" name="swiss">
   <a:themeElements>
-    <a:clrScheme name="Default">
+    <a:clrScheme name="Custom 218">
       <a:dk1>
         <a:srgbClr val="000000"/>
       </a:dk1>
@@ -5357,34 +6682,34 @@
         <a:srgbClr val="FFFFFF"/>
       </a:lt1>
       <a:dk2>
-        <a:srgbClr val="158158"/>
+        <a:srgbClr val="5B595A"/>
       </a:dk2>
       <a:lt2>
-        <a:srgbClr val="F3F3F3"/>
+        <a:srgbClr val="CFD4D4"/>
       </a:lt2>
       <a:accent1>
-        <a:srgbClr val="058DC7"/>
+        <a:srgbClr val="CC0202"/>
       </a:accent1>
       <a:accent2>
-        <a:srgbClr val="50B432"/>
+        <a:srgbClr val="228AFF"/>
       </a:accent2>
       <a:accent3>
-        <a:srgbClr val="ED561B"/>
+        <a:srgbClr val="FBC82F"/>
       </a:accent3>
       <a:accent4>
-        <a:srgbClr val="EDEF00"/>
+        <a:srgbClr val="253E91"/>
       </a:accent4>
       <a:accent5>
-        <a:srgbClr val="24CBE5"/>
+        <a:srgbClr val="F68D0C"/>
       </a:accent5>
       <a:accent6>
-        <a:srgbClr val="64E572"/>
+        <a:srgbClr val="257E12"/>
       </a:accent6>
       <a:hlink>
-        <a:srgbClr val="2200CC"/>
+        <a:srgbClr val="144C72"/>
       </a:hlink>
       <a:folHlink>
-        <a:srgbClr val="551A8B"/>
+        <a:srgbClr val="8C9D92"/>
       </a:folHlink>
     </a:clrScheme>
     <a:fontScheme name="Office">

</xml_diff>

<commit_message>
modify script with blanks and special characters management, modify the how_to_marmiton file and project explanation. Add question/answer in qsts_sys_ex file
</commit_message>
<xml_diff>
--- a/projects/marmiton/Marmiton_project.pptx
+++ b/projects/marmiton/Marmiton_project.pptx
@@ -18,6 +18,7 @@
     <p:sldId id="263" r:id="rId13"/>
     <p:sldId id="264" r:id="rId14"/>
     <p:sldId id="265" r:id="rId15"/>
+    <p:sldId id="266" r:id="rId16"/>
   </p:sldIdLst>
   <p:sldSz cy="5143500" cx="9144000"/>
   <p:notesSz cy="9144000" cx="6858000"/>
@@ -470,7 +471,7 @@
   <p:cSld>
     <p:spTree>
       <p:nvGrpSpPr>
-        <p:cNvPr id="100" name="Shape 100"/>
+        <p:cNvPr id="99" name="Shape 99"/>
         <p:cNvGrpSpPr/>
         <p:nvPr/>
       </p:nvGrpSpPr>
@@ -484,7 +485,7 @@
       </p:grpSpPr>
       <p:sp>
         <p:nvSpPr>
-          <p:cNvPr id="101" name="Shape 101"/>
+          <p:cNvPr id="100" name="Shape 100"/>
           <p:cNvSpPr/>
           <p:nvPr>
             <p:ph idx="2" type="sldImg"/>
@@ -518,7 +519,102 @@
       </p:sp>
       <p:sp>
         <p:nvSpPr>
-          <p:cNvPr id="102" name="Shape 102"/>
+          <p:cNvPr id="101" name="Shape 101"/>
+          <p:cNvSpPr txBox="1"/>
+          <p:nvPr>
+            <p:ph idx="1" type="body"/>
+          </p:nvPr>
+        </p:nvSpPr>
+        <p:spPr>
+          <a:xfrm>
+            <a:off y="4343400" x="685800"/>
+            <a:ext cy="4114800" cx="5486399"/>
+          </a:xfrm>
+          <a:prstGeom prst="rect">
+            <a:avLst/>
+          </a:prstGeom>
+        </p:spPr>
+        <p:txBody>
+          <a:bodyPr bIns="91425" rIns="91425" lIns="91425" tIns="91425" anchor="t" anchorCtr="0">
+            <a:noAutofit/>
+          </a:bodyPr>
+          <a:lstStyle/>
+          <a:p>
+            <a:pPr>
+              <a:spcBef>
+                <a:spcPts val="0"/>
+              </a:spcBef>
+              <a:buNone/>
+            </a:pPr>
+            <a:r>
+              <a:t/>
+            </a:r>
+            <a:endParaRPr/>
+          </a:p>
+        </p:txBody>
+      </p:sp>
+    </p:spTree>
+  </p:cSld>
+  <p:clrMapOvr>
+    <a:masterClrMapping/>
+  </p:clrMapOvr>
+</p:notes>
+</file>
+
+<file path=ppt/notesSlides/notesSlide11.xml><?xml version="1.0" encoding="utf-8"?>
+<p:notes xmlns:a="http://schemas.openxmlformats.org/drawingml/2006/main" xmlns:r="http://schemas.openxmlformats.org/officeDocument/2006/relationships" xmlns:mc="http://schemas.openxmlformats.org/markup-compatibility/2006" xmlns:mv="urn:schemas-microsoft-com:mac:vml" xmlns:p="http://schemas.openxmlformats.org/presentationml/2006/main" xmlns:c="http://schemas.openxmlformats.org/drawingml/2006/chart" xmlns:dgm="http://schemas.openxmlformats.org/drawingml/2006/diagram" xmlns:o="urn:schemas-microsoft-com:office:office" xmlns:v="urn:schemas-microsoft-com:vml" xmlns:pvml="urn:schemas-microsoft-com:office:powerpoint" xmlns:com="http://schemas.openxmlformats.org/drawingml/2006/compatibility" xmlns:p14="http://schemas.microsoft.com/office/powerpoint/2010/main" showMasterSp="0" showMasterPhAnim="0">
+  <p:cSld>
+    <p:spTree>
+      <p:nvGrpSpPr>
+        <p:cNvPr id="106" name="Shape 106"/>
+        <p:cNvGrpSpPr/>
+        <p:nvPr/>
+      </p:nvGrpSpPr>
+      <p:grpSpPr>
+        <a:xfrm>
+          <a:off y="0" x="0"/>
+          <a:ext cy="0" cx="0"/>
+          <a:chOff y="0" x="0"/>
+          <a:chExt cy="0" cx="0"/>
+        </a:xfrm>
+      </p:grpSpPr>
+      <p:sp>
+        <p:nvSpPr>
+          <p:cNvPr id="107" name="Shape 107"/>
+          <p:cNvSpPr/>
+          <p:nvPr>
+            <p:ph idx="2" type="sldImg"/>
+          </p:nvPr>
+        </p:nvSpPr>
+        <p:spPr>
+          <a:xfrm>
+            <a:off y="685800" x="381187"/>
+            <a:ext cy="3429000" cx="6096299"/>
+          </a:xfrm>
+          <a:custGeom>
+            <a:pathLst>
+              <a:path w="120000" extrusionOk="0" h="120000">
+                <a:moveTo>
+                  <a:pt y="0" x="0"/>
+                </a:moveTo>
+                <a:lnTo>
+                  <a:pt y="0" x="120000"/>
+                </a:lnTo>
+                <a:lnTo>
+                  <a:pt y="120000" x="120000"/>
+                </a:lnTo>
+                <a:lnTo>
+                  <a:pt y="120000" x="0"/>
+                </a:lnTo>
+                <a:close/>
+              </a:path>
+            </a:pathLst>
+          </a:custGeom>
+        </p:spPr>
+      </p:sp>
+      <p:sp>
+        <p:nvSpPr>
+          <p:cNvPr id="108" name="Shape 108"/>
           <p:cNvSpPr txBox="1"/>
           <p:nvPr>
             <p:ph idx="1" type="body"/>
@@ -1135,7 +1231,7 @@
   <p:cSld>
     <p:spTree>
       <p:nvGrpSpPr>
-        <p:cNvPr id="87" name="Shape 87"/>
+        <p:cNvPr id="86" name="Shape 86"/>
         <p:cNvGrpSpPr/>
         <p:nvPr/>
       </p:nvGrpSpPr>
@@ -1149,7 +1245,7 @@
       </p:grpSpPr>
       <p:sp>
         <p:nvSpPr>
-          <p:cNvPr id="88" name="Shape 88"/>
+          <p:cNvPr id="87" name="Shape 87"/>
           <p:cNvSpPr/>
           <p:nvPr>
             <p:ph idx="2" type="sldImg"/>
@@ -1183,7 +1279,7 @@
       </p:sp>
       <p:sp>
         <p:nvSpPr>
-          <p:cNvPr id="89" name="Shape 89"/>
+          <p:cNvPr id="88" name="Shape 88"/>
           <p:cNvSpPr txBox="1"/>
           <p:nvPr>
             <p:ph idx="1" type="body"/>
@@ -3564,6 +3660,95 @@
           </a:bodyPr>
           <a:lstStyle/>
           <a:p>
+            <a:pPr>
+              <a:spcBef>
+                <a:spcPts val="0"/>
+              </a:spcBef>
+              <a:buNone/>
+            </a:pPr>
+            <a:r>
+              <a:rPr lang="en"/>
+              <a:t>Script using baguette</a:t>
+            </a:r>
+          </a:p>
+        </p:txBody>
+      </p:sp>
+      <p:pic>
+        <p:nvPicPr>
+          <p:cNvPr id="98" name="Shape 98"/>
+          <p:cNvPicPr preferRelativeResize="0"/>
+          <p:nvPr/>
+        </p:nvPicPr>
+        <p:blipFill rotWithShape="1">
+          <a:blip r:embed="rId3"/>
+          <a:srcRect t="0" b="23699" r="0" l="0"/>
+          <a:stretch/>
+        </p:blipFill>
+        <p:spPr>
+          <a:xfrm>
+            <a:off y="1220875" x="279950"/>
+            <a:ext cy="3924499" cx="8584099"/>
+          </a:xfrm>
+          <a:prstGeom prst="rect">
+            <a:avLst/>
+          </a:prstGeom>
+          <a:noFill/>
+          <a:ln>
+            <a:noFill/>
+          </a:ln>
+        </p:spPr>
+      </p:pic>
+    </p:spTree>
+  </p:cSld>
+  <p:clrMapOvr>
+    <a:masterClrMapping/>
+  </p:clrMapOvr>
+  <p:transition spd="slow">
+    <p:cut/>
+  </p:transition>
+</p:sld>
+</file>
+
+<file path=ppt/slides/slide11.xml><?xml version="1.0" encoding="utf-8"?>
+<p:sld xmlns:a="http://schemas.openxmlformats.org/drawingml/2006/main" xmlns:r="http://schemas.openxmlformats.org/officeDocument/2006/relationships" xmlns:mc="http://schemas.openxmlformats.org/markup-compatibility/2006" xmlns:mv="urn:schemas-microsoft-com:mac:vml" xmlns:p="http://schemas.openxmlformats.org/presentationml/2006/main" xmlns:c="http://schemas.openxmlformats.org/drawingml/2006/chart" xmlns:dgm="http://schemas.openxmlformats.org/drawingml/2006/diagram" xmlns:o="urn:schemas-microsoft-com:office:office" xmlns:v="urn:schemas-microsoft-com:vml" xmlns:pvml="urn:schemas-microsoft-com:office:powerpoint" xmlns:com="http://schemas.openxmlformats.org/drawingml/2006/compatibility" xmlns:p14="http://schemas.microsoft.com/office/powerpoint/2010/main">
+  <p:cSld>
+    <p:spTree>
+      <p:nvGrpSpPr>
+        <p:cNvPr id="102" name="Shape 102"/>
+        <p:cNvGrpSpPr/>
+        <p:nvPr/>
+      </p:nvGrpSpPr>
+      <p:grpSpPr>
+        <a:xfrm>
+          <a:off y="0" x="0"/>
+          <a:ext cy="0" cx="0"/>
+          <a:chOff y="0" x="0"/>
+          <a:chExt cy="0" cx="0"/>
+        </a:xfrm>
+      </p:grpSpPr>
+      <p:sp>
+        <p:nvSpPr>
+          <p:cNvPr id="103" name="Shape 103"/>
+          <p:cNvSpPr txBox="1"/>
+          <p:nvPr>
+            <p:ph type="title"/>
+          </p:nvPr>
+        </p:nvSpPr>
+        <p:spPr>
+          <a:xfrm>
+            <a:off y="205978" x="457200"/>
+            <a:ext cy="857400" cx="8229600"/>
+          </a:xfrm>
+          <a:prstGeom prst="rect">
+            <a:avLst/>
+          </a:prstGeom>
+        </p:spPr>
+        <p:txBody>
+          <a:bodyPr bIns="91425" rIns="91425" lIns="91425" tIns="91425" anchor="b" anchorCtr="0">
+            <a:noAutofit/>
+          </a:bodyPr>
+          <a:lstStyle/>
+          <a:p>
             <a:pPr rtl="0" lvl="0">
               <a:spcBef>
                 <a:spcPts val="0"/>
@@ -3579,7 +3764,7 @@
       </p:sp>
       <p:sp>
         <p:nvSpPr>
-          <p:cNvPr id="98" name="Shape 98"/>
+          <p:cNvPr id="104" name="Shape 104"/>
           <p:cNvSpPr txBox="1"/>
           <p:nvPr>
             <p:ph idx="1" type="body"/>
@@ -3612,7 +3797,7 @@
             <a:r>
               <a:t/>
             </a:r>
-            <a:endParaRPr sz="1400" i="1"/>
+            <a:endParaRPr sz="1400"/>
           </a:p>
           <a:p>
             <a:pPr rtl="0" lvl="0" indent="-317500" marL="457200">
@@ -3631,17 +3816,25 @@
             </a:pPr>
             <a:r>
               <a:rPr sz="1400" lang="en"/>
-              <a:t>Prevent the script from errors due to the elements written by the user when asked the name of the recipe </a:t>
-            </a:r>
-          </a:p>
-          <a:p>
-            <a:pPr rtl="0" lvl="0">
-              <a:lnSpc>
-                <a:spcPct val="115000"/>
-              </a:lnSpc>
-              <a:spcBef>
-                <a:spcPts val="0"/>
-              </a:spcBef>
+              <a:t>Retrieve the recipe’s page corresponding to the best result considering the user’s choices </a:t>
+            </a:r>
+            <a:r>
+              <a:rPr sz="1400" lang="en" i="1"/>
+              <a:t>(by storing the sorted results in another file and using regex into the URL used to display recipes on Marmiton)</a:t>
+            </a:r>
+          </a:p>
+          <a:p>
+            <a:pPr rtl="0" lvl="0">
+              <a:lnSpc>
+                <a:spcPct val="115000"/>
+              </a:lnSpc>
+              <a:spcBef>
+                <a:spcPts val="0"/>
+              </a:spcBef>
+              <a:buClr>
+                <a:srgbClr val="000000"/>
+              </a:buClr>
+              <a:buFont typeface="Arial"/>
               <a:buNone/>
             </a:pPr>
             <a:r>
@@ -3666,25 +3859,21 @@
             </a:pPr>
             <a:r>
               <a:rPr sz="1400" lang="en"/>
-              <a:t>Retrieve the recipe’s page corresponding to the best result considering the user’s choices </a:t>
+              <a:t>Add up preparation time and cooking time in order to ask how much time the user has to cook </a:t>
             </a:r>
             <a:r>
               <a:rPr sz="1400" lang="en" i="1"/>
-              <a:t>(by storing the sorted results in another file and using regex into the URL used to display recipes on Marmiton)</a:t>
-            </a:r>
-          </a:p>
-          <a:p>
-            <a:pPr rtl="0" lvl="0">
-              <a:lnSpc>
-                <a:spcPct val="115000"/>
-              </a:lnSpc>
-              <a:spcBef>
-                <a:spcPts val="0"/>
-              </a:spcBef>
-              <a:buClr>
-                <a:srgbClr val="000000"/>
-              </a:buClr>
-              <a:buFont typeface="Arial"/>
+              <a:t>(not mandatory)</a:t>
+            </a:r>
+          </a:p>
+          <a:p>
+            <a:pPr rtl="0" lvl="0">
+              <a:lnSpc>
+                <a:spcPct val="115000"/>
+              </a:lnSpc>
+              <a:spcBef>
+                <a:spcPts val="0"/>
+              </a:spcBef>
               <a:buNone/>
             </a:pPr>
             <a:r>
@@ -3693,26 +3882,6 @@
             <a:endParaRPr sz="1400"/>
           </a:p>
           <a:p>
-            <a:pPr rtl="0" lvl="0" indent="-317500" marL="457200">
-              <a:lnSpc>
-                <a:spcPct val="115000"/>
-              </a:lnSpc>
-              <a:spcBef>
-                <a:spcPts val="0"/>
-              </a:spcBef>
-              <a:buClr>
-                <a:schemeClr val="dk1"/>
-              </a:buClr>
-              <a:buSzPct val="100000"/>
-              <a:buFont typeface="Arial"/>
-              <a:buChar char="●"/>
-            </a:pPr>
-            <a:r>
-              <a:rPr sz="1400" lang="en"/>
-              <a:t>Add up preparation time and cooking time in order to ask how much time the user has to cook</a:t>
-            </a:r>
-          </a:p>
-          <a:p>
             <a:pPr rtl="0" lvl="0">
               <a:lnSpc>
                 <a:spcPct val="115000"/>
@@ -3753,30 +3922,15 @@
               <a:buNone/>
             </a:pPr>
             <a:r>
-              <a:t/>
-            </a:r>
-            <a:endParaRPr sz="1400"/>
-          </a:p>
-          <a:p>
-            <a:pPr rtl="0" lvl="0">
-              <a:lnSpc>
-                <a:spcPct val="115000"/>
-              </a:lnSpc>
-              <a:spcBef>
-                <a:spcPts val="0"/>
-              </a:spcBef>
-              <a:buNone/>
-            </a:pPr>
-            <a:r>
               <a:rPr sz="1400" lang="en" i="1"/>
-              <a:t>We will most likely not have enough time to do all of those but they are possible evolutions/ameliorations to our script. </a:t>
+              <a:t>We will most likely not have enough time to do those but they are possible evolutions/ameliorations to our script. </a:t>
             </a:r>
           </a:p>
         </p:txBody>
       </p:sp>
       <p:pic>
         <p:nvPicPr>
-          <p:cNvPr id="99" name="Shape 99"/>
+          <p:cNvPr id="105" name="Shape 105"/>
           <p:cNvPicPr preferRelativeResize="0"/>
           <p:nvPr/>
         </p:nvPicPr>
@@ -6141,7 +6295,7 @@
             </a:pPr>
             <a:r>
               <a:rPr lang="en"/>
-              <a:t>Testing Phase</a:t>
+              <a:t>Progress status (phase 2)</a:t>
             </a:r>
           </a:p>
         </p:txBody>
@@ -6169,131 +6323,182 @@
           </a:bodyPr>
           <a:lstStyle/>
           <a:p>
-            <a:pPr rtl="0" lvl="0" indent="-381000" marL="457200">
+            <a:pPr rtl="0" lvl="0">
+              <a:spcBef>
+                <a:spcPts val="0"/>
+              </a:spcBef>
+              <a:buNone/>
+            </a:pPr>
+            <a:r>
+              <a:rPr sz="1200" lang="en"/>
+              <a:t>    </a:t>
+            </a:r>
+            <a:r>
+              <a:rPr u="sng" b="1" sz="1800" lang="en"/>
+              <a:t>DONE:</a:t>
+            </a:r>
+          </a:p>
+          <a:p>
+            <a:pPr rtl="0" lvl="0">
+              <a:spcBef>
+                <a:spcPts val="0"/>
+              </a:spcBef>
+              <a:buNone/>
+            </a:pPr>
+            <a:r>
+              <a:rPr b="1" sz="1200" lang="en"/>
+              <a:t>recipe=$(iconv -f utf8 -t ascii//TRANSLIT &lt;&lt;&lt; "$recipe")</a:t>
+            </a:r>
+          </a:p>
+          <a:p>
+            <a:pPr rtl="0" lvl="0">
+              <a:spcBef>
+                <a:spcPts val="0"/>
+              </a:spcBef>
+              <a:buNone/>
+            </a:pPr>
+            <a:r>
+              <a:rPr sz="1200" lang="en"/>
+              <a:t>→ Managing the special characters such as '^', taking utf8 characters in entry and translating them into ascii</a:t>
+            </a:r>
+          </a:p>
+          <a:p>
+            <a:pPr rtl="0" lvl="0">
+              <a:spcBef>
+                <a:spcPts val="0"/>
+              </a:spcBef>
+              <a:buNone/>
+            </a:pPr>
+            <a:r>
+              <a:rPr b="1" sz="1200" lang="en"/>
+              <a:t>recipe=${recipe// /-}</a:t>
+            </a:r>
+          </a:p>
+          <a:p>
+            <a:pPr rtl="0" lvl="0">
+              <a:spcBef>
+                <a:spcPts val="0"/>
+              </a:spcBef>
+              <a:buNone/>
+            </a:pPr>
+            <a:r>
+              <a:rPr sz="1200" lang="en"/>
+              <a:t>→ Managing the possible blanks between words, replacing them by '-' (used on marmiton.org)</a:t>
+            </a:r>
+          </a:p>
+          <a:p>
+            <a:pPr rtl="0" lvl="0">
+              <a:spcBef>
+                <a:spcPts val="0"/>
+              </a:spcBef>
+              <a:buNone/>
+            </a:pPr>
+            <a:r>
+              <a:rPr b="1" sz="1200" lang="en"/>
+              <a:t>while [[ $(curl -s http://www.marmiton.org/recettes/recherche.aspx?aqt=$recipe | grep "Aucun résultat") ]]; do</a:t>
+            </a:r>
+          </a:p>
+          <a:p>
+            <a:pPr rtl="0" lvl="0">
               <a:spcBef>
                 <a:spcPts val="0"/>
               </a:spcBef>
               <a:buClr>
                 <a:schemeClr val="dk1"/>
               </a:buClr>
-              <a:buSzPct val="100000"/>
+              <a:buSzPct val="91666"/>
               <a:buFont typeface="Arial"/>
-              <a:buAutoNum type="arabicPeriod"/>
-            </a:pPr>
-            <a:r>
-              <a:rPr sz="2400" lang="en"/>
-              <a:t>Launch the marmiton.sh script </a:t>
-            </a:r>
-            <a:r>
-              <a:rPr b="1" sz="2400" lang="en"/>
-              <a:t>: $ ./marmiton.sh</a:t>
-            </a:r>
-          </a:p>
-          <a:p>
-            <a:pPr rtl="0" lvl="0" indent="-381000" marL="457200">
+              <a:buNone/>
+            </a:pPr>
+            <a:r>
+              <a:rPr b="1" sz="1200" lang="en"/>
+              <a:t>    echo "No results found. Please try again.";</a:t>
+            </a:r>
+          </a:p>
+          <a:p>
+            <a:pPr rtl="0" lvl="0">
               <a:spcBef>
                 <a:spcPts val="0"/>
               </a:spcBef>
               <a:buClr>
                 <a:schemeClr val="dk1"/>
               </a:buClr>
-              <a:buSzPct val="100000"/>
+              <a:buSzPct val="91666"/>
               <a:buFont typeface="Arial"/>
-              <a:buAutoNum type="arabicPeriod"/>
-            </a:pPr>
-            <a:r>
-              <a:rPr sz="2400" lang="en"/>
-              <a:t>Enter the recipe that you’re looking for</a:t>
-            </a:r>
-            <a:br>
-              <a:rPr sz="2400" lang="en"/>
-            </a:br>
-            <a:r>
-              <a:rPr sz="2400" lang="en"/>
-              <a:t>ex: </a:t>
-            </a:r>
-            <a:r>
-              <a:rPr b="1" sz="2400" lang="en"/>
-              <a:t>ratatouille </a:t>
-            </a:r>
-          </a:p>
-          <a:p>
-            <a:pPr rtl="0" lvl="0" indent="-381000" marL="457200">
+              <a:buNone/>
+            </a:pPr>
+            <a:r>
+              <a:rPr b="1" sz="1200" lang="en"/>
+              <a:t>    read recipe;</a:t>
+            </a:r>
+          </a:p>
+          <a:p>
+            <a:pPr rtl="0" lvl="0">
               <a:spcBef>
                 <a:spcPts val="0"/>
               </a:spcBef>
               <a:buClr>
                 <a:schemeClr val="dk1"/>
               </a:buClr>
-              <a:buSzPct val="100000"/>
+              <a:buSzPct val="91666"/>
               <a:buFont typeface="Arial"/>
-              <a:buAutoNum type="arabicPeriod"/>
-            </a:pPr>
-            <a:r>
-              <a:rPr sz="2400" lang="en"/>
-              <a:t>Then sort the results by : title, votes, time …</a:t>
-            </a:r>
-          </a:p>
-          <a:p>
-            <a:pPr rtl="0" lvl="0">
-              <a:spcBef>
-                <a:spcPts val="0"/>
-              </a:spcBef>
-              <a:buNone/>
-            </a:pPr>
-            <a:r>
-              <a:t/>
-            </a:r>
-            <a:endParaRPr sz="2400"/>
-          </a:p>
-          <a:p>
-            <a:pPr rtl="0" lvl="0">
-              <a:spcBef>
-                <a:spcPts val="0"/>
-              </a:spcBef>
-              <a:buNone/>
-            </a:pPr>
-            <a:r>
-              <a:rPr sz="2400" lang="en" i="1"/>
-              <a:t>See the how_to_marmiton file for more details</a:t>
-            </a:r>
-          </a:p>
-          <a:p>
-            <a:pPr rtl="0" lvl="0">
-              <a:spcBef>
-                <a:spcPts val="0"/>
-              </a:spcBef>
-              <a:buNone/>
-            </a:pPr>
-            <a:r>
-              <a:t/>
-            </a:r>
-            <a:endParaRPr sz="2400"/>
+              <a:buNone/>
+            </a:pPr>
+            <a:r>
+              <a:rPr b="1" sz="1200" lang="en"/>
+              <a:t>    recipe=$(iconv -f utf8 -t ascii//TRANSLIT &lt;&lt;&lt; "$recipe")</a:t>
+            </a:r>
+          </a:p>
+          <a:p>
+            <a:pPr rtl="0" lvl="0">
+              <a:spcBef>
+                <a:spcPts val="0"/>
+              </a:spcBef>
+              <a:buNone/>
+            </a:pPr>
+            <a:r>
+              <a:rPr b="1" sz="1200" lang="en"/>
+              <a:t>    recipe=${recipe// /-}</a:t>
+            </a:r>
+          </a:p>
+          <a:p>
+            <a:pPr rtl="0" lvl="0">
+              <a:spcBef>
+                <a:spcPts val="0"/>
+              </a:spcBef>
+              <a:buNone/>
+            </a:pPr>
+            <a:r>
+              <a:rPr b="1" sz="1200" lang="en"/>
+              <a:t>done</a:t>
+            </a:r>
+          </a:p>
+          <a:p>
+            <a:pPr rtl="0">
+              <a:spcBef>
+                <a:spcPts val="0"/>
+              </a:spcBef>
+              <a:buNone/>
+            </a:pPr>
+            <a:r>
+              <a:rPr sz="1200" lang="en"/>
+              <a:t>→ $() executes the command curl and retrieves the results</a:t>
+            </a:r>
+          </a:p>
+          <a:p>
+            <a:pPr>
+              <a:spcBef>
+                <a:spcPts val="0"/>
+              </a:spcBef>
+              <a:buNone/>
+            </a:pPr>
+            <a:r>
+              <a:rPr sz="1200" lang="en"/>
+              <a:t>→ The while loop allows us to manage the error when no result was  found and asks again the user what he wants to search for</a:t>
+            </a:r>
           </a:p>
         </p:txBody>
       </p:sp>
-      <p:pic>
-        <p:nvPicPr>
-          <p:cNvPr id="86" name="Shape 86"/>
-          <p:cNvPicPr preferRelativeResize="0"/>
-          <p:nvPr/>
-        </p:nvPicPr>
-        <p:blipFill>
-          <a:blip r:embed="rId3"/>
-          <a:stretch>
-            <a:fillRect/>
-          </a:stretch>
-        </p:blipFill>
-        <p:spPr>
-          <a:xfrm>
-            <a:off y="1787500" x="7035475"/>
-            <a:ext cy="1678174" cx="1651324"/>
-          </a:xfrm>
-          <a:prstGeom prst="rect">
-            <a:avLst/>
-          </a:prstGeom>
-        </p:spPr>
-      </p:pic>
     </p:spTree>
   </p:cSld>
   <p:clrMapOvr>
@@ -6310,7 +6515,7 @@
   <p:cSld>
     <p:spTree>
       <p:nvGrpSpPr>
-        <p:cNvPr id="90" name="Shape 90"/>
+        <p:cNvPr id="89" name="Shape 89"/>
         <p:cNvGrpSpPr/>
         <p:nvPr/>
       </p:nvGrpSpPr>
@@ -6324,7 +6529,7 @@
       </p:grpSpPr>
       <p:sp>
         <p:nvSpPr>
-          <p:cNvPr id="91" name="Shape 91"/>
+          <p:cNvPr id="90" name="Shape 90"/>
           <p:cNvSpPr txBox="1"/>
           <p:nvPr>
             <p:ph type="title"/>
@@ -6353,8 +6558,134 @@
             </a:pPr>
             <a:r>
               <a:rPr lang="en"/>
-              <a:t>Script using baguette</a:t>
-            </a:r>
+              <a:t>Testing Phase</a:t>
+            </a:r>
+          </a:p>
+        </p:txBody>
+      </p:sp>
+      <p:sp>
+        <p:nvSpPr>
+          <p:cNvPr id="91" name="Shape 91"/>
+          <p:cNvSpPr txBox="1"/>
+          <p:nvPr>
+            <p:ph idx="1" type="body"/>
+          </p:nvPr>
+        </p:nvSpPr>
+        <p:spPr>
+          <a:xfrm>
+            <a:off y="1200150" x="457200"/>
+            <a:ext cy="3725699" cx="8229600"/>
+          </a:xfrm>
+          <a:prstGeom prst="rect">
+            <a:avLst/>
+          </a:prstGeom>
+        </p:spPr>
+        <p:txBody>
+          <a:bodyPr bIns="91425" rIns="91425" lIns="91425" tIns="91425" anchor="t" anchorCtr="0">
+            <a:noAutofit/>
+          </a:bodyPr>
+          <a:lstStyle/>
+          <a:p>
+            <a:pPr rtl="0" lvl="0" indent="-381000" marL="457200">
+              <a:spcBef>
+                <a:spcPts val="0"/>
+              </a:spcBef>
+              <a:buClr>
+                <a:schemeClr val="dk1"/>
+              </a:buClr>
+              <a:buSzPct val="100000"/>
+              <a:buFont typeface="Arial"/>
+              <a:buAutoNum type="arabicPeriod"/>
+            </a:pPr>
+            <a:r>
+              <a:rPr sz="2400" lang="en"/>
+              <a:t>Launch the marmiton.sh script </a:t>
+            </a:r>
+            <a:r>
+              <a:rPr b="1" sz="2400" lang="en"/>
+              <a:t>: $ ./marmiton.sh</a:t>
+            </a:r>
+          </a:p>
+          <a:p>
+            <a:pPr rtl="0" lvl="0" indent="-381000" marL="457200">
+              <a:spcBef>
+                <a:spcPts val="0"/>
+              </a:spcBef>
+              <a:buClr>
+                <a:schemeClr val="dk1"/>
+              </a:buClr>
+              <a:buSzPct val="100000"/>
+              <a:buFont typeface="Arial"/>
+              <a:buAutoNum type="arabicPeriod"/>
+            </a:pPr>
+            <a:r>
+              <a:rPr sz="2400" lang="en"/>
+              <a:t>Enter the recipe that you’re looking for</a:t>
+            </a:r>
+            <a:br>
+              <a:rPr sz="2400" lang="en"/>
+            </a:br>
+            <a:r>
+              <a:rPr sz="2400" lang="en"/>
+              <a:t>ex: </a:t>
+            </a:r>
+            <a:r>
+              <a:rPr b="1" sz="2400" lang="en"/>
+              <a:t>ratatouille </a:t>
+            </a:r>
+          </a:p>
+          <a:p>
+            <a:pPr rtl="0" lvl="0" indent="-381000" marL="457200">
+              <a:spcBef>
+                <a:spcPts val="0"/>
+              </a:spcBef>
+              <a:buClr>
+                <a:schemeClr val="dk1"/>
+              </a:buClr>
+              <a:buSzPct val="100000"/>
+              <a:buFont typeface="Arial"/>
+              <a:buAutoNum type="arabicPeriod"/>
+            </a:pPr>
+            <a:r>
+              <a:rPr sz="2400" lang="en"/>
+              <a:t>Then sort the results by : title, votes, time …</a:t>
+            </a:r>
+          </a:p>
+          <a:p>
+            <a:pPr rtl="0" lvl="0">
+              <a:spcBef>
+                <a:spcPts val="0"/>
+              </a:spcBef>
+              <a:buNone/>
+            </a:pPr>
+            <a:r>
+              <a:t/>
+            </a:r>
+            <a:endParaRPr sz="2400"/>
+          </a:p>
+          <a:p>
+            <a:pPr rtl="0" lvl="0">
+              <a:spcBef>
+                <a:spcPts val="0"/>
+              </a:spcBef>
+              <a:buNone/>
+            </a:pPr>
+            <a:r>
+              <a:rPr sz="2400" lang="en" i="1"/>
+              <a:t>See the how_to_marmiton file for more details</a:t>
+            </a:r>
+          </a:p>
+          <a:p>
+            <a:pPr rtl="0" lvl="0">
+              <a:spcBef>
+                <a:spcPts val="0"/>
+              </a:spcBef>
+              <a:buNone/>
+            </a:pPr>
+            <a:r>
+              <a:t/>
+            </a:r>
+            <a:endParaRPr sz="2400"/>
           </a:p>
         </p:txBody>
       </p:sp>
@@ -6364,23 +6695,20 @@
           <p:cNvPicPr preferRelativeResize="0"/>
           <p:nvPr/>
         </p:nvPicPr>
-        <p:blipFill rotWithShape="1">
+        <p:blipFill>
           <a:blip r:embed="rId3"/>
-          <a:srcRect t="0" b="23699" r="0" l="0"/>
-          <a:stretch/>
+          <a:stretch>
+            <a:fillRect/>
+          </a:stretch>
         </p:blipFill>
         <p:spPr>
           <a:xfrm>
-            <a:off y="1220875" x="279950"/>
-            <a:ext cy="3924499" cx="8584099"/>
+            <a:off y="1787500" x="7035475"/>
+            <a:ext cy="1678174" cx="1651324"/>
           </a:xfrm>
           <a:prstGeom prst="rect">
             <a:avLst/>
           </a:prstGeom>
-          <a:noFill/>
-          <a:ln>
-            <a:noFill/>
-          </a:ln>
         </p:spPr>
       </p:pic>
     </p:spTree>
@@ -6672,283 +7000,6 @@
 </file>
 
 <file path=ppt/theme/theme2.xml><?xml version="1.0" encoding="utf-8"?>
-<a:theme xmlns:a="http://schemas.openxmlformats.org/drawingml/2006/main" xmlns:r="http://schemas.openxmlformats.org/officeDocument/2006/relationships" name="swiss">
-  <a:themeElements>
-    <a:clrScheme name="Custom 218">
-      <a:dk1>
-        <a:srgbClr val="000000"/>
-      </a:dk1>
-      <a:lt1>
-        <a:srgbClr val="FFFFFF"/>
-      </a:lt1>
-      <a:dk2>
-        <a:srgbClr val="5B595A"/>
-      </a:dk2>
-      <a:lt2>
-        <a:srgbClr val="CFD4D4"/>
-      </a:lt2>
-      <a:accent1>
-        <a:srgbClr val="CC0202"/>
-      </a:accent1>
-      <a:accent2>
-        <a:srgbClr val="228AFF"/>
-      </a:accent2>
-      <a:accent3>
-        <a:srgbClr val="FBC82F"/>
-      </a:accent3>
-      <a:accent4>
-        <a:srgbClr val="253E91"/>
-      </a:accent4>
-      <a:accent5>
-        <a:srgbClr val="F68D0C"/>
-      </a:accent5>
-      <a:accent6>
-        <a:srgbClr val="257E12"/>
-      </a:accent6>
-      <a:hlink>
-        <a:srgbClr val="144C72"/>
-      </a:hlink>
-      <a:folHlink>
-        <a:srgbClr val="8C9D92"/>
-      </a:folHlink>
-    </a:clrScheme>
-    <a:fontScheme name="Office">
-      <a:majorFont>
-        <a:latin typeface="Arial"/>
-        <a:ea typeface=""/>
-        <a:cs typeface=""/>
-        <a:font typeface="ＭＳ Ｐゴシック" script="Jpan"/>
-        <a:font typeface="맑은 고딕" script="Hang"/>
-        <a:font typeface="宋体" script="Hans"/>
-        <a:font typeface="新細明體" script="Hant"/>
-        <a:font typeface="Times New Roman" script="Arab"/>
-        <a:font typeface="Times New Roman" script="Hebr"/>
-        <a:font typeface="Angsana New" script="Thai"/>
-        <a:font typeface="Nyala" script="Ethi"/>
-        <a:font typeface="Vrinda" script="Beng"/>
-        <a:font typeface="Shruti" script="Gujr"/>
-        <a:font typeface="MoolBoran" script="Khmr"/>
-        <a:font typeface="Tunga" script="Knda"/>
-        <a:font typeface="Raavi" script="Guru"/>
-        <a:font typeface="Euphemia" script="Cans"/>
-        <a:font typeface="Plantagenet Cherokee" script="Cher"/>
-        <a:font typeface="Microsoft Yi Baiti" script="Yiii"/>
-        <a:font typeface="Microsoft Himalaya" script="Tibt"/>
-        <a:font typeface="MV Boli" script="Thaa"/>
-        <a:font typeface="Mangal" script="Deva"/>
-        <a:font typeface="Gautami" script="Telu"/>
-        <a:font typeface="Latha" script="Taml"/>
-        <a:font typeface="Estrangelo Edessa" script="Syrc"/>
-        <a:font typeface="Kalinga" script="Orya"/>
-        <a:font typeface="Kartika" script="Mlym"/>
-        <a:font typeface="DokChampa" script="Laoo"/>
-        <a:font typeface="Iskoola Pota" script="Sinh"/>
-        <a:font typeface="Mongolian Baiti" script="Mong"/>
-        <a:font typeface="Times New Roman" script="Viet"/>
-        <a:font typeface="Microsoft Uighur" script="Uigh"/>
-      </a:majorFont>
-      <a:minorFont>
-        <a:latin typeface="Arial"/>
-        <a:ea typeface=""/>
-        <a:cs typeface=""/>
-        <a:font typeface="ＭＳ Ｐゴシック" script="Jpan"/>
-        <a:font typeface="맑은 고딕" script="Hang"/>
-        <a:font typeface="宋体" script="Hans"/>
-        <a:font typeface="新細明體" script="Hant"/>
-        <a:font typeface="Arial" script="Arab"/>
-        <a:font typeface="Arial" script="Hebr"/>
-        <a:font typeface="Cordia New" script="Thai"/>
-        <a:font typeface="Nyala" script="Ethi"/>
-        <a:font typeface="Vrinda" script="Beng"/>
-        <a:font typeface="Shruti" script="Gujr"/>
-        <a:font typeface="DaunPenh" script="Khmr"/>
-        <a:font typeface="Tunga" script="Knda"/>
-        <a:font typeface="Raavi" script="Guru"/>
-        <a:font typeface="Euphemia" script="Cans"/>
-        <a:font typeface="Plantagenet Cherokee" script="Cher"/>
-        <a:font typeface="Microsoft Yi Baiti" script="Yiii"/>
-        <a:font typeface="Microsoft Himalaya" script="Tibt"/>
-        <a:font typeface="MV Boli" script="Thaa"/>
-        <a:font typeface="Mangal" script="Deva"/>
-        <a:font typeface="Gautami" script="Telu"/>
-        <a:font typeface="Latha" script="Taml"/>
-        <a:font typeface="Estrangelo Edessa" script="Syrc"/>
-        <a:font typeface="Kalinga" script="Orya"/>
-        <a:font typeface="Kartika" script="Mlym"/>
-        <a:font typeface="DokChampa" script="Laoo"/>
-        <a:font typeface="Iskoola Pota" script="Sinh"/>
-        <a:font typeface="Mongolian Baiti" script="Mong"/>
-        <a:font typeface="Arial" script="Viet"/>
-        <a:font typeface="Microsoft Uighur" script="Uigh"/>
-      </a:minorFont>
-    </a:fontScheme>
-    <a:fmtScheme name="Office">
-      <a:fillStyleLst>
-        <a:solidFill>
-          <a:schemeClr val="phClr"/>
-        </a:solidFill>
-        <a:gradFill rotWithShape="1">
-          <a:gsLst>
-            <a:gs pos="0">
-              <a:schemeClr val="phClr">
-                <a:tint val="50000"/>
-                <a:satMod val="300000"/>
-              </a:schemeClr>
-            </a:gs>
-            <a:gs pos="35000">
-              <a:schemeClr val="phClr">
-                <a:tint val="37000"/>
-                <a:satMod val="300000"/>
-              </a:schemeClr>
-            </a:gs>
-            <a:gs pos="100000">
-              <a:schemeClr val="phClr">
-                <a:tint val="15000"/>
-                <a:satMod val="350000"/>
-              </a:schemeClr>
-            </a:gs>
-          </a:gsLst>
-          <a:lin ang="16200000" scaled="1"/>
-        </a:gradFill>
-        <a:gradFill rotWithShape="1">
-          <a:gsLst>
-            <a:gs pos="0">
-              <a:schemeClr val="phClr">
-                <a:tint val="100000"/>
-                <a:shade val="100000"/>
-                <a:satMod val="130000"/>
-              </a:schemeClr>
-            </a:gs>
-            <a:gs pos="100000">
-              <a:schemeClr val="phClr">
-                <a:tint val="50000"/>
-                <a:shade val="100000"/>
-                <a:satMod val="350000"/>
-              </a:schemeClr>
-            </a:gs>
-          </a:gsLst>
-          <a:lin ang="16200000" scaled="0"/>
-        </a:gradFill>
-      </a:fillStyleLst>
-      <a:lnStyleLst>
-        <a:ln w="9525" algn="ctr" cap="flat" cmpd="sng">
-          <a:solidFill>
-            <a:schemeClr val="phClr">
-              <a:shade val="95000"/>
-              <a:satMod val="105000"/>
-            </a:schemeClr>
-          </a:solidFill>
-          <a:prstDash val="solid"/>
-        </a:ln>
-        <a:ln w="25400" algn="ctr" cap="flat" cmpd="sng">
-          <a:solidFill>
-            <a:schemeClr val="phClr"/>
-          </a:solidFill>
-          <a:prstDash val="solid"/>
-        </a:ln>
-        <a:ln w="38100" algn="ctr" cap="flat" cmpd="sng">
-          <a:solidFill>
-            <a:schemeClr val="phClr"/>
-          </a:solidFill>
-          <a:prstDash val="solid"/>
-        </a:ln>
-      </a:lnStyleLst>
-      <a:effectStyleLst>
-        <a:effectStyle>
-          <a:effectLst>
-            <a:outerShdw rotWithShape="0" dir="5400000" blurRad="40000" dist="20000">
-              <a:srgbClr val="000000">
-                <a:alpha val="38000"/>
-              </a:srgbClr>
-            </a:outerShdw>
-          </a:effectLst>
-        </a:effectStyle>
-        <a:effectStyle>
-          <a:effectLst>
-            <a:outerShdw rotWithShape="0" dir="5400000" blurRad="40000" dist="23000">
-              <a:srgbClr val="000000">
-                <a:alpha val="35000"/>
-              </a:srgbClr>
-            </a:outerShdw>
-          </a:effectLst>
-        </a:effectStyle>
-        <a:effectStyle>
-          <a:effectLst>
-            <a:outerShdw rotWithShape="0" dir="5400000" blurRad="40000" dist="23000">
-              <a:srgbClr val="000000">
-                <a:alpha val="35000"/>
-              </a:srgbClr>
-            </a:outerShdw>
-          </a:effectLst>
-          <a:scene3d>
-            <a:camera prst="orthographicFront">
-              <a:rot rev="0" lon="0" lat="0"/>
-            </a:camera>
-            <a:lightRig dir="t" rig="threePt">
-              <a:rot rev="1200000" lon="0" lat="0"/>
-            </a:lightRig>
-          </a:scene3d>
-          <a:sp3d>
-            <a:bevelT w="63500" h="25400"/>
-          </a:sp3d>
-        </a:effectStyle>
-      </a:effectStyleLst>
-      <a:bgFillStyleLst>
-        <a:solidFill>
-          <a:schemeClr val="phClr"/>
-        </a:solidFill>
-        <a:gradFill rotWithShape="1">
-          <a:gsLst>
-            <a:gs pos="0">
-              <a:schemeClr val="phClr">
-                <a:tint val="40000"/>
-                <a:satMod val="350000"/>
-              </a:schemeClr>
-            </a:gs>
-            <a:gs pos="40000">
-              <a:schemeClr val="phClr">
-                <a:tint val="45000"/>
-                <a:shade val="99000"/>
-                <a:satMod val="350000"/>
-              </a:schemeClr>
-            </a:gs>
-            <a:gs pos="100000">
-              <a:schemeClr val="phClr">
-                <a:shade val="20000"/>
-                <a:satMod val="255000"/>
-              </a:schemeClr>
-            </a:gs>
-          </a:gsLst>
-          <a:path path="circle">
-            <a:fillToRect t="-80000" b="180000" r="50000" l="50000"/>
-          </a:path>
-        </a:gradFill>
-        <a:gradFill rotWithShape="1">
-          <a:gsLst>
-            <a:gs pos="0">
-              <a:schemeClr val="phClr">
-                <a:tint val="80000"/>
-                <a:satMod val="300000"/>
-              </a:schemeClr>
-            </a:gs>
-            <a:gs pos="100000">
-              <a:schemeClr val="phClr">
-                <a:shade val="30000"/>
-                <a:satMod val="200000"/>
-              </a:schemeClr>
-            </a:gs>
-          </a:gsLst>
-          <a:path path="circle">
-            <a:fillToRect t="50000" b="50000" r="50000" l="50000"/>
-          </a:path>
-        </a:gradFill>
-      </a:bgFillStyleLst>
-    </a:fmtScheme>
-  </a:themeElements>
-</a:theme>
-</file>
-
-<file path=ppt/theme/theme3.xml><?xml version="1.0" encoding="utf-8"?>
 <a:theme xmlns:a="http://schemas.openxmlformats.org/drawingml/2006/main" xmlns:r="http://schemas.openxmlformats.org/officeDocument/2006/relationships" name="Office Theme">
   <a:themeElements>
     <a:clrScheme name="Office">
@@ -7264,4 +7315,281 @@
   </a:objectDefaults>
   <a:extraClrSchemeLst/>
 </a:theme>
+</file>
+
+<file path=ppt/theme/theme3.xml><?xml version="1.0" encoding="utf-8"?>
+<a:theme xmlns:a="http://schemas.openxmlformats.org/drawingml/2006/main" xmlns:r="http://schemas.openxmlformats.org/officeDocument/2006/relationships" name="swiss">
+  <a:themeElements>
+    <a:clrScheme name="Custom 218">
+      <a:dk1>
+        <a:srgbClr val="000000"/>
+      </a:dk1>
+      <a:lt1>
+        <a:srgbClr val="FFFFFF"/>
+      </a:lt1>
+      <a:dk2>
+        <a:srgbClr val="5B595A"/>
+      </a:dk2>
+      <a:lt2>
+        <a:srgbClr val="CFD4D4"/>
+      </a:lt2>
+      <a:accent1>
+        <a:srgbClr val="CC0202"/>
+      </a:accent1>
+      <a:accent2>
+        <a:srgbClr val="228AFF"/>
+      </a:accent2>
+      <a:accent3>
+        <a:srgbClr val="FBC82F"/>
+      </a:accent3>
+      <a:accent4>
+        <a:srgbClr val="253E91"/>
+      </a:accent4>
+      <a:accent5>
+        <a:srgbClr val="F68D0C"/>
+      </a:accent5>
+      <a:accent6>
+        <a:srgbClr val="257E12"/>
+      </a:accent6>
+      <a:hlink>
+        <a:srgbClr val="144C72"/>
+      </a:hlink>
+      <a:folHlink>
+        <a:srgbClr val="8C9D92"/>
+      </a:folHlink>
+    </a:clrScheme>
+    <a:fontScheme name="Office">
+      <a:majorFont>
+        <a:latin typeface="Arial"/>
+        <a:ea typeface=""/>
+        <a:cs typeface=""/>
+        <a:font typeface="ＭＳ Ｐゴシック" script="Jpan"/>
+        <a:font typeface="맑은 고딕" script="Hang"/>
+        <a:font typeface="宋体" script="Hans"/>
+        <a:font typeface="新細明體" script="Hant"/>
+        <a:font typeface="Times New Roman" script="Arab"/>
+        <a:font typeface="Times New Roman" script="Hebr"/>
+        <a:font typeface="Angsana New" script="Thai"/>
+        <a:font typeface="Nyala" script="Ethi"/>
+        <a:font typeface="Vrinda" script="Beng"/>
+        <a:font typeface="Shruti" script="Gujr"/>
+        <a:font typeface="MoolBoran" script="Khmr"/>
+        <a:font typeface="Tunga" script="Knda"/>
+        <a:font typeface="Raavi" script="Guru"/>
+        <a:font typeface="Euphemia" script="Cans"/>
+        <a:font typeface="Plantagenet Cherokee" script="Cher"/>
+        <a:font typeface="Microsoft Yi Baiti" script="Yiii"/>
+        <a:font typeface="Microsoft Himalaya" script="Tibt"/>
+        <a:font typeface="MV Boli" script="Thaa"/>
+        <a:font typeface="Mangal" script="Deva"/>
+        <a:font typeface="Gautami" script="Telu"/>
+        <a:font typeface="Latha" script="Taml"/>
+        <a:font typeface="Estrangelo Edessa" script="Syrc"/>
+        <a:font typeface="Kalinga" script="Orya"/>
+        <a:font typeface="Kartika" script="Mlym"/>
+        <a:font typeface="DokChampa" script="Laoo"/>
+        <a:font typeface="Iskoola Pota" script="Sinh"/>
+        <a:font typeface="Mongolian Baiti" script="Mong"/>
+        <a:font typeface="Times New Roman" script="Viet"/>
+        <a:font typeface="Microsoft Uighur" script="Uigh"/>
+      </a:majorFont>
+      <a:minorFont>
+        <a:latin typeface="Arial"/>
+        <a:ea typeface=""/>
+        <a:cs typeface=""/>
+        <a:font typeface="ＭＳ Ｐゴシック" script="Jpan"/>
+        <a:font typeface="맑은 고딕" script="Hang"/>
+        <a:font typeface="宋体" script="Hans"/>
+        <a:font typeface="新細明體" script="Hant"/>
+        <a:font typeface="Arial" script="Arab"/>
+        <a:font typeface="Arial" script="Hebr"/>
+        <a:font typeface="Cordia New" script="Thai"/>
+        <a:font typeface="Nyala" script="Ethi"/>
+        <a:font typeface="Vrinda" script="Beng"/>
+        <a:font typeface="Shruti" script="Gujr"/>
+        <a:font typeface="DaunPenh" script="Khmr"/>
+        <a:font typeface="Tunga" script="Knda"/>
+        <a:font typeface="Raavi" script="Guru"/>
+        <a:font typeface="Euphemia" script="Cans"/>
+        <a:font typeface="Plantagenet Cherokee" script="Cher"/>
+        <a:font typeface="Microsoft Yi Baiti" script="Yiii"/>
+        <a:font typeface="Microsoft Himalaya" script="Tibt"/>
+        <a:font typeface="MV Boli" script="Thaa"/>
+        <a:font typeface="Mangal" script="Deva"/>
+        <a:font typeface="Gautami" script="Telu"/>
+        <a:font typeface="Latha" script="Taml"/>
+        <a:font typeface="Estrangelo Edessa" script="Syrc"/>
+        <a:font typeface="Kalinga" script="Orya"/>
+        <a:font typeface="Kartika" script="Mlym"/>
+        <a:font typeface="DokChampa" script="Laoo"/>
+        <a:font typeface="Iskoola Pota" script="Sinh"/>
+        <a:font typeface="Mongolian Baiti" script="Mong"/>
+        <a:font typeface="Arial" script="Viet"/>
+        <a:font typeface="Microsoft Uighur" script="Uigh"/>
+      </a:minorFont>
+    </a:fontScheme>
+    <a:fmtScheme name="Office">
+      <a:fillStyleLst>
+        <a:solidFill>
+          <a:schemeClr val="phClr"/>
+        </a:solidFill>
+        <a:gradFill rotWithShape="1">
+          <a:gsLst>
+            <a:gs pos="0">
+              <a:schemeClr val="phClr">
+                <a:tint val="50000"/>
+                <a:satMod val="300000"/>
+              </a:schemeClr>
+            </a:gs>
+            <a:gs pos="35000">
+              <a:schemeClr val="phClr">
+                <a:tint val="37000"/>
+                <a:satMod val="300000"/>
+              </a:schemeClr>
+            </a:gs>
+            <a:gs pos="100000">
+              <a:schemeClr val="phClr">
+                <a:tint val="15000"/>
+                <a:satMod val="350000"/>
+              </a:schemeClr>
+            </a:gs>
+          </a:gsLst>
+          <a:lin ang="16200000" scaled="1"/>
+        </a:gradFill>
+        <a:gradFill rotWithShape="1">
+          <a:gsLst>
+            <a:gs pos="0">
+              <a:schemeClr val="phClr">
+                <a:tint val="100000"/>
+                <a:shade val="100000"/>
+                <a:satMod val="130000"/>
+              </a:schemeClr>
+            </a:gs>
+            <a:gs pos="100000">
+              <a:schemeClr val="phClr">
+                <a:tint val="50000"/>
+                <a:shade val="100000"/>
+                <a:satMod val="350000"/>
+              </a:schemeClr>
+            </a:gs>
+          </a:gsLst>
+          <a:lin ang="16200000" scaled="0"/>
+        </a:gradFill>
+      </a:fillStyleLst>
+      <a:lnStyleLst>
+        <a:ln w="9525" algn="ctr" cap="flat" cmpd="sng">
+          <a:solidFill>
+            <a:schemeClr val="phClr">
+              <a:shade val="95000"/>
+              <a:satMod val="105000"/>
+            </a:schemeClr>
+          </a:solidFill>
+          <a:prstDash val="solid"/>
+        </a:ln>
+        <a:ln w="25400" algn="ctr" cap="flat" cmpd="sng">
+          <a:solidFill>
+            <a:schemeClr val="phClr"/>
+          </a:solidFill>
+          <a:prstDash val="solid"/>
+        </a:ln>
+        <a:ln w="38100" algn="ctr" cap="flat" cmpd="sng">
+          <a:solidFill>
+            <a:schemeClr val="phClr"/>
+          </a:solidFill>
+          <a:prstDash val="solid"/>
+        </a:ln>
+      </a:lnStyleLst>
+      <a:effectStyleLst>
+        <a:effectStyle>
+          <a:effectLst>
+            <a:outerShdw rotWithShape="0" dir="5400000" blurRad="40000" dist="20000">
+              <a:srgbClr val="000000">
+                <a:alpha val="38000"/>
+              </a:srgbClr>
+            </a:outerShdw>
+          </a:effectLst>
+        </a:effectStyle>
+        <a:effectStyle>
+          <a:effectLst>
+            <a:outerShdw rotWithShape="0" dir="5400000" blurRad="40000" dist="23000">
+              <a:srgbClr val="000000">
+                <a:alpha val="35000"/>
+              </a:srgbClr>
+            </a:outerShdw>
+          </a:effectLst>
+        </a:effectStyle>
+        <a:effectStyle>
+          <a:effectLst>
+            <a:outerShdw rotWithShape="0" dir="5400000" blurRad="40000" dist="23000">
+              <a:srgbClr val="000000">
+                <a:alpha val="35000"/>
+              </a:srgbClr>
+            </a:outerShdw>
+          </a:effectLst>
+          <a:scene3d>
+            <a:camera prst="orthographicFront">
+              <a:rot rev="0" lon="0" lat="0"/>
+            </a:camera>
+            <a:lightRig dir="t" rig="threePt">
+              <a:rot rev="1200000" lon="0" lat="0"/>
+            </a:lightRig>
+          </a:scene3d>
+          <a:sp3d>
+            <a:bevelT w="63500" h="25400"/>
+          </a:sp3d>
+        </a:effectStyle>
+      </a:effectStyleLst>
+      <a:bgFillStyleLst>
+        <a:solidFill>
+          <a:schemeClr val="phClr"/>
+        </a:solidFill>
+        <a:gradFill rotWithShape="1">
+          <a:gsLst>
+            <a:gs pos="0">
+              <a:schemeClr val="phClr">
+                <a:tint val="40000"/>
+                <a:satMod val="350000"/>
+              </a:schemeClr>
+            </a:gs>
+            <a:gs pos="40000">
+              <a:schemeClr val="phClr">
+                <a:tint val="45000"/>
+                <a:shade val="99000"/>
+                <a:satMod val="350000"/>
+              </a:schemeClr>
+            </a:gs>
+            <a:gs pos="100000">
+              <a:schemeClr val="phClr">
+                <a:shade val="20000"/>
+                <a:satMod val="255000"/>
+              </a:schemeClr>
+            </a:gs>
+          </a:gsLst>
+          <a:path path="circle">
+            <a:fillToRect t="-80000" b="180000" r="50000" l="50000"/>
+          </a:path>
+        </a:gradFill>
+        <a:gradFill rotWithShape="1">
+          <a:gsLst>
+            <a:gs pos="0">
+              <a:schemeClr val="phClr">
+                <a:tint val="80000"/>
+                <a:satMod val="300000"/>
+              </a:schemeClr>
+            </a:gs>
+            <a:gs pos="100000">
+              <a:schemeClr val="phClr">
+                <a:shade val="30000"/>
+                <a:satMod val="200000"/>
+              </a:schemeClr>
+            </a:gs>
+          </a:gsLst>
+          <a:path path="circle">
+            <a:fillToRect t="50000" b="50000" r="50000" l="50000"/>
+          </a:path>
+        </a:gradFill>
+      </a:bgFillStyleLst>
+    </a:fmtScheme>
+  </a:themeElements>
+</a:theme>
 </file>
</xml_diff>